<commit_message>
ADD: some words with presentation FIX: some shit in pres and RPZ
</commit_message>
<xml_diff>
--- a/Presentation/CurseWorkYakuba.pptx
+++ b/Presentation/CurseWorkYakuba.pptx
@@ -5386,7 +5386,7 @@
                 <a:latin typeface="Times New Roman" panose="02020603050405020304" pitchFamily="18" charset="0"/>
                 <a:ea typeface="Times New Roman" panose="02020603050405020304" pitchFamily="18" charset="0"/>
               </a:rPr>
-              <a:t>Группу работы со сцены. Позволяет создавать сцену, изменять параметры текущей сцены и переместить сцену в центр преобразований.</a:t>
+              <a:t>Группу работы со сценой. Позволяет создавать сцену, изменять параметры текущей сцены и переместить сцену в центр преобразований.</a:t>
             </a:r>
           </a:p>
         </p:txBody>
@@ -5991,7 +5991,7 @@
               <a:rPr lang="ru-RU" dirty="0">
                 <a:latin typeface="Times New Roman" panose="02020603050405020304" pitchFamily="18" charset="0"/>
               </a:rPr>
-              <a:t>Окно задания нового положения на сцене модели</a:t>
+              <a:t>Окно задания нового положения модели на сцене</a:t>
             </a:r>
             <a:endParaRPr lang="ru-RU" dirty="0"/>
           </a:p>
@@ -7963,8 +7963,8 @@
         </p:nvSpPr>
         <p:spPr>
           <a:xfrm>
-            <a:off x="1097279" y="4977341"/>
-            <a:ext cx="10629147" cy="1077218"/>
+            <a:off x="1097279" y="4650056"/>
+            <a:ext cx="8953547" cy="1569660"/>
           </a:xfrm>
           <a:prstGeom prst="rect">
             <a:avLst/>
@@ -7978,12 +7978,26 @@
           <a:lstStyle/>
           <a:p>
             <a:r>
+              <a:rPr lang="ru-RU" sz="3200" b="1">
+                <a:latin typeface="Times New Roman" panose="02020603050405020304" pitchFamily="18" charset="0"/>
+                <a:ea typeface="Times New Roman" panose="02020603050405020304" pitchFamily="18" charset="0"/>
+              </a:rPr>
+              <a:t>При </a:t>
+            </a:r>
+            <a:r>
+              <a:rPr lang="ru-RU" sz="3200" b="1" dirty="0">
+                <a:latin typeface="Times New Roman" panose="02020603050405020304" pitchFamily="18" charset="0"/>
+                <a:ea typeface="Times New Roman" panose="02020603050405020304" pitchFamily="18" charset="0"/>
+              </a:rPr>
+              <a:t>конкретной реализации п</a:t>
+            </a:r>
+            <a:r>
               <a:rPr lang="ru-RU" sz="3200" b="1" dirty="0">
                 <a:effectLst/>
                 <a:latin typeface="Times New Roman" panose="02020603050405020304" pitchFamily="18" charset="0"/>
                 <a:ea typeface="Times New Roman" panose="02020603050405020304" pitchFamily="18" charset="0"/>
               </a:rPr>
-              <a:t>Параллельный алгоритм </a:t>
+              <a:t>араллельный алгоритм </a:t>
             </a:r>
             <a:r>
               <a:rPr lang="en-US" sz="3200" b="1" dirty="0">
@@ -8411,18 +8425,13 @@
               <a:buChar char="o"/>
             </a:pPr>
             <a:r>
-              <a:rPr lang="ru-RU" sz="2200">
+              <a:rPr lang="ru-RU" sz="2200" dirty="0">
                 <a:effectLst/>
                 <a:latin typeface="Times New Roman" panose="02020603050405020304" pitchFamily="18" charset="0"/>
                 <a:ea typeface="Times New Roman" panose="02020603050405020304" pitchFamily="18" charset="0"/>
               </a:rPr>
               <a:t>Стол;</a:t>
             </a:r>
-            <a:endParaRPr lang="ru-RU" sz="2200" dirty="0">
-              <a:effectLst/>
-              <a:latin typeface="Times New Roman" panose="02020603050405020304" pitchFamily="18" charset="0"/>
-              <a:ea typeface="Times New Roman" panose="02020603050405020304" pitchFamily="18" charset="0"/>
-            </a:endParaRPr>
           </a:p>
           <a:p>
             <a:pPr marL="742950" lvl="1" indent="-285750" algn="just">
@@ -9030,7 +9039,7 @@
         <p:spPr>
           <a:xfrm>
             <a:off x="668866" y="1737360"/>
-            <a:ext cx="10486814" cy="2325252"/>
+            <a:ext cx="10223547" cy="2325252"/>
           </a:xfrm>
           <a:prstGeom prst="rect">
             <a:avLst/>
@@ -9093,7 +9102,7 @@
                 <a:latin typeface="Times New Roman" panose="02020603050405020304" pitchFamily="18" charset="0"/>
                 <a:ea typeface="Times New Roman" panose="02020603050405020304" pitchFamily="18" charset="0"/>
               </a:rPr>
-              <a:t>3. С помощью модифицированного алгоритма, 	использующего </a:t>
+              <a:t>3. С помощью модифицированного алгоритма,</a:t>
             </a:r>
             <a:r>
               <a:rPr lang="en-US" sz="1800" dirty="0">
@@ -9101,7 +9110,7 @@
                 <a:latin typeface="Times New Roman" panose="02020603050405020304" pitchFamily="18" charset="0"/>
                 <a:ea typeface="Times New Roman" panose="02020603050405020304" pitchFamily="18" charset="0"/>
               </a:rPr>
-              <a:t>z</a:t>
+              <a:t> </a:t>
             </a:r>
             <a:r>
               <a:rPr lang="ru-RU" sz="1800" dirty="0">
@@ -9109,7 +9118,71 @@
                 <a:latin typeface="Times New Roman" panose="02020603050405020304" pitchFamily="18" charset="0"/>
                 <a:ea typeface="Times New Roman" panose="02020603050405020304" pitchFamily="18" charset="0"/>
               </a:rPr>
-              <a:t>-буфер, определить 	падающие 	от 	объектов сцены тени и визуализировать обстановку, основываясь на текущем 	положении 	наблюдателя</a:t>
+              <a:t>использующего </a:t>
+            </a:r>
+            <a:r>
+              <a:rPr lang="en-US" sz="1800" dirty="0">
+                <a:effectLst/>
+                <a:latin typeface="Times New Roman" panose="02020603050405020304" pitchFamily="18" charset="0"/>
+                <a:ea typeface="Times New Roman" panose="02020603050405020304" pitchFamily="18" charset="0"/>
+              </a:rPr>
+              <a:t>z</a:t>
+            </a:r>
+            <a:r>
+              <a:rPr lang="ru-RU" sz="1800" dirty="0">
+                <a:effectLst/>
+                <a:latin typeface="Times New Roman" panose="02020603050405020304" pitchFamily="18" charset="0"/>
+                <a:ea typeface="Times New Roman" panose="02020603050405020304" pitchFamily="18" charset="0"/>
+              </a:rPr>
+              <a:t>-буфер, определить 	падающие</a:t>
+            </a:r>
+            <a:r>
+              <a:rPr lang="en-US" sz="1800" dirty="0">
+                <a:effectLst/>
+                <a:latin typeface="Times New Roman" panose="02020603050405020304" pitchFamily="18" charset="0"/>
+                <a:ea typeface="Times New Roman" panose="02020603050405020304" pitchFamily="18" charset="0"/>
+              </a:rPr>
+              <a:t> </a:t>
+            </a:r>
+            <a:r>
+              <a:rPr lang="ru-RU" sz="1800" dirty="0">
+                <a:effectLst/>
+                <a:latin typeface="Times New Roman" panose="02020603050405020304" pitchFamily="18" charset="0"/>
+                <a:ea typeface="Times New Roman" panose="02020603050405020304" pitchFamily="18" charset="0"/>
+              </a:rPr>
+              <a:t>от</a:t>
+            </a:r>
+            <a:r>
+              <a:rPr lang="en-US" sz="1800" dirty="0">
+                <a:effectLst/>
+                <a:latin typeface="Times New Roman" panose="02020603050405020304" pitchFamily="18" charset="0"/>
+                <a:ea typeface="Times New Roman" panose="02020603050405020304" pitchFamily="18" charset="0"/>
+              </a:rPr>
+              <a:t> </a:t>
+            </a:r>
+            <a:r>
+              <a:rPr lang="ru-RU" sz="1800" dirty="0">
+                <a:effectLst/>
+                <a:latin typeface="Times New Roman" panose="02020603050405020304" pitchFamily="18" charset="0"/>
+                <a:ea typeface="Times New Roman" panose="02020603050405020304" pitchFamily="18" charset="0"/>
+              </a:rPr>
+              <a:t>	объектов сцены тени и визуализировать обстановку, основываясь на текущем</a:t>
+            </a:r>
+            <a:r>
+              <a:rPr lang="en-US" sz="1800" dirty="0">
+                <a:effectLst/>
+                <a:latin typeface="Times New Roman" panose="02020603050405020304" pitchFamily="18" charset="0"/>
+                <a:ea typeface="Times New Roman" panose="02020603050405020304" pitchFamily="18" charset="0"/>
+              </a:rPr>
+              <a:t> </a:t>
+            </a:r>
+            <a:r>
+              <a:rPr lang="ru-RU" sz="1800" dirty="0">
+                <a:effectLst/>
+                <a:latin typeface="Times New Roman" panose="02020603050405020304" pitchFamily="18" charset="0"/>
+                <a:ea typeface="Times New Roman" panose="02020603050405020304" pitchFamily="18" charset="0"/>
+              </a:rPr>
+              <a:t>положении 	наблюдателя</a:t>
             </a:r>
           </a:p>
         </p:txBody>
@@ -9189,8 +9262,8 @@
           </a:p>
         </p:txBody>
       </p:sp>
-      <mc:AlternateContent xmlns:mc="http://schemas.openxmlformats.org/markup-compatibility/2006">
-        <mc:Choice xmlns:a14="http://schemas.microsoft.com/office/drawing/2010/main" Requires="a14">
+      <mc:AlternateContent xmlns:mc="http://schemas.openxmlformats.org/markup-compatibility/2006" xmlns:a14="http://schemas.microsoft.com/office/drawing/2010/main">
+        <mc:Choice Requires="a14">
           <p:sp>
             <p:nvSpPr>
               <p:cNvPr id="4" name="TextBox 3">
@@ -9787,7 +9860,7 @@
             </p:txBody>
           </p:sp>
         </mc:Choice>
-        <mc:Fallback>
+        <mc:Fallback xmlns="">
           <p:sp>
             <p:nvSpPr>
               <p:cNvPr id="4" name="TextBox 3">
@@ -9907,8 +9980,8 @@
           </a:p>
         </p:txBody>
       </p:sp>
-      <mc:AlternateContent xmlns:mc="http://schemas.openxmlformats.org/markup-compatibility/2006">
-        <mc:Choice xmlns:a14="http://schemas.microsoft.com/office/drawing/2010/main" Requires="a14">
+      <mc:AlternateContent xmlns:mc="http://schemas.openxmlformats.org/markup-compatibility/2006" xmlns:a14="http://schemas.microsoft.com/office/drawing/2010/main">
+        <mc:Choice Requires="a14">
           <p:sp>
             <p:nvSpPr>
               <p:cNvPr id="4" name="TextBox 3">
@@ -10711,7 +10784,7 @@
             </p:txBody>
           </p:sp>
         </mc:Choice>
-        <mc:Fallback>
+        <mc:Fallback xmlns="">
           <p:sp>
             <p:nvSpPr>
               <p:cNvPr id="4" name="TextBox 3">
@@ -10879,7 +10952,7 @@
               <a:rPr lang="ru-RU" sz="2400" dirty="0">
                 <a:latin typeface="Times New Roman" panose="02020603050405020304" pitchFamily="18" charset="0"/>
               </a:rPr>
-              <a:t>этот язык преподавался в рамках курса Объектно-Ориентированного Программирования</a:t>
+              <a:t>данный язык преподавался в рамках курса Объектно-Ориентированного Программирования</a:t>
             </a:r>
             <a:r>
               <a:rPr lang="en-US" sz="2400" dirty="0">
@@ -11004,7 +11077,7 @@
               <a:rPr lang="ru-RU" sz="2400" dirty="0">
                 <a:latin typeface="Times New Roman" panose="02020603050405020304" pitchFamily="18" charset="0"/>
               </a:rPr>
-              <a:t>основы работы с данной средой разработки преподается в рамках курса Программирования на Си</a:t>
+              <a:t>основы работы с данной средой разработки преподавался в рамках курса Программирования на Си</a:t>
             </a:r>
             <a:r>
               <a:rPr lang="en-US" sz="2400" dirty="0">

</xml_diff>

<commit_message>
FIX: fixes in presentations like: to long thoughts were deleted and two new slides: 1) Previsual; 2) End.
</commit_message>
<xml_diff>
--- a/Presentation/CurseWorkYakuba.pptx
+++ b/Presentation/CurseWorkYakuba.pptx
@@ -8,23 +8,25 @@
     <p:sldId id="256" r:id="rId2"/>
     <p:sldId id="258" r:id="rId3"/>
     <p:sldId id="259" r:id="rId4"/>
-    <p:sldId id="260" r:id="rId5"/>
-    <p:sldId id="261" r:id="rId6"/>
-    <p:sldId id="262" r:id="rId7"/>
-    <p:sldId id="263" r:id="rId8"/>
-    <p:sldId id="264" r:id="rId9"/>
-    <p:sldId id="265" r:id="rId10"/>
-    <p:sldId id="266" r:id="rId11"/>
-    <p:sldId id="268" r:id="rId12"/>
-    <p:sldId id="274" r:id="rId13"/>
-    <p:sldId id="275" r:id="rId14"/>
-    <p:sldId id="269" r:id="rId15"/>
-    <p:sldId id="270" r:id="rId16"/>
-    <p:sldId id="276" r:id="rId17"/>
-    <p:sldId id="277" r:id="rId18"/>
-    <p:sldId id="271" r:id="rId19"/>
-    <p:sldId id="278" r:id="rId20"/>
-    <p:sldId id="273" r:id="rId21"/>
+    <p:sldId id="279" r:id="rId5"/>
+    <p:sldId id="260" r:id="rId6"/>
+    <p:sldId id="261" r:id="rId7"/>
+    <p:sldId id="262" r:id="rId8"/>
+    <p:sldId id="263" r:id="rId9"/>
+    <p:sldId id="264" r:id="rId10"/>
+    <p:sldId id="265" r:id="rId11"/>
+    <p:sldId id="266" r:id="rId12"/>
+    <p:sldId id="268" r:id="rId13"/>
+    <p:sldId id="274" r:id="rId14"/>
+    <p:sldId id="275" r:id="rId15"/>
+    <p:sldId id="269" r:id="rId16"/>
+    <p:sldId id="270" r:id="rId17"/>
+    <p:sldId id="276" r:id="rId18"/>
+    <p:sldId id="277" r:id="rId19"/>
+    <p:sldId id="271" r:id="rId20"/>
+    <p:sldId id="278" r:id="rId21"/>
+    <p:sldId id="280" r:id="rId22"/>
+    <p:sldId id="273" r:id="rId23"/>
   </p:sldIdLst>
   <p:sldSz cx="12192000" cy="6858000"/>
   <p:notesSz cx="6858000" cy="9144000"/>
@@ -1490,7 +1492,7 @@
           <a:p>
             <a:fld id="{6EFF73F2-DCB5-4E8D-8FED-7ED588C8F664}" type="datetimeFigureOut">
               <a:rPr lang="ru-RU" smtClean="0"/>
-              <a:t>25.11.2020</a:t>
+              <a:t>28.11.2020</a:t>
             </a:fld>
             <a:endParaRPr lang="ru-RU"/>
           </a:p>
@@ -1698,7 +1700,7 @@
           <a:p>
             <a:fld id="{6EFF73F2-DCB5-4E8D-8FED-7ED588C8F664}" type="datetimeFigureOut">
               <a:rPr lang="ru-RU" smtClean="0"/>
-              <a:t>25.11.2020</a:t>
+              <a:t>28.11.2020</a:t>
             </a:fld>
             <a:endParaRPr lang="ru-RU"/>
           </a:p>
@@ -1956,7 +1958,7 @@
           <a:p>
             <a:fld id="{6EFF73F2-DCB5-4E8D-8FED-7ED588C8F664}" type="datetimeFigureOut">
               <a:rPr lang="ru-RU" smtClean="0"/>
-              <a:t>25.11.2020</a:t>
+              <a:t>28.11.2020</a:t>
             </a:fld>
             <a:endParaRPr lang="ru-RU"/>
           </a:p>
@@ -2126,7 +2128,7 @@
           <a:p>
             <a:fld id="{6EFF73F2-DCB5-4E8D-8FED-7ED588C8F664}" type="datetimeFigureOut">
               <a:rPr lang="ru-RU" smtClean="0"/>
-              <a:t>25.11.2020</a:t>
+              <a:t>28.11.2020</a:t>
             </a:fld>
             <a:endParaRPr lang="ru-RU"/>
           </a:p>
@@ -2463,7 +2465,7 @@
           <a:p>
             <a:fld id="{6EFF73F2-DCB5-4E8D-8FED-7ED588C8F664}" type="datetimeFigureOut">
               <a:rPr lang="ru-RU" smtClean="0"/>
-              <a:t>25.11.2020</a:t>
+              <a:t>28.11.2020</a:t>
             </a:fld>
             <a:endParaRPr lang="ru-RU"/>
           </a:p>
@@ -2738,7 +2740,7 @@
           <a:p>
             <a:fld id="{6EFF73F2-DCB5-4E8D-8FED-7ED588C8F664}" type="datetimeFigureOut">
               <a:rPr lang="ru-RU" smtClean="0"/>
-              <a:t>25.11.2020</a:t>
+              <a:t>28.11.2020</a:t>
             </a:fld>
             <a:endParaRPr lang="ru-RU"/>
           </a:p>
@@ -3121,7 +3123,7 @@
           <a:p>
             <a:fld id="{6EFF73F2-DCB5-4E8D-8FED-7ED588C8F664}" type="datetimeFigureOut">
               <a:rPr lang="ru-RU" smtClean="0"/>
-              <a:t>25.11.2020</a:t>
+              <a:t>28.11.2020</a:t>
             </a:fld>
             <a:endParaRPr lang="ru-RU"/>
           </a:p>
@@ -3239,7 +3241,7 @@
           <a:p>
             <a:fld id="{6EFF73F2-DCB5-4E8D-8FED-7ED588C8F664}" type="datetimeFigureOut">
               <a:rPr lang="ru-RU" smtClean="0"/>
-              <a:t>25.11.2020</a:t>
+              <a:t>28.11.2020</a:t>
             </a:fld>
             <a:endParaRPr lang="ru-RU"/>
           </a:p>
@@ -3412,7 +3414,7 @@
           <a:p>
             <a:fld id="{6EFF73F2-DCB5-4E8D-8FED-7ED588C8F664}" type="datetimeFigureOut">
               <a:rPr lang="ru-RU" smtClean="0"/>
-              <a:t>25.11.2020</a:t>
+              <a:t>28.11.2020</a:t>
             </a:fld>
             <a:endParaRPr lang="ru-RU"/>
           </a:p>
@@ -3768,7 +3770,7 @@
           <a:p>
             <a:fld id="{6EFF73F2-DCB5-4E8D-8FED-7ED588C8F664}" type="datetimeFigureOut">
               <a:rPr lang="ru-RU" smtClean="0"/>
-              <a:t>25.11.2020</a:t>
+              <a:t>28.11.2020</a:t>
             </a:fld>
             <a:endParaRPr lang="ru-RU"/>
           </a:p>
@@ -4116,7 +4118,7 @@
           <a:p>
             <a:fld id="{6EFF73F2-DCB5-4E8D-8FED-7ED588C8F664}" type="datetimeFigureOut">
               <a:rPr lang="ru-RU" smtClean="0"/>
-              <a:t>25.11.2020</a:t>
+              <a:t>28.11.2020</a:t>
             </a:fld>
             <a:endParaRPr lang="ru-RU"/>
           </a:p>
@@ -4427,7 +4429,7 @@
           <a:p>
             <a:fld id="{6EFF73F2-DCB5-4E8D-8FED-7ED588C8F664}" type="datetimeFigureOut">
               <a:rPr lang="ru-RU" smtClean="0"/>
-              <a:t>25.11.2020</a:t>
+              <a:t>28.11.2020</a:t>
             </a:fld>
             <a:endParaRPr lang="ru-RU"/>
           </a:p>
@@ -5100,6 +5102,115 @@
                 <a:latin typeface="Times New Roman" panose="02020603050405020304" pitchFamily="18" charset="0"/>
                 <a:cs typeface="Times New Roman" panose="02020603050405020304" pitchFamily="18" charset="0"/>
               </a:rPr>
+              <a:t>Структура и состав классов</a:t>
+            </a:r>
+          </a:p>
+        </p:txBody>
+      </p:sp>
+      <p:pic>
+        <p:nvPicPr>
+          <p:cNvPr id="3" name="Рисунок 2">
+            <a:extLst>
+              <a:ext uri="{FF2B5EF4-FFF2-40B4-BE49-F238E27FC236}">
+                <a16:creationId xmlns:a16="http://schemas.microsoft.com/office/drawing/2014/main" id="{2513F3BF-65B7-4597-9BE0-83C01247D54D}"/>
+              </a:ext>
+            </a:extLst>
+          </p:cNvPr>
+          <p:cNvPicPr/>
+          <p:nvPr/>
+        </p:nvPicPr>
+        <p:blipFill>
+          <a:blip r:embed="rId2">
+            <a:extLst>
+              <a:ext uri="{28A0092B-C50C-407E-A947-70E740481C1C}">
+                <a14:useLocalDpi xmlns:a14="http://schemas.microsoft.com/office/drawing/2010/main" val="0"/>
+              </a:ext>
+            </a:extLst>
+          </a:blip>
+          <a:stretch>
+            <a:fillRect/>
+          </a:stretch>
+        </p:blipFill>
+        <p:spPr bwMode="auto">
+          <a:xfrm>
+            <a:off x="1218142" y="1928494"/>
+            <a:ext cx="9937538" cy="3862705"/>
+          </a:xfrm>
+          <a:prstGeom prst="rect">
+            <a:avLst/>
+          </a:prstGeom>
+          <a:ln w="38100" cap="sq">
+            <a:solidFill>
+              <a:srgbClr val="000000"/>
+            </a:solidFill>
+            <a:prstDash val="solid"/>
+            <a:miter lim="800000"/>
+          </a:ln>
+          <a:effectLst>
+            <a:outerShdw blurRad="50800" dist="38100" dir="2700000" algn="tl" rotWithShape="0">
+              <a:srgbClr val="000000">
+                <a:alpha val="43000"/>
+              </a:srgbClr>
+            </a:outerShdw>
+          </a:effectLst>
+        </p:spPr>
+      </p:pic>
+    </p:spTree>
+    <p:extLst>
+      <p:ext uri="{BB962C8B-B14F-4D97-AF65-F5344CB8AC3E}">
+        <p14:creationId xmlns:p14="http://schemas.microsoft.com/office/powerpoint/2010/main" val="532674506"/>
+      </p:ext>
+    </p:extLst>
+  </p:cSld>
+  <p:clrMapOvr>
+    <a:masterClrMapping/>
+  </p:clrMapOvr>
+</p:sld>
+</file>
+
+<file path=ppt/slides/slide11.xml><?xml version="1.0" encoding="utf-8"?>
+<p:sld xmlns:a="http://schemas.openxmlformats.org/drawingml/2006/main" xmlns:r="http://schemas.openxmlformats.org/officeDocument/2006/relationships" xmlns:p="http://schemas.openxmlformats.org/presentationml/2006/main">
+  <p:cSld>
+    <p:spTree>
+      <p:nvGrpSpPr>
+        <p:cNvPr id="1" name=""/>
+        <p:cNvGrpSpPr/>
+        <p:nvPr/>
+      </p:nvGrpSpPr>
+      <p:grpSpPr>
+        <a:xfrm>
+          <a:off x="0" y="0"/>
+          <a:ext cx="0" cy="0"/>
+          <a:chOff x="0" y="0"/>
+          <a:chExt cx="0" cy="0"/>
+        </a:xfrm>
+      </p:grpSpPr>
+      <p:sp>
+        <p:nvSpPr>
+          <p:cNvPr id="2" name="Заголовок 1">
+            <a:extLst>
+              <a:ext uri="{FF2B5EF4-FFF2-40B4-BE49-F238E27FC236}">
+                <a16:creationId xmlns:a16="http://schemas.microsoft.com/office/drawing/2014/main" id="{70DA9C02-F807-4672-B786-210812D74F7C}"/>
+              </a:ext>
+            </a:extLst>
+          </p:cNvPr>
+          <p:cNvSpPr>
+            <a:spLocks noGrp="1"/>
+          </p:cNvSpPr>
+          <p:nvPr>
+            <p:ph type="title"/>
+          </p:nvPr>
+        </p:nvSpPr>
+        <p:spPr/>
+        <p:txBody>
+          <a:bodyPr/>
+          <a:lstStyle/>
+          <a:p>
+            <a:r>
+              <a:rPr lang="ru-RU" dirty="0">
+                <a:latin typeface="Times New Roman" panose="02020603050405020304" pitchFamily="18" charset="0"/>
+                <a:cs typeface="Times New Roman" panose="02020603050405020304" pitchFamily="18" charset="0"/>
+              </a:rPr>
               <a:t>Структура и состав классов: продолжение</a:t>
             </a:r>
           </a:p>
@@ -5215,7 +5326,7 @@
 </p:sld>
 </file>
 
-<file path=ppt/slides/slide11.xml><?xml version="1.0" encoding="utf-8"?>
+<file path=ppt/slides/slide12.xml><?xml version="1.0" encoding="utf-8"?>
 <p:sld xmlns:a="http://schemas.openxmlformats.org/drawingml/2006/main" xmlns:r="http://schemas.openxmlformats.org/officeDocument/2006/relationships" xmlns:p="http://schemas.openxmlformats.org/presentationml/2006/main">
   <p:cSld>
     <p:spTree>
@@ -5322,7 +5433,7 @@
         <p:spPr>
           <a:xfrm>
             <a:off x="668866" y="1889050"/>
-            <a:ext cx="7289800" cy="3469155"/>
+            <a:ext cx="7289800" cy="2702791"/>
           </a:xfrm>
           <a:prstGeom prst="rect">
             <a:avLst/>
@@ -5344,12 +5455,12 @@
               </a:spcAft>
             </a:pPr>
             <a:r>
-              <a:rPr lang="ru-RU" sz="1800" dirty="0">
+              <a:rPr lang="ru-RU" sz="2800" dirty="0">
                 <a:effectLst/>
                 <a:latin typeface="Times New Roman" panose="02020603050405020304" pitchFamily="18" charset="0"/>
                 <a:ea typeface="Times New Roman" panose="02020603050405020304" pitchFamily="18" charset="0"/>
               </a:rPr>
-              <a:t>Интерфейс главного окна приложения, изображенного на рисунке 	3.4, включает в себя:</a:t>
+              <a:t>Интерфейс главного окна приложения, изображенного на рисунке, включает в себя:</a:t>
             </a:r>
           </a:p>
           <a:p>
@@ -5361,12 +5472,12 @@
               <a:buChar char=""/>
             </a:pPr>
             <a:r>
-              <a:rPr lang="ru-RU" dirty="0">
+              <a:rPr lang="ru-RU" sz="2800" dirty="0">
                 <a:effectLst/>
                 <a:latin typeface="Times New Roman" panose="02020603050405020304" pitchFamily="18" charset="0"/>
                 <a:ea typeface="Times New Roman" panose="02020603050405020304" pitchFamily="18" charset="0"/>
               </a:rPr>
-              <a:t>Группу работы с объектами сцены. Позволяет добавлять, удалять объекты, а также изменять положение добавленных объектов;</a:t>
+              <a:t>Группу работы с объектами сцены;</a:t>
             </a:r>
           </a:p>
           <a:p>
@@ -5381,12 +5492,12 @@
               <a:buChar char=""/>
             </a:pPr>
             <a:r>
-              <a:rPr lang="ru-RU" dirty="0">
+              <a:rPr lang="ru-RU" sz="2800" dirty="0">
                 <a:effectLst/>
                 <a:latin typeface="Times New Roman" panose="02020603050405020304" pitchFamily="18" charset="0"/>
                 <a:ea typeface="Times New Roman" panose="02020603050405020304" pitchFamily="18" charset="0"/>
               </a:rPr>
-              <a:t>Группу работы со сценой. Позволяет создавать сцену, изменять параметры текущей сцены и переместить сцену в центр преобразований.</a:t>
+              <a:t>Группу работы со сценой.</a:t>
             </a:r>
           </a:p>
         </p:txBody>
@@ -5404,7 +5515,7 @@
 </p:sld>
 </file>
 
-<file path=ppt/slides/slide12.xml><?xml version="1.0" encoding="utf-8"?>
+<file path=ppt/slides/slide13.xml><?xml version="1.0" encoding="utf-8"?>
 <p:sld xmlns:a="http://schemas.openxmlformats.org/drawingml/2006/main" xmlns:r="http://schemas.openxmlformats.org/officeDocument/2006/relationships" xmlns:p="http://schemas.openxmlformats.org/presentationml/2006/main">
   <p:cSld>
     <p:spTree>
@@ -5440,7 +5551,7 @@
         <p:spPr/>
         <p:txBody>
           <a:bodyPr>
-            <a:normAutofit fontScale="90000"/>
+            <a:normAutofit/>
           </a:bodyPr>
           <a:lstStyle/>
           <a:p>
@@ -5449,7 +5560,7 @@
                 <a:latin typeface="Times New Roman" panose="02020603050405020304" pitchFamily="18" charset="0"/>
                 <a:cs typeface="Times New Roman" panose="02020603050405020304" pitchFamily="18" charset="0"/>
               </a:rPr>
-              <a:t>Пользовательский интерфейс программного обеспечения: продолжение</a:t>
+              <a:t>Пользовательский интерфейс программного обеспечения</a:t>
             </a:r>
           </a:p>
         </p:txBody>
@@ -5627,7 +5738,7 @@
 </p:sld>
 </file>
 
-<file path=ppt/slides/slide13.xml><?xml version="1.0" encoding="utf-8"?>
+<file path=ppt/slides/slide14.xml><?xml version="1.0" encoding="utf-8"?>
 <p:sld xmlns:a="http://schemas.openxmlformats.org/drawingml/2006/main" xmlns:r="http://schemas.openxmlformats.org/officeDocument/2006/relationships" xmlns:p="http://schemas.openxmlformats.org/presentationml/2006/main">
   <p:cSld>
     <p:spTree>
@@ -5663,7 +5774,7 @@
         <p:spPr/>
         <p:txBody>
           <a:bodyPr>
-            <a:normAutofit fontScale="90000"/>
+            <a:normAutofit/>
           </a:bodyPr>
           <a:lstStyle/>
           <a:p>
@@ -5672,7 +5783,7 @@
                 <a:latin typeface="Times New Roman" panose="02020603050405020304" pitchFamily="18" charset="0"/>
                 <a:cs typeface="Times New Roman" panose="02020603050405020304" pitchFamily="18" charset="0"/>
               </a:rPr>
-              <a:t>Пользовательский интерфейс программного обеспечения: продолжение</a:t>
+              <a:t>Пользовательский интерфейс программного обеспечения</a:t>
             </a:r>
           </a:p>
         </p:txBody>
@@ -6010,7 +6121,7 @@
 </p:sld>
 </file>
 
-<file path=ppt/slides/slide14.xml><?xml version="1.0" encoding="utf-8"?>
+<file path=ppt/slides/slide15.xml><?xml version="1.0" encoding="utf-8"?>
 <p:sld xmlns:a="http://schemas.openxmlformats.org/drawingml/2006/main" xmlns:r="http://schemas.openxmlformats.org/officeDocument/2006/relationships" xmlns:p="http://schemas.openxmlformats.org/presentationml/2006/main">
   <p:cSld>
     <p:spTree>
@@ -6113,7 +6224,7 @@
 </p:sld>
 </file>
 
-<file path=ppt/slides/slide15.xml><?xml version="1.0" encoding="utf-8"?>
+<file path=ppt/slides/slide16.xml><?xml version="1.0" encoding="utf-8"?>
 <p:sld xmlns:a="http://schemas.openxmlformats.org/drawingml/2006/main" xmlns:r="http://schemas.openxmlformats.org/officeDocument/2006/relationships" xmlns:p="http://schemas.openxmlformats.org/presentationml/2006/main">
   <p:cSld>
     <p:spTree>
@@ -6156,7 +6267,7 @@
                 <a:latin typeface="Times New Roman" panose="02020603050405020304" pitchFamily="18" charset="0"/>
                 <a:cs typeface="Times New Roman" panose="02020603050405020304" pitchFamily="18" charset="0"/>
               </a:rPr>
-              <a:t>Пример работы программного обеспечения: продолжение</a:t>
+              <a:t>Пример работы программного обеспечения</a:t>
             </a:r>
           </a:p>
         </p:txBody>
@@ -6216,7 +6327,7 @@
 </p:sld>
 </file>
 
-<file path=ppt/slides/slide16.xml><?xml version="1.0" encoding="utf-8"?>
+<file path=ppt/slides/slide17.xml><?xml version="1.0" encoding="utf-8"?>
 <p:sld xmlns:a="http://schemas.openxmlformats.org/drawingml/2006/main" xmlns:r="http://schemas.openxmlformats.org/officeDocument/2006/relationships" xmlns:p="http://schemas.openxmlformats.org/presentationml/2006/main">
   <p:cSld>
     <p:spTree>
@@ -6259,7 +6370,7 @@
                 <a:latin typeface="Times New Roman" panose="02020603050405020304" pitchFamily="18" charset="0"/>
                 <a:cs typeface="Times New Roman" panose="02020603050405020304" pitchFamily="18" charset="0"/>
               </a:rPr>
-              <a:t>Пример работы программного обеспечения: продолжение</a:t>
+              <a:t>Пример работы программного обеспечения</a:t>
             </a:r>
           </a:p>
         </p:txBody>
@@ -6319,7 +6430,7 @@
 </p:sld>
 </file>
 
-<file path=ppt/slides/slide17.xml><?xml version="1.0" encoding="utf-8"?>
+<file path=ppt/slides/slide18.xml><?xml version="1.0" encoding="utf-8"?>
 <p:sld xmlns:a="http://schemas.openxmlformats.org/drawingml/2006/main" xmlns:r="http://schemas.openxmlformats.org/officeDocument/2006/relationships" xmlns:p="http://schemas.openxmlformats.org/presentationml/2006/main">
   <p:cSld>
     <p:spTree>
@@ -6362,7 +6473,7 @@
                 <a:latin typeface="Times New Roman" panose="02020603050405020304" pitchFamily="18" charset="0"/>
                 <a:cs typeface="Times New Roman" panose="02020603050405020304" pitchFamily="18" charset="0"/>
               </a:rPr>
-              <a:t>Пример работы программного обеспечения: продолжение</a:t>
+              <a:t>Пример работы программного обеспечения</a:t>
             </a:r>
           </a:p>
         </p:txBody>
@@ -6422,7 +6533,7 @@
 </p:sld>
 </file>
 
-<file path=ppt/slides/slide18.xml><?xml version="1.0" encoding="utf-8"?>
+<file path=ppt/slides/slide19.xml><?xml version="1.0" encoding="utf-8"?>
 <p:sld xmlns:a="http://schemas.openxmlformats.org/drawingml/2006/main" xmlns:r="http://schemas.openxmlformats.org/officeDocument/2006/relationships" xmlns:p="http://schemas.openxmlformats.org/presentationml/2006/main">
   <p:cSld>
     <p:spTree>
@@ -7753,285 +7864,6 @@
 </p:sld>
 </file>
 
-<file path=ppt/slides/slide19.xml><?xml version="1.0" encoding="utf-8"?>
-<p:sld xmlns:a="http://schemas.openxmlformats.org/drawingml/2006/main" xmlns:r="http://schemas.openxmlformats.org/officeDocument/2006/relationships" xmlns:p="http://schemas.openxmlformats.org/presentationml/2006/main">
-  <p:cSld>
-    <p:spTree>
-      <p:nvGrpSpPr>
-        <p:cNvPr id="1" name=""/>
-        <p:cNvGrpSpPr/>
-        <p:nvPr/>
-      </p:nvGrpSpPr>
-      <p:grpSpPr>
-        <a:xfrm>
-          <a:off x="0" y="0"/>
-          <a:ext cx="0" cy="0"/>
-          <a:chOff x="0" y="0"/>
-          <a:chExt cx="0" cy="0"/>
-        </a:xfrm>
-      </p:grpSpPr>
-      <p:sp>
-        <p:nvSpPr>
-          <p:cNvPr id="2" name="Заголовок 1">
-            <a:extLst>
-              <a:ext uri="{FF2B5EF4-FFF2-40B4-BE49-F238E27FC236}">
-                <a16:creationId xmlns:a16="http://schemas.microsoft.com/office/drawing/2014/main" id="{70DA9C02-F807-4672-B786-210812D74F7C}"/>
-              </a:ext>
-            </a:extLst>
-          </p:cNvPr>
-          <p:cNvSpPr>
-            <a:spLocks noGrp="1"/>
-          </p:cNvSpPr>
-          <p:nvPr>
-            <p:ph type="title"/>
-          </p:nvPr>
-        </p:nvSpPr>
-        <p:spPr/>
-        <p:txBody>
-          <a:bodyPr/>
-          <a:lstStyle/>
-          <a:p>
-            <a:r>
-              <a:rPr lang="ru-RU" dirty="0">
-                <a:latin typeface="Times New Roman" panose="02020603050405020304" pitchFamily="18" charset="0"/>
-                <a:cs typeface="Times New Roman" panose="02020603050405020304" pitchFamily="18" charset="0"/>
-              </a:rPr>
-              <a:t>Эксперимент: продолжение</a:t>
-            </a:r>
-          </a:p>
-        </p:txBody>
-      </p:sp>
-      <p:sp>
-        <p:nvSpPr>
-          <p:cNvPr id="6" name="TextBox 5">
-            <a:extLst>
-              <a:ext uri="{FF2B5EF4-FFF2-40B4-BE49-F238E27FC236}">
-                <a16:creationId xmlns:a16="http://schemas.microsoft.com/office/drawing/2014/main" id="{FA8652B5-1C1C-4C0D-8616-ED6EC755556E}"/>
-              </a:ext>
-            </a:extLst>
-          </p:cNvPr>
-          <p:cNvSpPr txBox="1"/>
-          <p:nvPr/>
-        </p:nvSpPr>
-        <p:spPr>
-          <a:xfrm>
-            <a:off x="1097279" y="1737360"/>
-            <a:ext cx="10058399" cy="2246769"/>
-          </a:xfrm>
-          <a:prstGeom prst="rect">
-            <a:avLst/>
-          </a:prstGeom>
-          <a:noFill/>
-        </p:spPr>
-        <p:txBody>
-          <a:bodyPr wrap="square">
-            <a:spAutoFit/>
-          </a:bodyPr>
-          <a:lstStyle/>
-          <a:p>
-            <a:pPr marL="285750" indent="-285750">
-              <a:buFont typeface="Arial" panose="020B0604020202020204" pitchFamily="34" charset="0"/>
-              <a:buChar char="•"/>
-            </a:pPr>
-            <a:r>
-              <a:rPr lang="ru-RU" sz="2000" dirty="0">
-                <a:effectLst/>
-                <a:latin typeface="Times New Roman" panose="02020603050405020304" pitchFamily="18" charset="0"/>
-                <a:ea typeface="Times New Roman" panose="02020603050405020304" pitchFamily="18" charset="0"/>
-              </a:rPr>
-              <a:t>Реализация алгоритма с использованием функционала </a:t>
-            </a:r>
-            <a:r>
-              <a:rPr lang="en-US" sz="2000" dirty="0">
-                <a:effectLst/>
-                <a:latin typeface="Times New Roman" panose="02020603050405020304" pitchFamily="18" charset="0"/>
-                <a:ea typeface="Times New Roman" panose="02020603050405020304" pitchFamily="18" charset="0"/>
-              </a:rPr>
-              <a:t>OpenMP </a:t>
-            </a:r>
-            <a:r>
-              <a:rPr lang="ru-RU" sz="2000" dirty="0">
-                <a:effectLst/>
-                <a:latin typeface="Times New Roman" panose="02020603050405020304" pitchFamily="18" charset="0"/>
-                <a:ea typeface="Times New Roman" panose="02020603050405020304" pitchFamily="18" charset="0"/>
-              </a:rPr>
-              <a:t>не показывает себя хуже обычной реализации даже на минимальных значениях</a:t>
-            </a:r>
-            <a:r>
-              <a:rPr lang="en-US" sz="2000" dirty="0">
-                <a:effectLst/>
-                <a:latin typeface="Times New Roman" panose="02020603050405020304" pitchFamily="18" charset="0"/>
-                <a:ea typeface="Times New Roman" panose="02020603050405020304" pitchFamily="18" charset="0"/>
-              </a:rPr>
-              <a:t>;</a:t>
-            </a:r>
-          </a:p>
-          <a:p>
-            <a:pPr marL="285750" indent="-285750">
-              <a:buFont typeface="Arial" panose="020B0604020202020204" pitchFamily="34" charset="0"/>
-              <a:buChar char="•"/>
-            </a:pPr>
-            <a:r>
-              <a:rPr lang="ru-RU" sz="2000" dirty="0">
-                <a:latin typeface="Times New Roman" panose="02020603050405020304" pitchFamily="18" charset="0"/>
-                <a:ea typeface="Times New Roman" panose="02020603050405020304" pitchFamily="18" charset="0"/>
-              </a:rPr>
-              <a:t>Н</a:t>
-            </a:r>
-            <a:r>
-              <a:rPr lang="ru-RU" sz="2000" dirty="0">
-                <a:effectLst/>
-                <a:latin typeface="Times New Roman" panose="02020603050405020304" pitchFamily="18" charset="0"/>
-                <a:ea typeface="Times New Roman" panose="02020603050405020304" pitchFamily="18" charset="0"/>
-              </a:rPr>
-              <a:t>а всех рассмотренных размерах плоскости скорость выполнения алгоритма с использованием </a:t>
-            </a:r>
-            <a:r>
-              <a:rPr lang="en-US" sz="2000" dirty="0">
-                <a:effectLst/>
-                <a:latin typeface="Times New Roman" panose="02020603050405020304" pitchFamily="18" charset="0"/>
-                <a:ea typeface="Times New Roman" panose="02020603050405020304" pitchFamily="18" charset="0"/>
-              </a:rPr>
-              <a:t>OpenMP </a:t>
-            </a:r>
-            <a:r>
-              <a:rPr lang="ru-RU" sz="2000" dirty="0">
-                <a:effectLst/>
-                <a:latin typeface="Times New Roman" panose="02020603050405020304" pitchFamily="18" charset="0"/>
-                <a:ea typeface="Times New Roman" panose="02020603050405020304" pitchFamily="18" charset="0"/>
-              </a:rPr>
-              <a:t>больше, либо приблизительно равна скорости выполнения алгоритма без использования директив</a:t>
-            </a:r>
-            <a:r>
-              <a:rPr lang="en-US" sz="2000" dirty="0">
-                <a:effectLst/>
-                <a:latin typeface="Times New Roman" panose="02020603050405020304" pitchFamily="18" charset="0"/>
-                <a:ea typeface="Times New Roman" panose="02020603050405020304" pitchFamily="18" charset="0"/>
-              </a:rPr>
-              <a:t>;</a:t>
-            </a:r>
-            <a:endParaRPr lang="ru-RU" sz="2000" dirty="0">
-              <a:effectLst/>
-              <a:latin typeface="Times New Roman" panose="02020603050405020304" pitchFamily="18" charset="0"/>
-              <a:ea typeface="Times New Roman" panose="02020603050405020304" pitchFamily="18" charset="0"/>
-            </a:endParaRPr>
-          </a:p>
-          <a:p>
-            <a:pPr marL="285750" indent="-285750">
-              <a:buFont typeface="Arial" panose="020B0604020202020204" pitchFamily="34" charset="0"/>
-              <a:buChar char="•"/>
-            </a:pPr>
-            <a:r>
-              <a:rPr lang="ru-RU" sz="2000" dirty="0">
-                <a:effectLst/>
-                <a:latin typeface="Times New Roman" panose="02020603050405020304" pitchFamily="18" charset="0"/>
-                <a:ea typeface="Times New Roman" panose="02020603050405020304" pitchFamily="18" charset="0"/>
-              </a:rPr>
-              <a:t>В среднем по таблице алгоритм с использованием директив </a:t>
-            </a:r>
-            <a:r>
-              <a:rPr lang="en-US" sz="2000" dirty="0">
-                <a:effectLst/>
-                <a:latin typeface="Times New Roman" panose="02020603050405020304" pitchFamily="18" charset="0"/>
-                <a:ea typeface="Times New Roman" panose="02020603050405020304" pitchFamily="18" charset="0"/>
-              </a:rPr>
-              <a:t>OpenMP </a:t>
-            </a:r>
-            <a:r>
-              <a:rPr lang="ru-RU" sz="2000" dirty="0">
-                <a:effectLst/>
-                <a:latin typeface="Times New Roman" panose="02020603050405020304" pitchFamily="18" charset="0"/>
-                <a:ea typeface="Times New Roman" panose="02020603050405020304" pitchFamily="18" charset="0"/>
-              </a:rPr>
-              <a:t>будет быстрее реализации без их использования в 1.40 раз.</a:t>
-            </a:r>
-            <a:endParaRPr lang="ru-RU" sz="2000" dirty="0"/>
-          </a:p>
-        </p:txBody>
-      </p:sp>
-      <p:sp>
-        <p:nvSpPr>
-          <p:cNvPr id="8" name="TextBox 7">
-            <a:extLst>
-              <a:ext uri="{FF2B5EF4-FFF2-40B4-BE49-F238E27FC236}">
-                <a16:creationId xmlns:a16="http://schemas.microsoft.com/office/drawing/2014/main" id="{942CF2D3-13C7-49ED-912A-39C4C4F24D0D}"/>
-              </a:ext>
-            </a:extLst>
-          </p:cNvPr>
-          <p:cNvSpPr txBox="1"/>
-          <p:nvPr/>
-        </p:nvSpPr>
-        <p:spPr>
-          <a:xfrm>
-            <a:off x="1097279" y="4650056"/>
-            <a:ext cx="8953547" cy="1569660"/>
-          </a:xfrm>
-          <a:prstGeom prst="rect">
-            <a:avLst/>
-          </a:prstGeom>
-          <a:noFill/>
-        </p:spPr>
-        <p:txBody>
-          <a:bodyPr wrap="square">
-            <a:spAutoFit/>
-          </a:bodyPr>
-          <a:lstStyle/>
-          <a:p>
-            <a:r>
-              <a:rPr lang="ru-RU" sz="3200" b="1">
-                <a:latin typeface="Times New Roman" panose="02020603050405020304" pitchFamily="18" charset="0"/>
-                <a:ea typeface="Times New Roman" panose="02020603050405020304" pitchFamily="18" charset="0"/>
-              </a:rPr>
-              <a:t>При </a:t>
-            </a:r>
-            <a:r>
-              <a:rPr lang="ru-RU" sz="3200" b="1" dirty="0">
-                <a:latin typeface="Times New Roman" panose="02020603050405020304" pitchFamily="18" charset="0"/>
-                <a:ea typeface="Times New Roman" panose="02020603050405020304" pitchFamily="18" charset="0"/>
-              </a:rPr>
-              <a:t>конкретной реализации п</a:t>
-            </a:r>
-            <a:r>
-              <a:rPr lang="ru-RU" sz="3200" b="1" dirty="0">
-                <a:effectLst/>
-                <a:latin typeface="Times New Roman" panose="02020603050405020304" pitchFamily="18" charset="0"/>
-                <a:ea typeface="Times New Roman" panose="02020603050405020304" pitchFamily="18" charset="0"/>
-              </a:rPr>
-              <a:t>араллельный алгоритм </a:t>
-            </a:r>
-            <a:r>
-              <a:rPr lang="en-US" sz="3200" b="1" dirty="0">
-                <a:effectLst/>
-                <a:latin typeface="Times New Roman" panose="02020603050405020304" pitchFamily="18" charset="0"/>
-                <a:ea typeface="Times New Roman" panose="02020603050405020304" pitchFamily="18" charset="0"/>
-              </a:rPr>
-              <a:t>z</a:t>
-            </a:r>
-            <a:r>
-              <a:rPr lang="ru-RU" sz="3200" b="1" dirty="0">
-                <a:effectLst/>
-                <a:latin typeface="Times New Roman" panose="02020603050405020304" pitchFamily="18" charset="0"/>
-                <a:ea typeface="Times New Roman" panose="02020603050405020304" pitchFamily="18" charset="0"/>
-              </a:rPr>
-              <a:t>-буфера работает быстрее обычного алгоритма в любых рассмотренных условиях</a:t>
-            </a:r>
-            <a:endParaRPr lang="ru-RU" sz="3200" b="1" dirty="0"/>
-          </a:p>
-        </p:txBody>
-      </p:sp>
-    </p:spTree>
-    <p:extLst>
-      <p:ext uri="{BB962C8B-B14F-4D97-AF65-F5344CB8AC3E}">
-        <p14:creationId xmlns:p14="http://schemas.microsoft.com/office/powerpoint/2010/main" val="3972205191"/>
-      </p:ext>
-    </p:extLst>
-  </p:cSld>
-  <p:clrMapOvr>
-    <a:masterClrMapping/>
-  </p:clrMapOvr>
-</p:sld>
-</file>
-
 <file path=ppt/slides/slide2.xml><?xml version="1.0" encoding="utf-8"?>
 <p:sld xmlns:a="http://schemas.openxmlformats.org/drawingml/2006/main" xmlns:r="http://schemas.openxmlformats.org/officeDocument/2006/relationships" xmlns:p="http://schemas.openxmlformats.org/presentationml/2006/main">
   <p:cSld>
@@ -8095,7 +7927,7 @@
         <p:spPr>
           <a:xfrm>
             <a:off x="1036320" y="1737360"/>
-            <a:ext cx="10119360" cy="4893647"/>
+            <a:ext cx="10119360" cy="3785652"/>
           </a:xfrm>
           <a:prstGeom prst="rect">
             <a:avLst/>
@@ -8113,7 +7945,7 @@
                 <a:latin typeface="Times New Roman" panose="02020603050405020304" pitchFamily="18" charset="0"/>
                 <a:cs typeface="Times New Roman" panose="02020603050405020304" pitchFamily="18" charset="0"/>
               </a:rPr>
-              <a:t>Цель работы – реализовать программное обеспечение для визуализации площадки и интерьера выставочных стендов.</a:t>
+              <a:t>Цель работы – реализовать ПО для визуализации площадки и интерьера выставочных стендов.</a:t>
             </a:r>
           </a:p>
           <a:p>
@@ -8141,7 +7973,7 @@
                 <a:latin typeface="Times New Roman" panose="02020603050405020304" pitchFamily="18" charset="0"/>
                 <a:cs typeface="Times New Roman" panose="02020603050405020304" pitchFamily="18" charset="0"/>
               </a:rPr>
-              <a:t>формализовать объекты синтезируемой сцены и описать список доступных к размещению на сцене моделей интерьера</a:t>
+              <a:t>формализовать объекты сцены</a:t>
             </a:r>
             <a:r>
               <a:rPr lang="en-US" sz="2400" dirty="0">
@@ -8161,7 +7993,21 @@
                 <a:latin typeface="Times New Roman" panose="02020603050405020304" pitchFamily="18" charset="0"/>
                 <a:cs typeface="Times New Roman" panose="02020603050405020304" pitchFamily="18" charset="0"/>
               </a:rPr>
-              <a:t>выбрать или модифицировать существующие алгоритмы компьютерной графики для визуализации сцены</a:t>
+              <a:t>выбрать или модифицировать алгоритмы</a:t>
+            </a:r>
+            <a:r>
+              <a:rPr lang="en-US" sz="2400" dirty="0">
+                <a:latin typeface="Times New Roman" panose="02020603050405020304" pitchFamily="18" charset="0"/>
+                <a:cs typeface="Times New Roman" panose="02020603050405020304" pitchFamily="18" charset="0"/>
+              </a:rPr>
+              <a:t> </a:t>
+            </a:r>
+            <a:r>
+              <a:rPr lang="ru-RU" sz="2400" dirty="0">
+                <a:latin typeface="Times New Roman" panose="02020603050405020304" pitchFamily="18" charset="0"/>
+                <a:cs typeface="Times New Roman" panose="02020603050405020304" pitchFamily="18" charset="0"/>
+              </a:rPr>
+              <a:t>для решения поставленной задачи</a:t>
             </a:r>
             <a:r>
               <a:rPr lang="en-US" sz="2400" dirty="0">
@@ -8181,7 +8027,7 @@
                 <a:latin typeface="Times New Roman" panose="02020603050405020304" pitchFamily="18" charset="0"/>
                 <a:cs typeface="Times New Roman" panose="02020603050405020304" pitchFamily="18" charset="0"/>
               </a:rPr>
-              <a:t>реализовать выбранные алгоритмы визуализации</a:t>
+              <a:t>реализовать выбранные алгоритмы</a:t>
             </a:r>
             <a:r>
               <a:rPr lang="en-US" sz="2400" dirty="0">
@@ -8205,7 +8051,7 @@
                 <a:latin typeface="Times New Roman" panose="02020603050405020304" pitchFamily="18" charset="0"/>
                 <a:cs typeface="Times New Roman" panose="02020603050405020304" pitchFamily="18" charset="0"/>
               </a:rPr>
-              <a:t>разработать программный продукт для визуализации и редактирования площадки выставочного стенда и трехмерных объектов, расположенных на ней.</a:t>
+              <a:t>разработать программный продукт.</a:t>
             </a:r>
           </a:p>
           <a:p>
@@ -8248,6 +8094,540 @@
       </p:grpSpPr>
       <p:sp>
         <p:nvSpPr>
+          <p:cNvPr id="2" name="Заголовок 1">
+            <a:extLst>
+              <a:ext uri="{FF2B5EF4-FFF2-40B4-BE49-F238E27FC236}">
+                <a16:creationId xmlns:a16="http://schemas.microsoft.com/office/drawing/2014/main" id="{70DA9C02-F807-4672-B786-210812D74F7C}"/>
+              </a:ext>
+            </a:extLst>
+          </p:cNvPr>
+          <p:cNvSpPr>
+            <a:spLocks noGrp="1"/>
+          </p:cNvSpPr>
+          <p:nvPr>
+            <p:ph type="title"/>
+          </p:nvPr>
+        </p:nvSpPr>
+        <p:spPr/>
+        <p:txBody>
+          <a:bodyPr/>
+          <a:lstStyle/>
+          <a:p>
+            <a:r>
+              <a:rPr lang="ru-RU" dirty="0">
+                <a:latin typeface="Times New Roman" panose="02020603050405020304" pitchFamily="18" charset="0"/>
+                <a:cs typeface="Times New Roman" panose="02020603050405020304" pitchFamily="18" charset="0"/>
+              </a:rPr>
+              <a:t>Эксперимент</a:t>
+            </a:r>
+          </a:p>
+        </p:txBody>
+      </p:sp>
+      <p:sp>
+        <p:nvSpPr>
+          <p:cNvPr id="6" name="TextBox 5">
+            <a:extLst>
+              <a:ext uri="{FF2B5EF4-FFF2-40B4-BE49-F238E27FC236}">
+                <a16:creationId xmlns:a16="http://schemas.microsoft.com/office/drawing/2014/main" id="{FA8652B5-1C1C-4C0D-8616-ED6EC755556E}"/>
+              </a:ext>
+            </a:extLst>
+          </p:cNvPr>
+          <p:cNvSpPr txBox="1"/>
+          <p:nvPr/>
+        </p:nvSpPr>
+        <p:spPr>
+          <a:xfrm>
+            <a:off x="1097279" y="1737360"/>
+            <a:ext cx="10058399" cy="1631216"/>
+          </a:xfrm>
+          <a:prstGeom prst="rect">
+            <a:avLst/>
+          </a:prstGeom>
+          <a:noFill/>
+        </p:spPr>
+        <p:txBody>
+          <a:bodyPr wrap="square">
+            <a:spAutoFit/>
+          </a:bodyPr>
+          <a:lstStyle/>
+          <a:p>
+            <a:pPr marL="285750" indent="-285750">
+              <a:buFont typeface="Arial" panose="020B0604020202020204" pitchFamily="34" charset="0"/>
+              <a:buChar char="•"/>
+            </a:pPr>
+            <a:r>
+              <a:rPr lang="ru-RU" sz="2000" dirty="0">
+                <a:effectLst/>
+                <a:latin typeface="Times New Roman" panose="02020603050405020304" pitchFamily="18" charset="0"/>
+                <a:ea typeface="Times New Roman" panose="02020603050405020304" pitchFamily="18" charset="0"/>
+              </a:rPr>
+              <a:t>Реализация алгоритма с использованием </a:t>
+            </a:r>
+            <a:r>
+              <a:rPr lang="en-US" sz="2000" dirty="0">
+                <a:effectLst/>
+                <a:latin typeface="Times New Roman" panose="02020603050405020304" pitchFamily="18" charset="0"/>
+                <a:ea typeface="Times New Roman" panose="02020603050405020304" pitchFamily="18" charset="0"/>
+              </a:rPr>
+              <a:t>OpenMP </a:t>
+            </a:r>
+            <a:r>
+              <a:rPr lang="ru-RU" sz="2000" dirty="0">
+                <a:effectLst/>
+                <a:latin typeface="Times New Roman" panose="02020603050405020304" pitchFamily="18" charset="0"/>
+                <a:ea typeface="Times New Roman" panose="02020603050405020304" pitchFamily="18" charset="0"/>
+              </a:rPr>
+              <a:t>не показывает себя хуже обычной реализации</a:t>
+            </a:r>
+            <a:r>
+              <a:rPr lang="en-US" sz="2000" dirty="0">
+                <a:effectLst/>
+                <a:latin typeface="Times New Roman" panose="02020603050405020304" pitchFamily="18" charset="0"/>
+                <a:ea typeface="Times New Roman" panose="02020603050405020304" pitchFamily="18" charset="0"/>
+              </a:rPr>
+              <a:t>;</a:t>
+            </a:r>
+          </a:p>
+          <a:p>
+            <a:pPr marL="285750" indent="-285750">
+              <a:buFont typeface="Arial" panose="020B0604020202020204" pitchFamily="34" charset="0"/>
+              <a:buChar char="•"/>
+            </a:pPr>
+            <a:r>
+              <a:rPr lang="ru-RU" sz="2000" dirty="0">
+                <a:latin typeface="Times New Roman" panose="02020603050405020304" pitchFamily="18" charset="0"/>
+                <a:ea typeface="Times New Roman" panose="02020603050405020304" pitchFamily="18" charset="0"/>
+              </a:rPr>
+              <a:t>Н</a:t>
+            </a:r>
+            <a:r>
+              <a:rPr lang="ru-RU" sz="2000" dirty="0">
+                <a:effectLst/>
+                <a:latin typeface="Times New Roman" panose="02020603050405020304" pitchFamily="18" charset="0"/>
+                <a:ea typeface="Times New Roman" panose="02020603050405020304" pitchFamily="18" charset="0"/>
+              </a:rPr>
+              <a:t>а всех рассмотренных значениях скорость алгоритма с использованием </a:t>
+            </a:r>
+            <a:r>
+              <a:rPr lang="en-US" sz="2000" dirty="0">
+                <a:effectLst/>
+                <a:latin typeface="Times New Roman" panose="02020603050405020304" pitchFamily="18" charset="0"/>
+                <a:ea typeface="Times New Roman" panose="02020603050405020304" pitchFamily="18" charset="0"/>
+              </a:rPr>
+              <a:t>OpenMP </a:t>
+            </a:r>
+            <a:r>
+              <a:rPr lang="ru-RU" sz="2000" dirty="0">
+                <a:effectLst/>
+                <a:latin typeface="Times New Roman" panose="02020603050405020304" pitchFamily="18" charset="0"/>
+                <a:ea typeface="Times New Roman" panose="02020603050405020304" pitchFamily="18" charset="0"/>
+              </a:rPr>
+              <a:t>больше скорости алгоритма без использования директив</a:t>
+            </a:r>
+            <a:r>
+              <a:rPr lang="en-US" sz="2000" dirty="0">
+                <a:effectLst/>
+                <a:latin typeface="Times New Roman" panose="02020603050405020304" pitchFamily="18" charset="0"/>
+                <a:ea typeface="Times New Roman" panose="02020603050405020304" pitchFamily="18" charset="0"/>
+              </a:rPr>
+              <a:t>;</a:t>
+            </a:r>
+            <a:endParaRPr lang="ru-RU" sz="2000" dirty="0">
+              <a:effectLst/>
+              <a:latin typeface="Times New Roman" panose="02020603050405020304" pitchFamily="18" charset="0"/>
+              <a:ea typeface="Times New Roman" panose="02020603050405020304" pitchFamily="18" charset="0"/>
+            </a:endParaRPr>
+          </a:p>
+          <a:p>
+            <a:pPr marL="285750" indent="-285750">
+              <a:buFont typeface="Arial" panose="020B0604020202020204" pitchFamily="34" charset="0"/>
+              <a:buChar char="•"/>
+            </a:pPr>
+            <a:r>
+              <a:rPr lang="ru-RU" sz="2000" dirty="0">
+                <a:effectLst/>
+                <a:latin typeface="Times New Roman" panose="02020603050405020304" pitchFamily="18" charset="0"/>
+                <a:ea typeface="Times New Roman" panose="02020603050405020304" pitchFamily="18" charset="0"/>
+              </a:rPr>
+              <a:t>По таблице алгоритм с использованием </a:t>
+            </a:r>
+            <a:r>
+              <a:rPr lang="en-US" sz="2000" dirty="0">
+                <a:effectLst/>
+                <a:latin typeface="Times New Roman" panose="02020603050405020304" pitchFamily="18" charset="0"/>
+                <a:ea typeface="Times New Roman" panose="02020603050405020304" pitchFamily="18" charset="0"/>
+              </a:rPr>
+              <a:t>OpenMP </a:t>
+            </a:r>
+            <a:r>
+              <a:rPr lang="ru-RU" sz="2000" dirty="0">
+                <a:effectLst/>
+                <a:latin typeface="Times New Roman" panose="02020603050405020304" pitchFamily="18" charset="0"/>
+                <a:ea typeface="Times New Roman" panose="02020603050405020304" pitchFamily="18" charset="0"/>
+              </a:rPr>
+              <a:t>будет быстрее в среднем в 1.40 раз.</a:t>
+            </a:r>
+            <a:endParaRPr lang="ru-RU" sz="2000" dirty="0"/>
+          </a:p>
+        </p:txBody>
+      </p:sp>
+      <p:sp>
+        <p:nvSpPr>
+          <p:cNvPr id="8" name="TextBox 7">
+            <a:extLst>
+              <a:ext uri="{FF2B5EF4-FFF2-40B4-BE49-F238E27FC236}">
+                <a16:creationId xmlns:a16="http://schemas.microsoft.com/office/drawing/2014/main" id="{942CF2D3-13C7-49ED-912A-39C4C4F24D0D}"/>
+              </a:ext>
+            </a:extLst>
+          </p:cNvPr>
+          <p:cNvSpPr txBox="1"/>
+          <p:nvPr/>
+        </p:nvSpPr>
+        <p:spPr>
+          <a:xfrm>
+            <a:off x="1619226" y="4650056"/>
+            <a:ext cx="8953547" cy="1569660"/>
+          </a:xfrm>
+          <a:prstGeom prst="rect">
+            <a:avLst/>
+          </a:prstGeom>
+          <a:noFill/>
+        </p:spPr>
+        <p:txBody>
+          <a:bodyPr wrap="square">
+            <a:spAutoFit/>
+          </a:bodyPr>
+          <a:lstStyle/>
+          <a:p>
+            <a:r>
+              <a:rPr lang="ru-RU" sz="3200" b="1" dirty="0">
+                <a:latin typeface="Times New Roman" panose="02020603050405020304" pitchFamily="18" charset="0"/>
+                <a:ea typeface="Times New Roman" panose="02020603050405020304" pitchFamily="18" charset="0"/>
+              </a:rPr>
+              <a:t>При конкретной реализации п</a:t>
+            </a:r>
+            <a:r>
+              <a:rPr lang="ru-RU" sz="3200" b="1" dirty="0">
+                <a:effectLst/>
+                <a:latin typeface="Times New Roman" panose="02020603050405020304" pitchFamily="18" charset="0"/>
+                <a:ea typeface="Times New Roman" panose="02020603050405020304" pitchFamily="18" charset="0"/>
+              </a:rPr>
+              <a:t>араллельный алгоритм </a:t>
+            </a:r>
+            <a:r>
+              <a:rPr lang="en-US" sz="3200" b="1" dirty="0">
+                <a:effectLst/>
+                <a:latin typeface="Times New Roman" panose="02020603050405020304" pitchFamily="18" charset="0"/>
+                <a:ea typeface="Times New Roman" panose="02020603050405020304" pitchFamily="18" charset="0"/>
+              </a:rPr>
+              <a:t>z</a:t>
+            </a:r>
+            <a:r>
+              <a:rPr lang="ru-RU" sz="3200" b="1" dirty="0">
+                <a:effectLst/>
+                <a:latin typeface="Times New Roman" panose="02020603050405020304" pitchFamily="18" charset="0"/>
+                <a:ea typeface="Times New Roman" panose="02020603050405020304" pitchFamily="18" charset="0"/>
+              </a:rPr>
+              <a:t>-буфера работает быстрее обычного алгоритма в любых рассмотренных условиях</a:t>
+            </a:r>
+            <a:endParaRPr lang="ru-RU" sz="3200" b="1" dirty="0"/>
+          </a:p>
+        </p:txBody>
+      </p:sp>
+    </p:spTree>
+    <p:extLst>
+      <p:ext uri="{BB962C8B-B14F-4D97-AF65-F5344CB8AC3E}">
+        <p14:creationId xmlns:p14="http://schemas.microsoft.com/office/powerpoint/2010/main" val="3972205191"/>
+      </p:ext>
+    </p:extLst>
+  </p:cSld>
+  <p:clrMapOvr>
+    <a:masterClrMapping/>
+  </p:clrMapOvr>
+</p:sld>
+</file>
+
+<file path=ppt/slides/slide21.xml><?xml version="1.0" encoding="utf-8"?>
+<p:sld xmlns:a="http://schemas.openxmlformats.org/drawingml/2006/main" xmlns:r="http://schemas.openxmlformats.org/officeDocument/2006/relationships" xmlns:p="http://schemas.openxmlformats.org/presentationml/2006/main">
+  <p:cSld>
+    <p:spTree>
+      <p:nvGrpSpPr>
+        <p:cNvPr id="1" name=""/>
+        <p:cNvGrpSpPr/>
+        <p:nvPr/>
+      </p:nvGrpSpPr>
+      <p:grpSpPr>
+        <a:xfrm>
+          <a:off x="0" y="0"/>
+          <a:ext cx="0" cy="0"/>
+          <a:chOff x="0" y="0"/>
+          <a:chExt cx="0" cy="0"/>
+        </a:xfrm>
+      </p:grpSpPr>
+      <p:sp>
+        <p:nvSpPr>
+          <p:cNvPr id="2" name="Заголовок 1">
+            <a:extLst>
+              <a:ext uri="{FF2B5EF4-FFF2-40B4-BE49-F238E27FC236}">
+                <a16:creationId xmlns:a16="http://schemas.microsoft.com/office/drawing/2014/main" id="{70DA9C02-F807-4672-B786-210812D74F7C}"/>
+              </a:ext>
+            </a:extLst>
+          </p:cNvPr>
+          <p:cNvSpPr>
+            <a:spLocks noGrp="1"/>
+          </p:cNvSpPr>
+          <p:nvPr>
+            <p:ph type="title"/>
+          </p:nvPr>
+        </p:nvSpPr>
+        <p:spPr/>
+        <p:txBody>
+          <a:bodyPr/>
+          <a:lstStyle/>
+          <a:p>
+            <a:r>
+              <a:rPr lang="ru-RU" dirty="0">
+                <a:latin typeface="Times New Roman" panose="02020603050405020304" pitchFamily="18" charset="0"/>
+                <a:cs typeface="Times New Roman" panose="02020603050405020304" pitchFamily="18" charset="0"/>
+              </a:rPr>
+              <a:t>Заключение</a:t>
+            </a:r>
+          </a:p>
+        </p:txBody>
+      </p:sp>
+      <p:sp>
+        <p:nvSpPr>
+          <p:cNvPr id="6" name="TextBox 5">
+            <a:extLst>
+              <a:ext uri="{FF2B5EF4-FFF2-40B4-BE49-F238E27FC236}">
+                <a16:creationId xmlns:a16="http://schemas.microsoft.com/office/drawing/2014/main" id="{FA8652B5-1C1C-4C0D-8616-ED6EC755556E}"/>
+              </a:ext>
+            </a:extLst>
+          </p:cNvPr>
+          <p:cNvSpPr txBox="1"/>
+          <p:nvPr/>
+        </p:nvSpPr>
+        <p:spPr>
+          <a:xfrm>
+            <a:off x="1097279" y="1737360"/>
+            <a:ext cx="10058399" cy="4462760"/>
+          </a:xfrm>
+          <a:prstGeom prst="rect">
+            <a:avLst/>
+          </a:prstGeom>
+          <a:noFill/>
+        </p:spPr>
+        <p:txBody>
+          <a:bodyPr wrap="square">
+            <a:spAutoFit/>
+          </a:bodyPr>
+          <a:lstStyle/>
+          <a:p>
+            <a:pPr marL="285750" indent="-285750">
+              <a:buFont typeface="Arial" panose="020B0604020202020204" pitchFamily="34" charset="0"/>
+              <a:buChar char="•"/>
+            </a:pPr>
+            <a:r>
+              <a:rPr lang="ru-RU" sz="2800" dirty="0">
+                <a:effectLst/>
+                <a:latin typeface="Times New Roman" panose="02020603050405020304" pitchFamily="18" charset="0"/>
+                <a:ea typeface="Times New Roman" panose="02020603050405020304" pitchFamily="18" charset="0"/>
+              </a:rPr>
+              <a:t>Была реализована программа для визуализации и редактирования стендов</a:t>
+            </a:r>
+            <a:r>
+              <a:rPr lang="en-US" sz="2800" dirty="0">
+                <a:effectLst/>
+                <a:latin typeface="Times New Roman" panose="02020603050405020304" pitchFamily="18" charset="0"/>
+                <a:ea typeface="Times New Roman" panose="02020603050405020304" pitchFamily="18" charset="0"/>
+              </a:rPr>
+              <a:t>;</a:t>
+            </a:r>
+          </a:p>
+          <a:p>
+            <a:pPr marL="285750" indent="-285750">
+              <a:buFont typeface="Arial" panose="020B0604020202020204" pitchFamily="34" charset="0"/>
+              <a:buChar char="•"/>
+            </a:pPr>
+            <a:r>
+              <a:rPr lang="ru-RU" sz="2800" dirty="0">
+                <a:latin typeface="Times New Roman" panose="02020603050405020304" pitchFamily="18" charset="0"/>
+                <a:ea typeface="Times New Roman" panose="02020603050405020304" pitchFamily="18" charset="0"/>
+              </a:rPr>
+              <a:t>Были формализованы объекты сцены</a:t>
+            </a:r>
+            <a:r>
+              <a:rPr lang="en-US" sz="2800" dirty="0">
+                <a:effectLst/>
+                <a:latin typeface="Times New Roman" panose="02020603050405020304" pitchFamily="18" charset="0"/>
+                <a:ea typeface="Times New Roman" panose="02020603050405020304" pitchFamily="18" charset="0"/>
+              </a:rPr>
+              <a:t>;</a:t>
+            </a:r>
+            <a:endParaRPr lang="ru-RU" sz="2800" dirty="0">
+              <a:effectLst/>
+              <a:latin typeface="Times New Roman" panose="02020603050405020304" pitchFamily="18" charset="0"/>
+              <a:ea typeface="Times New Roman" panose="02020603050405020304" pitchFamily="18" charset="0"/>
+            </a:endParaRPr>
+          </a:p>
+          <a:p>
+            <a:pPr marL="285750" indent="-285750">
+              <a:buFont typeface="Arial" panose="020B0604020202020204" pitchFamily="34" charset="0"/>
+              <a:buChar char="•"/>
+            </a:pPr>
+            <a:r>
+              <a:rPr lang="ru-RU" sz="2800" dirty="0">
+                <a:latin typeface="Times New Roman" panose="02020603050405020304" pitchFamily="18" charset="0"/>
+                <a:ea typeface="Times New Roman" panose="02020603050405020304" pitchFamily="18" charset="0"/>
+              </a:rPr>
+              <a:t>Были изучены алгоритмы для решения поставленной задачи</a:t>
+            </a:r>
+            <a:r>
+              <a:rPr lang="en-US" sz="2800" dirty="0">
+                <a:latin typeface="Times New Roman" panose="02020603050405020304" pitchFamily="18" charset="0"/>
+                <a:ea typeface="Times New Roman" panose="02020603050405020304" pitchFamily="18" charset="0"/>
+              </a:rPr>
+              <a:t>;</a:t>
+            </a:r>
+            <a:endParaRPr lang="ru-RU" sz="2800" dirty="0">
+              <a:effectLst/>
+              <a:latin typeface="Times New Roman" panose="02020603050405020304" pitchFamily="18" charset="0"/>
+              <a:ea typeface="Times New Roman" panose="02020603050405020304" pitchFamily="18" charset="0"/>
+            </a:endParaRPr>
+          </a:p>
+          <a:p>
+            <a:pPr marL="285750" indent="-285750">
+              <a:buFont typeface="Arial" panose="020B0604020202020204" pitchFamily="34" charset="0"/>
+              <a:buChar char="•"/>
+            </a:pPr>
+            <a:r>
+              <a:rPr lang="ru-RU" sz="2800" dirty="0">
+                <a:effectLst/>
+                <a:latin typeface="Times New Roman" panose="02020603050405020304" pitchFamily="18" charset="0"/>
+                <a:ea typeface="Times New Roman" panose="02020603050405020304" pitchFamily="18" charset="0"/>
+              </a:rPr>
+              <a:t>Были получены знания в области компьютерной графики</a:t>
+            </a:r>
+            <a:r>
+              <a:rPr lang="en-US" sz="2800" dirty="0">
+                <a:latin typeface="Times New Roman" panose="02020603050405020304" pitchFamily="18" charset="0"/>
+                <a:ea typeface="Times New Roman" panose="02020603050405020304" pitchFamily="18" charset="0"/>
+              </a:rPr>
+              <a:t>;</a:t>
+            </a:r>
+          </a:p>
+          <a:p>
+            <a:pPr marL="285750" indent="-285750">
+              <a:buFont typeface="Arial" panose="020B0604020202020204" pitchFamily="34" charset="0"/>
+              <a:buChar char="•"/>
+            </a:pPr>
+            <a:r>
+              <a:rPr lang="ru-RU" sz="2800" dirty="0">
+                <a:latin typeface="Times New Roman" panose="02020603050405020304" pitchFamily="18" charset="0"/>
+                <a:ea typeface="Times New Roman" panose="02020603050405020304" pitchFamily="18" charset="0"/>
+              </a:rPr>
+              <a:t>Были закреплены навыки проектирования ПО</a:t>
+            </a:r>
+            <a:r>
+              <a:rPr lang="en-US" sz="2800" dirty="0">
+                <a:latin typeface="Times New Roman" panose="02020603050405020304" pitchFamily="18" charset="0"/>
+                <a:ea typeface="Times New Roman" panose="02020603050405020304" pitchFamily="18" charset="0"/>
+              </a:rPr>
+              <a:t>;</a:t>
+            </a:r>
+            <a:endParaRPr lang="ru-RU" sz="2800" dirty="0">
+              <a:latin typeface="Times New Roman" panose="02020603050405020304" pitchFamily="18" charset="0"/>
+              <a:ea typeface="Times New Roman" panose="02020603050405020304" pitchFamily="18" charset="0"/>
+            </a:endParaRPr>
+          </a:p>
+          <a:p>
+            <a:pPr marL="285750" indent="-285750">
+              <a:buFont typeface="Arial" panose="020B0604020202020204" pitchFamily="34" charset="0"/>
+              <a:buChar char="•"/>
+            </a:pPr>
+            <a:r>
+              <a:rPr lang="ru-RU" sz="2800" dirty="0">
+                <a:latin typeface="Times New Roman" panose="02020603050405020304" pitchFamily="18" charset="0"/>
+                <a:ea typeface="Times New Roman" panose="02020603050405020304" pitchFamily="18" charset="0"/>
+              </a:rPr>
+              <a:t>Было показано, что использование </a:t>
+            </a:r>
+            <a:r>
+              <a:rPr lang="en-US" sz="2800" dirty="0">
+                <a:latin typeface="Times New Roman" panose="02020603050405020304" pitchFamily="18" charset="0"/>
+                <a:ea typeface="Times New Roman" panose="02020603050405020304" pitchFamily="18" charset="0"/>
+              </a:rPr>
+              <a:t>OpenMP </a:t>
+            </a:r>
+            <a:r>
+              <a:rPr lang="ru-RU" sz="2800" dirty="0">
+                <a:latin typeface="Times New Roman" panose="02020603050405020304" pitchFamily="18" charset="0"/>
+                <a:ea typeface="Times New Roman" panose="02020603050405020304" pitchFamily="18" charset="0"/>
+              </a:rPr>
+              <a:t>позволило ускорить работу приложения в среднем в 1.4 раза.</a:t>
+            </a:r>
+          </a:p>
+          <a:p>
+            <a:pPr marL="285750" indent="-285750">
+              <a:buFont typeface="Arial" panose="020B0604020202020204" pitchFamily="34" charset="0"/>
+              <a:buChar char="•"/>
+            </a:pPr>
+            <a:endParaRPr lang="en-US" sz="2000" dirty="0">
+              <a:latin typeface="Times New Roman" panose="02020603050405020304" pitchFamily="18" charset="0"/>
+              <a:ea typeface="Times New Roman" panose="02020603050405020304" pitchFamily="18" charset="0"/>
+            </a:endParaRPr>
+          </a:p>
+          <a:p>
+            <a:pPr marL="285750" indent="-285750">
+              <a:buFont typeface="Arial" panose="020B0604020202020204" pitchFamily="34" charset="0"/>
+              <a:buChar char="•"/>
+            </a:pPr>
+            <a:endParaRPr lang="en-US" sz="2000" dirty="0">
+              <a:latin typeface="Times New Roman" panose="02020603050405020304" pitchFamily="18" charset="0"/>
+              <a:ea typeface="Times New Roman" panose="02020603050405020304" pitchFamily="18" charset="0"/>
+            </a:endParaRPr>
+          </a:p>
+          <a:p>
+            <a:pPr marL="285750" indent="-285750">
+              <a:buFont typeface="Arial" panose="020B0604020202020204" pitchFamily="34" charset="0"/>
+              <a:buChar char="•"/>
+            </a:pPr>
+            <a:endParaRPr lang="ru-RU" sz="2000" dirty="0"/>
+          </a:p>
+        </p:txBody>
+      </p:sp>
+    </p:spTree>
+    <p:extLst>
+      <p:ext uri="{BB962C8B-B14F-4D97-AF65-F5344CB8AC3E}">
+        <p14:creationId xmlns:p14="http://schemas.microsoft.com/office/powerpoint/2010/main" val="3014458134"/>
+      </p:ext>
+    </p:extLst>
+  </p:cSld>
+  <p:clrMapOvr>
+    <a:masterClrMapping/>
+  </p:clrMapOvr>
+</p:sld>
+</file>
+
+<file path=ppt/slides/slide22.xml><?xml version="1.0" encoding="utf-8"?>
+<p:sld xmlns:a="http://schemas.openxmlformats.org/drawingml/2006/main" xmlns:r="http://schemas.openxmlformats.org/officeDocument/2006/relationships" xmlns:p="http://schemas.openxmlformats.org/presentationml/2006/main">
+  <p:cSld>
+    <p:spTree>
+      <p:nvGrpSpPr>
+        <p:cNvPr id="1" name=""/>
+        <p:cNvGrpSpPr/>
+        <p:nvPr/>
+      </p:nvGrpSpPr>
+      <p:grpSpPr>
+        <a:xfrm>
+          <a:off x="0" y="0"/>
+          <a:ext cx="0" cy="0"/>
+          <a:chOff x="0" y="0"/>
+          <a:chExt cx="0" cy="0"/>
+        </a:xfrm>
+      </p:grpSpPr>
+      <p:sp>
+        <p:nvSpPr>
           <p:cNvPr id="3" name="Подзаголовок 2">
             <a:extLst>
               <a:ext uri="{FF2B5EF4-FFF2-40B4-BE49-F238E27FC236}">
@@ -8596,6 +8976,110 @@
 </file>
 
 <file path=ppt/slides/slide4.xml><?xml version="1.0" encoding="utf-8"?>
+<p:sld xmlns:a="http://schemas.openxmlformats.org/drawingml/2006/main" xmlns:r="http://schemas.openxmlformats.org/officeDocument/2006/relationships" xmlns:p="http://schemas.openxmlformats.org/presentationml/2006/main">
+  <p:cSld>
+    <p:spTree>
+      <p:nvGrpSpPr>
+        <p:cNvPr id="1" name=""/>
+        <p:cNvGrpSpPr/>
+        <p:nvPr/>
+      </p:nvGrpSpPr>
+      <p:grpSpPr>
+        <a:xfrm>
+          <a:off x="0" y="0"/>
+          <a:ext cx="0" cy="0"/>
+          <a:chOff x="0" y="0"/>
+          <a:chExt cx="0" cy="0"/>
+        </a:xfrm>
+      </p:grpSpPr>
+      <p:sp>
+        <p:nvSpPr>
+          <p:cNvPr id="2" name="Заголовок 1">
+            <a:extLst>
+              <a:ext uri="{FF2B5EF4-FFF2-40B4-BE49-F238E27FC236}">
+                <a16:creationId xmlns:a16="http://schemas.microsoft.com/office/drawing/2014/main" id="{21C2896A-A975-442A-BA5E-9F35ACEC1BA1}"/>
+              </a:ext>
+            </a:extLst>
+          </p:cNvPr>
+          <p:cNvSpPr>
+            <a:spLocks noGrp="1"/>
+          </p:cNvSpPr>
+          <p:nvPr>
+            <p:ph type="title"/>
+          </p:nvPr>
+        </p:nvSpPr>
+        <p:spPr/>
+        <p:txBody>
+          <a:bodyPr/>
+          <a:lstStyle/>
+          <a:p>
+            <a:r>
+              <a:rPr lang="ru-RU" dirty="0">
+                <a:latin typeface="Times New Roman" panose="02020603050405020304" pitchFamily="18" charset="0"/>
+                <a:cs typeface="Times New Roman" panose="02020603050405020304" pitchFamily="18" charset="0"/>
+              </a:rPr>
+              <a:t>Формализация объектов синтезируемой сцены</a:t>
+            </a:r>
+          </a:p>
+        </p:txBody>
+      </p:sp>
+      <p:pic>
+        <p:nvPicPr>
+          <p:cNvPr id="10" name="Рисунок 9">
+            <a:extLst>
+              <a:ext uri="{FF2B5EF4-FFF2-40B4-BE49-F238E27FC236}">
+                <a16:creationId xmlns:a16="http://schemas.microsoft.com/office/drawing/2014/main" id="{14423F3D-DAC6-4E86-BB37-BC042637167B}"/>
+              </a:ext>
+            </a:extLst>
+          </p:cNvPr>
+          <p:cNvPicPr>
+            <a:picLocks noChangeAspect="1"/>
+          </p:cNvPicPr>
+          <p:nvPr/>
+        </p:nvPicPr>
+        <p:blipFill rotWithShape="1">
+          <a:blip r:embed="rId2"/>
+          <a:srcRect l="1060" t="988" r="1835" b="2221"/>
+          <a:stretch/>
+        </p:blipFill>
+        <p:spPr>
+          <a:xfrm>
+            <a:off x="2235200" y="1906086"/>
+            <a:ext cx="7721599" cy="4827539"/>
+          </a:xfrm>
+          <a:prstGeom prst="rect">
+            <a:avLst/>
+          </a:prstGeom>
+          <a:ln w="38100" cap="sq">
+            <a:solidFill>
+              <a:srgbClr val="000000"/>
+            </a:solidFill>
+            <a:prstDash val="solid"/>
+            <a:miter lim="800000"/>
+          </a:ln>
+          <a:effectLst>
+            <a:outerShdw blurRad="50800" dist="38100" dir="2700000" algn="tl" rotWithShape="0">
+              <a:srgbClr val="000000">
+                <a:alpha val="43000"/>
+              </a:srgbClr>
+            </a:outerShdw>
+          </a:effectLst>
+        </p:spPr>
+      </p:pic>
+    </p:spTree>
+    <p:extLst>
+      <p:ext uri="{BB962C8B-B14F-4D97-AF65-F5344CB8AC3E}">
+        <p14:creationId xmlns:p14="http://schemas.microsoft.com/office/powerpoint/2010/main" val="1682148032"/>
+      </p:ext>
+    </p:extLst>
+  </p:cSld>
+  <p:clrMapOvr>
+    <a:masterClrMapping/>
+  </p:clrMapOvr>
+</p:sld>
+</file>
+
+<file path=ppt/slides/slide5.xml><?xml version="1.0" encoding="utf-8"?>
 <p:sld xmlns:a="http://schemas.openxmlformats.org/drawingml/2006/main" xmlns:r="http://schemas.openxmlformats.org/officeDocument/2006/relationships" xmlns:p="http://schemas.openxmlformats.org/presentationml/2006/main">
   <p:cSld>
     <p:spTree>
@@ -8921,10 +9405,10 @@
       </p:pic>
       <p:pic>
         <p:nvPicPr>
-          <p:cNvPr id="20" name="Рисунок 19">
+          <p:cNvPr id="3" name="Рисунок 2">
             <a:extLst>
               <a:ext uri="{FF2B5EF4-FFF2-40B4-BE49-F238E27FC236}">
-                <a16:creationId xmlns:a16="http://schemas.microsoft.com/office/drawing/2014/main" id="{D1C5F432-9DBB-4067-8F26-EE6BDBFA05C7}"/>
+                <a16:creationId xmlns:a16="http://schemas.microsoft.com/office/drawing/2014/main" id="{05DD9E05-4B93-4E27-8DA0-AA8C401FD7D3}"/>
               </a:ext>
             </a:extLst>
           </p:cNvPr>
@@ -8933,16 +9417,15 @@
           </p:cNvPicPr>
           <p:nvPr/>
         </p:nvPicPr>
-        <p:blipFill>
+        <p:blipFill rotWithShape="1">
           <a:blip r:embed="rId3"/>
-          <a:stretch>
-            <a:fillRect/>
-          </a:stretch>
+          <a:srcRect l="1662" t="2609" r="1987" b="5737"/>
+          <a:stretch/>
         </p:blipFill>
         <p:spPr>
           <a:xfrm>
-            <a:off x="6536268" y="3672084"/>
-            <a:ext cx="5029199" cy="2143566"/>
+            <a:off x="6536267" y="3643306"/>
+            <a:ext cx="5029200" cy="2138854"/>
           </a:xfrm>
           <a:prstGeom prst="rect">
             <a:avLst/>
@@ -8976,230 +9459,6 @@
 </p:sld>
 </file>
 
-<file path=ppt/slides/slide5.xml><?xml version="1.0" encoding="utf-8"?>
-<p:sld xmlns:a="http://schemas.openxmlformats.org/drawingml/2006/main" xmlns:r="http://schemas.openxmlformats.org/officeDocument/2006/relationships" xmlns:p="http://schemas.openxmlformats.org/presentationml/2006/main">
-  <p:cSld>
-    <p:spTree>
-      <p:nvGrpSpPr>
-        <p:cNvPr id="1" name=""/>
-        <p:cNvGrpSpPr/>
-        <p:nvPr/>
-      </p:nvGrpSpPr>
-      <p:grpSpPr>
-        <a:xfrm>
-          <a:off x="0" y="0"/>
-          <a:ext cx="0" cy="0"/>
-          <a:chOff x="0" y="0"/>
-          <a:chExt cx="0" cy="0"/>
-        </a:xfrm>
-      </p:grpSpPr>
-      <p:sp>
-        <p:nvSpPr>
-          <p:cNvPr id="2" name="Заголовок 1">
-            <a:extLst>
-              <a:ext uri="{FF2B5EF4-FFF2-40B4-BE49-F238E27FC236}">
-                <a16:creationId xmlns:a16="http://schemas.microsoft.com/office/drawing/2014/main" id="{7B8C5339-15F3-42AC-BA5B-0671C033AF72}"/>
-              </a:ext>
-            </a:extLst>
-          </p:cNvPr>
-          <p:cNvSpPr>
-            <a:spLocks noGrp="1"/>
-          </p:cNvSpPr>
-          <p:nvPr>
-            <p:ph type="title"/>
-          </p:nvPr>
-        </p:nvSpPr>
-        <p:spPr/>
-        <p:txBody>
-          <a:bodyPr/>
-          <a:lstStyle/>
-          <a:p>
-            <a:r>
-              <a:rPr lang="ru-RU" dirty="0">
-                <a:latin typeface="Times New Roman" panose="02020603050405020304" pitchFamily="18" charset="0"/>
-                <a:cs typeface="Times New Roman" panose="02020603050405020304" pitchFamily="18" charset="0"/>
-              </a:rPr>
-              <a:t>Общий алгоритм решения поставленной задачи</a:t>
-            </a:r>
-          </a:p>
-        </p:txBody>
-      </p:sp>
-      <p:sp>
-        <p:nvSpPr>
-          <p:cNvPr id="4" name="TextBox 3">
-            <a:extLst>
-              <a:ext uri="{FF2B5EF4-FFF2-40B4-BE49-F238E27FC236}">
-                <a16:creationId xmlns:a16="http://schemas.microsoft.com/office/drawing/2014/main" id="{6BC30197-6504-47B0-9E3C-9DEDDFC1A3B2}"/>
-              </a:ext>
-            </a:extLst>
-          </p:cNvPr>
-          <p:cNvSpPr txBox="1"/>
-          <p:nvPr/>
-        </p:nvSpPr>
-        <p:spPr>
-          <a:xfrm>
-            <a:off x="668866" y="1737360"/>
-            <a:ext cx="10223547" cy="2325252"/>
-          </a:xfrm>
-          <a:prstGeom prst="rect">
-            <a:avLst/>
-          </a:prstGeom>
-          <a:noFill/>
-        </p:spPr>
-        <p:txBody>
-          <a:bodyPr wrap="square">
-            <a:spAutoFit/>
-          </a:bodyPr>
-          <a:lstStyle/>
-          <a:p>
-            <a:pPr indent="450215" algn="just">
-              <a:lnSpc>
-                <a:spcPct val="150000"/>
-              </a:lnSpc>
-              <a:spcAft>
-                <a:spcPts val="800"/>
-              </a:spcAft>
-            </a:pPr>
-            <a:r>
-              <a:rPr lang="ru-RU" sz="1800" dirty="0">
-                <a:effectLst/>
-                <a:latin typeface="Times New Roman" panose="02020603050405020304" pitchFamily="18" charset="0"/>
-                <a:ea typeface="Times New Roman" panose="02020603050405020304" pitchFamily="18" charset="0"/>
-              </a:rPr>
-              <a:t>1. Задать размеры области размещения объектов</a:t>
-            </a:r>
-          </a:p>
-          <a:p>
-            <a:pPr indent="450215" algn="just">
-              <a:lnSpc>
-                <a:spcPct val="150000"/>
-              </a:lnSpc>
-              <a:spcAft>
-                <a:spcPts val="800"/>
-              </a:spcAft>
-            </a:pPr>
-            <a:r>
-              <a:rPr lang="ru-RU" sz="1800" dirty="0">
-                <a:effectLst/>
-                <a:latin typeface="Times New Roman" panose="02020603050405020304" pitchFamily="18" charset="0"/>
-                <a:ea typeface="Times New Roman" panose="02020603050405020304" pitchFamily="18" charset="0"/>
-              </a:rPr>
-              <a:t>2. Разместить объекты сцены</a:t>
-            </a:r>
-          </a:p>
-          <a:p>
-            <a:pPr indent="450215" algn="just">
-              <a:lnSpc>
-                <a:spcPct val="150000"/>
-              </a:lnSpc>
-              <a:spcAft>
-                <a:spcPts val="800"/>
-              </a:spcAft>
-            </a:pPr>
-            <a:r>
-              <a:rPr lang="ru-RU" sz="1800" dirty="0">
-                <a:effectLst/>
-                <a:latin typeface="Times New Roman" panose="02020603050405020304" pitchFamily="18" charset="0"/>
-                <a:ea typeface="Times New Roman" panose="02020603050405020304" pitchFamily="18" charset="0"/>
-              </a:rPr>
-              <a:t>3. С помощью модифицированного алгоритма,</a:t>
-            </a:r>
-            <a:r>
-              <a:rPr lang="en-US" sz="1800" dirty="0">
-                <a:effectLst/>
-                <a:latin typeface="Times New Roman" panose="02020603050405020304" pitchFamily="18" charset="0"/>
-                <a:ea typeface="Times New Roman" panose="02020603050405020304" pitchFamily="18" charset="0"/>
-              </a:rPr>
-              <a:t> </a:t>
-            </a:r>
-            <a:r>
-              <a:rPr lang="ru-RU" sz="1800" dirty="0">
-                <a:effectLst/>
-                <a:latin typeface="Times New Roman" panose="02020603050405020304" pitchFamily="18" charset="0"/>
-                <a:ea typeface="Times New Roman" panose="02020603050405020304" pitchFamily="18" charset="0"/>
-              </a:rPr>
-              <a:t>использующего </a:t>
-            </a:r>
-            <a:r>
-              <a:rPr lang="en-US" sz="1800" dirty="0">
-                <a:effectLst/>
-                <a:latin typeface="Times New Roman" panose="02020603050405020304" pitchFamily="18" charset="0"/>
-                <a:ea typeface="Times New Roman" panose="02020603050405020304" pitchFamily="18" charset="0"/>
-              </a:rPr>
-              <a:t>z</a:t>
-            </a:r>
-            <a:r>
-              <a:rPr lang="ru-RU" sz="1800" dirty="0">
-                <a:effectLst/>
-                <a:latin typeface="Times New Roman" panose="02020603050405020304" pitchFamily="18" charset="0"/>
-                <a:ea typeface="Times New Roman" panose="02020603050405020304" pitchFamily="18" charset="0"/>
-              </a:rPr>
-              <a:t>-буфер, определить 	падающие</a:t>
-            </a:r>
-            <a:r>
-              <a:rPr lang="en-US" sz="1800" dirty="0">
-                <a:effectLst/>
-                <a:latin typeface="Times New Roman" panose="02020603050405020304" pitchFamily="18" charset="0"/>
-                <a:ea typeface="Times New Roman" panose="02020603050405020304" pitchFamily="18" charset="0"/>
-              </a:rPr>
-              <a:t> </a:t>
-            </a:r>
-            <a:r>
-              <a:rPr lang="ru-RU" sz="1800" dirty="0">
-                <a:effectLst/>
-                <a:latin typeface="Times New Roman" panose="02020603050405020304" pitchFamily="18" charset="0"/>
-                <a:ea typeface="Times New Roman" panose="02020603050405020304" pitchFamily="18" charset="0"/>
-              </a:rPr>
-              <a:t>от</a:t>
-            </a:r>
-            <a:r>
-              <a:rPr lang="en-US" sz="1800" dirty="0">
-                <a:effectLst/>
-                <a:latin typeface="Times New Roman" panose="02020603050405020304" pitchFamily="18" charset="0"/>
-                <a:ea typeface="Times New Roman" panose="02020603050405020304" pitchFamily="18" charset="0"/>
-              </a:rPr>
-              <a:t> </a:t>
-            </a:r>
-            <a:r>
-              <a:rPr lang="ru-RU" sz="1800" dirty="0">
-                <a:effectLst/>
-                <a:latin typeface="Times New Roman" panose="02020603050405020304" pitchFamily="18" charset="0"/>
-                <a:ea typeface="Times New Roman" panose="02020603050405020304" pitchFamily="18" charset="0"/>
-              </a:rPr>
-              <a:t>	объектов сцены тени и визуализировать обстановку, основываясь на текущем</a:t>
-            </a:r>
-            <a:r>
-              <a:rPr lang="en-US" sz="1800" dirty="0">
-                <a:effectLst/>
-                <a:latin typeface="Times New Roman" panose="02020603050405020304" pitchFamily="18" charset="0"/>
-                <a:ea typeface="Times New Roman" panose="02020603050405020304" pitchFamily="18" charset="0"/>
-              </a:rPr>
-              <a:t> </a:t>
-            </a:r>
-            <a:r>
-              <a:rPr lang="ru-RU" sz="1800" dirty="0">
-                <a:effectLst/>
-                <a:latin typeface="Times New Roman" panose="02020603050405020304" pitchFamily="18" charset="0"/>
-                <a:ea typeface="Times New Roman" panose="02020603050405020304" pitchFamily="18" charset="0"/>
-              </a:rPr>
-              <a:t>положении 	наблюдателя</a:t>
-            </a:r>
-          </a:p>
-        </p:txBody>
-      </p:sp>
-    </p:spTree>
-    <p:extLst>
-      <p:ext uri="{BB962C8B-B14F-4D97-AF65-F5344CB8AC3E}">
-        <p14:creationId xmlns:p14="http://schemas.microsoft.com/office/powerpoint/2010/main" val="4248898742"/>
-      </p:ext>
-    </p:extLst>
-  </p:cSld>
-  <p:clrMapOvr>
-    <a:masterClrMapping/>
-  </p:clrMapOvr>
-</p:sld>
-</file>
-
 <file path=ppt/slides/slide6.xml><?xml version="1.0" encoding="utf-8"?>
 <p:sld xmlns:a="http://schemas.openxmlformats.org/drawingml/2006/main" xmlns:r="http://schemas.openxmlformats.org/officeDocument/2006/relationships" xmlns:p="http://schemas.openxmlformats.org/presentationml/2006/main">
   <p:cSld>
@@ -9222,6 +9481,182 @@
           <p:cNvPr id="2" name="Заголовок 1">
             <a:extLst>
               <a:ext uri="{FF2B5EF4-FFF2-40B4-BE49-F238E27FC236}">
+                <a16:creationId xmlns:a16="http://schemas.microsoft.com/office/drawing/2014/main" id="{7B8C5339-15F3-42AC-BA5B-0671C033AF72}"/>
+              </a:ext>
+            </a:extLst>
+          </p:cNvPr>
+          <p:cNvSpPr>
+            <a:spLocks noGrp="1"/>
+          </p:cNvSpPr>
+          <p:nvPr>
+            <p:ph type="title"/>
+          </p:nvPr>
+        </p:nvSpPr>
+        <p:spPr/>
+        <p:txBody>
+          <a:bodyPr/>
+          <a:lstStyle/>
+          <a:p>
+            <a:r>
+              <a:rPr lang="ru-RU" dirty="0">
+                <a:latin typeface="Times New Roman" panose="02020603050405020304" pitchFamily="18" charset="0"/>
+                <a:cs typeface="Times New Roman" panose="02020603050405020304" pitchFamily="18" charset="0"/>
+              </a:rPr>
+              <a:t>Общий алгоритм решения поставленной задачи</a:t>
+            </a:r>
+          </a:p>
+        </p:txBody>
+      </p:sp>
+      <p:sp>
+        <p:nvSpPr>
+          <p:cNvPr id="4" name="TextBox 3">
+            <a:extLst>
+              <a:ext uri="{FF2B5EF4-FFF2-40B4-BE49-F238E27FC236}">
+                <a16:creationId xmlns:a16="http://schemas.microsoft.com/office/drawing/2014/main" id="{6BC30197-6504-47B0-9E3C-9DEDDFC1A3B2}"/>
+              </a:ext>
+            </a:extLst>
+          </p:cNvPr>
+          <p:cNvSpPr txBox="1"/>
+          <p:nvPr/>
+        </p:nvSpPr>
+        <p:spPr>
+          <a:xfrm>
+            <a:off x="668866" y="1737360"/>
+            <a:ext cx="10223547" cy="1494255"/>
+          </a:xfrm>
+          <a:prstGeom prst="rect">
+            <a:avLst/>
+          </a:prstGeom>
+          <a:noFill/>
+        </p:spPr>
+        <p:txBody>
+          <a:bodyPr wrap="square">
+            <a:spAutoFit/>
+          </a:bodyPr>
+          <a:lstStyle/>
+          <a:p>
+            <a:pPr indent="450215" algn="just">
+              <a:lnSpc>
+                <a:spcPct val="150000"/>
+              </a:lnSpc>
+              <a:spcAft>
+                <a:spcPts val="800"/>
+              </a:spcAft>
+            </a:pPr>
+            <a:r>
+              <a:rPr lang="ru-RU" sz="1800" dirty="0">
+                <a:effectLst/>
+                <a:latin typeface="Times New Roman" panose="02020603050405020304" pitchFamily="18" charset="0"/>
+                <a:ea typeface="Times New Roman" panose="02020603050405020304" pitchFamily="18" charset="0"/>
+              </a:rPr>
+              <a:t>1. Задать размеры области размещения объектов</a:t>
+            </a:r>
+          </a:p>
+          <a:p>
+            <a:pPr indent="450215" algn="just">
+              <a:lnSpc>
+                <a:spcPct val="150000"/>
+              </a:lnSpc>
+              <a:spcAft>
+                <a:spcPts val="800"/>
+              </a:spcAft>
+            </a:pPr>
+            <a:r>
+              <a:rPr lang="ru-RU" sz="1800" dirty="0">
+                <a:effectLst/>
+                <a:latin typeface="Times New Roman" panose="02020603050405020304" pitchFamily="18" charset="0"/>
+                <a:ea typeface="Times New Roman" panose="02020603050405020304" pitchFamily="18" charset="0"/>
+              </a:rPr>
+              <a:t>2. Разместить объекты сцены</a:t>
+            </a:r>
+          </a:p>
+          <a:p>
+            <a:pPr indent="450215" algn="just">
+              <a:lnSpc>
+                <a:spcPct val="150000"/>
+              </a:lnSpc>
+              <a:spcAft>
+                <a:spcPts val="800"/>
+              </a:spcAft>
+            </a:pPr>
+            <a:r>
+              <a:rPr lang="ru-RU" sz="1800" dirty="0">
+                <a:effectLst/>
+                <a:latin typeface="Times New Roman" panose="02020603050405020304" pitchFamily="18" charset="0"/>
+                <a:ea typeface="Times New Roman" panose="02020603050405020304" pitchFamily="18" charset="0"/>
+              </a:rPr>
+              <a:t>3. Определить падающие</a:t>
+            </a:r>
+            <a:r>
+              <a:rPr lang="en-US" sz="1800" dirty="0">
+                <a:effectLst/>
+                <a:latin typeface="Times New Roman" panose="02020603050405020304" pitchFamily="18" charset="0"/>
+                <a:ea typeface="Times New Roman" panose="02020603050405020304" pitchFamily="18" charset="0"/>
+              </a:rPr>
+              <a:t> </a:t>
+            </a:r>
+            <a:r>
+              <a:rPr lang="ru-RU" sz="1800" dirty="0">
+                <a:effectLst/>
+                <a:latin typeface="Times New Roman" panose="02020603050405020304" pitchFamily="18" charset="0"/>
+                <a:ea typeface="Times New Roman" panose="02020603050405020304" pitchFamily="18" charset="0"/>
+              </a:rPr>
+              <a:t>от</a:t>
+            </a:r>
+            <a:r>
+              <a:rPr lang="en-US" sz="1800" dirty="0">
+                <a:effectLst/>
+                <a:latin typeface="Times New Roman" panose="02020603050405020304" pitchFamily="18" charset="0"/>
+                <a:ea typeface="Times New Roman" panose="02020603050405020304" pitchFamily="18" charset="0"/>
+              </a:rPr>
+              <a:t> </a:t>
+            </a:r>
+            <a:r>
+              <a:rPr lang="ru-RU" sz="1800" dirty="0">
+                <a:effectLst/>
+                <a:latin typeface="Times New Roman" panose="02020603050405020304" pitchFamily="18" charset="0"/>
+                <a:ea typeface="Times New Roman" panose="02020603050405020304" pitchFamily="18" charset="0"/>
+              </a:rPr>
+              <a:t>объектов тени и визуализировать обстановку сцены</a:t>
+            </a:r>
+          </a:p>
+        </p:txBody>
+      </p:sp>
+    </p:spTree>
+    <p:extLst>
+      <p:ext uri="{BB962C8B-B14F-4D97-AF65-F5344CB8AC3E}">
+        <p14:creationId xmlns:p14="http://schemas.microsoft.com/office/powerpoint/2010/main" val="4248898742"/>
+      </p:ext>
+    </p:extLst>
+  </p:cSld>
+  <p:clrMapOvr>
+    <a:masterClrMapping/>
+  </p:clrMapOvr>
+</p:sld>
+</file>
+
+<file path=ppt/slides/slide7.xml><?xml version="1.0" encoding="utf-8"?>
+<p:sld xmlns:a="http://schemas.openxmlformats.org/drawingml/2006/main" xmlns:r="http://schemas.openxmlformats.org/officeDocument/2006/relationships" xmlns:p="http://schemas.openxmlformats.org/presentationml/2006/main">
+  <p:cSld>
+    <p:spTree>
+      <p:nvGrpSpPr>
+        <p:cNvPr id="1" name=""/>
+        <p:cNvGrpSpPr/>
+        <p:nvPr/>
+      </p:nvGrpSpPr>
+      <p:grpSpPr>
+        <a:xfrm>
+          <a:off x="0" y="0"/>
+          <a:ext cx="0" cy="0"/>
+          <a:chOff x="0" y="0"/>
+          <a:chExt cx="0" cy="0"/>
+        </a:xfrm>
+      </p:grpSpPr>
+      <p:sp>
+        <p:nvSpPr>
+          <p:cNvPr id="2" name="Заголовок 1">
+            <a:extLst>
+              <a:ext uri="{FF2B5EF4-FFF2-40B4-BE49-F238E27FC236}">
                 <a16:creationId xmlns:a16="http://schemas.microsoft.com/office/drawing/2014/main" id="{8C1D12B2-4132-4D0B-A9F8-30D5B8F337DC}"/>
               </a:ext>
             </a:extLst>
@@ -9262,8 +9697,8 @@
           </a:p>
         </p:txBody>
       </p:sp>
-      <mc:AlternateContent xmlns:mc="http://schemas.openxmlformats.org/markup-compatibility/2006" xmlns:a14="http://schemas.microsoft.com/office/drawing/2010/main">
-        <mc:Choice Requires="a14">
+      <mc:AlternateContent xmlns:mc="http://schemas.openxmlformats.org/markup-compatibility/2006">
+        <mc:Choice xmlns:a14="http://schemas.microsoft.com/office/drawing/2010/main" Requires="a14">
           <p:sp>
             <p:nvSpPr>
               <p:cNvPr id="4" name="TextBox 3">
@@ -9279,7 +9714,7 @@
             <p:spPr>
               <a:xfrm>
                 <a:off x="1036320" y="1737360"/>
-                <a:ext cx="9970347" cy="3328988"/>
+                <a:ext cx="10119360" cy="4065857"/>
               </a:xfrm>
               <a:prstGeom prst="rect">
                 <a:avLst/>
@@ -9298,7 +9733,7 @@
                   </a:spcAft>
                 </a:pPr>
                 <a:r>
-                  <a:rPr lang="ru-RU" sz="1800" dirty="0">
+                  <a:rPr lang="ru-RU" sz="2400" dirty="0">
                     <a:effectLst/>
                     <a:latin typeface="Times New Roman" panose="02020603050405020304" pitchFamily="18" charset="0"/>
                     <a:ea typeface="Times New Roman" panose="02020603050405020304" pitchFamily="18" charset="0"/>
@@ -9313,7 +9748,7 @@
                   </a:spcAft>
                 </a:pPr>
                 <a:r>
-                  <a:rPr lang="ru-RU" sz="1800" dirty="0">
+                  <a:rPr lang="ru-RU" sz="2400" dirty="0">
                     <a:effectLst/>
                     <a:latin typeface="Times New Roman" panose="02020603050405020304" pitchFamily="18" charset="0"/>
                     <a:ea typeface="Times New Roman" panose="02020603050405020304" pitchFamily="18" charset="0"/>
@@ -9321,7 +9756,7 @@
                   <a:t>2. Инициализировать </a:t>
                 </a:r>
                 <a:r>
-                  <a:rPr lang="en-US" sz="1800" dirty="0">
+                  <a:rPr lang="en-US" sz="2400" dirty="0">
                     <a:effectLst/>
                     <a:latin typeface="Times New Roman" panose="02020603050405020304" pitchFamily="18" charset="0"/>
                     <a:ea typeface="Times New Roman" panose="02020603050405020304" pitchFamily="18" charset="0"/>
@@ -9329,7 +9764,7 @@
                   <a:t>z</a:t>
                 </a:r>
                 <a:r>
-                  <a:rPr lang="ru-RU" sz="1800" dirty="0">
+                  <a:rPr lang="ru-RU" sz="2400" dirty="0">
                     <a:effectLst/>
                     <a:latin typeface="Times New Roman" panose="02020603050405020304" pitchFamily="18" charset="0"/>
                     <a:ea typeface="Times New Roman" panose="02020603050405020304" pitchFamily="18" charset="0"/>
@@ -9344,7 +9779,7 @@
                   </a:spcAft>
                 </a:pPr>
                 <a:r>
-                  <a:rPr lang="ru-RU" sz="1800" dirty="0">
+                  <a:rPr lang="ru-RU" sz="2400" dirty="0">
                     <a:effectLst/>
                     <a:latin typeface="Times New Roman" panose="02020603050405020304" pitchFamily="18" charset="0"/>
                     <a:ea typeface="Times New Roman" panose="02020603050405020304" pitchFamily="18" charset="0"/>
@@ -9359,73 +9794,33 @@
                   </a:spcAft>
                 </a:pPr>
                 <a:r>
-                  <a:rPr lang="ru-RU" dirty="0">
+                  <a:rPr lang="ru-RU" sz="2400" dirty="0">
                     <a:latin typeface="Times New Roman" panose="02020603050405020304" pitchFamily="18" charset="0"/>
                     <a:ea typeface="Times New Roman" panose="02020603050405020304" pitchFamily="18" charset="0"/>
                   </a:rPr>
                   <a:t>		</a:t>
                 </a:r>
                 <a:r>
-                  <a:rPr lang="ru-RU" sz="1800" dirty="0">
+                  <a:rPr lang="ru-RU" sz="2400" dirty="0">
                     <a:effectLst/>
                     <a:latin typeface="Times New Roman" panose="02020603050405020304" pitchFamily="18" charset="0"/>
                     <a:ea typeface="Times New Roman" panose="02020603050405020304" pitchFamily="18" charset="0"/>
                   </a:rPr>
-                  <a:t>3.1 Для каждого пикселя, который принадлежит многоугольнику вычислить 	его 				глубину </a:t>
+                  <a:t>3.1 Для каждого пикселя, который принадлежит многоугольнику 			вычислить его глубину </a:t>
                 </a:r>
                 <a14:m>
                   <m:oMath xmlns:m="http://schemas.openxmlformats.org/officeDocument/2006/math">
                     <m:r>
-                      <a:rPr lang="en-US" sz="1800" i="1">
+                      <a:rPr lang="en-US" sz="2400" i="1">
                         <a:effectLst/>
                         <a:latin typeface="Cambria Math" panose="02040503050406030204" pitchFamily="18" charset="0"/>
                         <a:ea typeface="Times New Roman" panose="02020603050405020304" pitchFamily="18" charset="0"/>
                       </a:rPr>
                       <m:t>𝑧</m:t>
                     </m:r>
-                    <m:r>
-                      <a:rPr lang="ru-RU" sz="1800" i="1">
-                        <a:effectLst/>
-                        <a:latin typeface="Cambria Math" panose="02040503050406030204" pitchFamily="18" charset="0"/>
-                        <a:ea typeface="Times New Roman" panose="02020603050405020304" pitchFamily="18" charset="0"/>
-                      </a:rPr>
-                      <m:t>(</m:t>
-                    </m:r>
-                    <m:r>
-                      <a:rPr lang="en-US" sz="1800" i="1">
-                        <a:effectLst/>
-                        <a:latin typeface="Cambria Math" panose="02040503050406030204" pitchFamily="18" charset="0"/>
-                        <a:ea typeface="Times New Roman" panose="02020603050405020304" pitchFamily="18" charset="0"/>
-                      </a:rPr>
-                      <m:t>𝑥</m:t>
-                    </m:r>
-                    <m:r>
-                      <a:rPr lang="ru-RU" sz="1800" i="1">
-                        <a:effectLst/>
-                        <a:latin typeface="Cambria Math" panose="02040503050406030204" pitchFamily="18" charset="0"/>
-                        <a:ea typeface="Times New Roman" panose="02020603050405020304" pitchFamily="18" charset="0"/>
-                      </a:rPr>
-                      <m:t>, </m:t>
-                    </m:r>
-                    <m:r>
-                      <a:rPr lang="en-US" sz="1800" i="1">
-                        <a:effectLst/>
-                        <a:latin typeface="Cambria Math" panose="02040503050406030204" pitchFamily="18" charset="0"/>
-                        <a:ea typeface="Times New Roman" panose="02020603050405020304" pitchFamily="18" charset="0"/>
-                      </a:rPr>
-                      <m:t>𝑦</m:t>
-                    </m:r>
-                    <m:r>
-                      <a:rPr lang="ru-RU" sz="1800" i="1">
-                        <a:effectLst/>
-                        <a:latin typeface="Cambria Math" panose="02040503050406030204" pitchFamily="18" charset="0"/>
-                        <a:ea typeface="Times New Roman" panose="02020603050405020304" pitchFamily="18" charset="0"/>
-                      </a:rPr>
-                      <m:t>)</m:t>
-                    </m:r>
                   </m:oMath>
                 </a14:m>
-                <a:endParaRPr lang="ru-RU" sz="1800" dirty="0">
+                <a:endParaRPr lang="ru-RU" sz="2400" dirty="0">
                   <a:effectLst/>
                   <a:latin typeface="Times New Roman" panose="02020603050405020304" pitchFamily="18" charset="0"/>
                   <a:ea typeface="Times New Roman" panose="02020603050405020304" pitchFamily="18" charset="0"/>
@@ -9438,7 +9833,7 @@
                   </a:spcAft>
                 </a:pPr>
                 <a:r>
-                  <a:rPr lang="ru-RU" sz="1800" i="1" dirty="0">
+                  <a:rPr lang="ru-RU" sz="2400" i="1" dirty="0">
                     <a:effectLst/>
                     <a:latin typeface="Times New Roman" panose="02020603050405020304" pitchFamily="18" charset="0"/>
                     <a:ea typeface="Times New Roman" panose="02020603050405020304" pitchFamily="18" charset="0"/>
@@ -9446,38 +9841,30 @@
                   <a:t>		</a:t>
                 </a:r>
                 <a:r>
-                  <a:rPr lang="ru-RU" sz="1800" dirty="0">
+                  <a:rPr lang="ru-RU" sz="2400" dirty="0">
                     <a:effectLst/>
                     <a:latin typeface="Times New Roman" panose="02020603050405020304" pitchFamily="18" charset="0"/>
                     <a:ea typeface="Times New Roman" panose="02020603050405020304" pitchFamily="18" charset="0"/>
                   </a:rPr>
-                  <a:t>3.2 Сравнить вычисленную глубину пикселя со значением, которое </a:t>
+                  <a:t>3.2 Сравнить вычисленную глубину со значением, которое </a:t>
                 </a:r>
-              </a:p>
-              <a:p>
-                <a:pPr indent="450215" algn="just">
-                  <a:spcAft>
-                    <a:spcPts val="800"/>
-                  </a:spcAft>
-                  <a:tabLst>
-                    <a:tab pos="449580" algn="l"/>
-                    <a:tab pos="899160" algn="l"/>
-                    <a:tab pos="1348740" algn="l"/>
-                    <a:tab pos="1798320" algn="l"/>
-                    <a:tab pos="2247900" algn="l"/>
-                    <a:tab pos="3284855" algn="ctr"/>
-                  </a:tabLst>
-                </a:pPr>
                 <a:r>
-                  <a:rPr lang="ru-RU" sz="1800" dirty="0">
+                  <a:rPr lang="ru-RU" sz="2400" dirty="0">
+                    <a:latin typeface="Times New Roman" panose="02020603050405020304" pitchFamily="18" charset="0"/>
+                    <a:ea typeface="Times New Roman" panose="02020603050405020304" pitchFamily="18" charset="0"/>
+                  </a:rPr>
+                  <a:t>					</a:t>
+                </a:r>
+                <a:r>
+                  <a:rPr lang="ru-RU" sz="2400" dirty="0">
                     <a:effectLst/>
                     <a:latin typeface="Times New Roman" panose="02020603050405020304" pitchFamily="18" charset="0"/>
                     <a:ea typeface="Times New Roman" panose="02020603050405020304" pitchFamily="18" charset="0"/>
                   </a:rPr>
-                  <a:t>	находится в </a:t>
+                  <a:t>находится в </a:t>
                 </a:r>
                 <a:r>
-                  <a:rPr lang="en-US" sz="1800" dirty="0">
+                  <a:rPr lang="en-US" sz="2400" dirty="0">
                     <a:effectLst/>
                     <a:latin typeface="Times New Roman" panose="02020603050405020304" pitchFamily="18" charset="0"/>
                     <a:ea typeface="Times New Roman" panose="02020603050405020304" pitchFamily="18" charset="0"/>
@@ -9485,7 +9872,7 @@
                   <a:t>z</a:t>
                 </a:r>
                 <a:r>
-                  <a:rPr lang="ru-RU" sz="1800" dirty="0">
+                  <a:rPr lang="ru-RU" sz="2400" dirty="0">
                     <a:effectLst/>
                     <a:latin typeface="Times New Roman" panose="02020603050405020304" pitchFamily="18" charset="0"/>
                     <a:ea typeface="Times New Roman" panose="02020603050405020304" pitchFamily="18" charset="0"/>
@@ -9500,7 +9887,7 @@
                   </a:spcAft>
                 </a:pPr>
                 <a:r>
-                  <a:rPr lang="ru-RU" sz="1800" dirty="0">
+                  <a:rPr lang="ru-RU" sz="2400" dirty="0">
                     <a:effectLst/>
                     <a:latin typeface="Times New Roman" panose="02020603050405020304" pitchFamily="18" charset="0"/>
                     <a:ea typeface="Times New Roman" panose="02020603050405020304" pitchFamily="18" charset="0"/>
@@ -9510,52 +9897,15 @@
                 <a14:m>
                   <m:oMath xmlns:m="http://schemas.openxmlformats.org/officeDocument/2006/math">
                     <m:r>
-                      <a:rPr lang="ru-RU" sz="1800" i="1">
+                      <a:rPr lang="ru-RU" sz="2400" i="1">
                         <a:effectLst/>
                         <a:latin typeface="Cambria Math" panose="02040503050406030204" pitchFamily="18" charset="0"/>
                         <a:ea typeface="Times New Roman" panose="02020603050405020304" pitchFamily="18" charset="0"/>
                       </a:rPr>
                       <m:t>𝑧</m:t>
                     </m:r>
-                    <m:d>
-                      <m:dPr>
-                        <m:ctrlPr>
-                          <a:rPr lang="ru-RU" sz="1800" i="1">
-                            <a:effectLst/>
-                            <a:latin typeface="Cambria Math" panose="02040503050406030204" pitchFamily="18" charset="0"/>
-                            <a:ea typeface="Times New Roman" panose="02020603050405020304" pitchFamily="18" charset="0"/>
-                          </a:rPr>
-                        </m:ctrlPr>
-                      </m:dPr>
-                      <m:e>
-                        <m:r>
-                          <a:rPr lang="ru-RU" sz="1800" i="1">
-                            <a:effectLst/>
-                            <a:latin typeface="Cambria Math" panose="02040503050406030204" pitchFamily="18" charset="0"/>
-                            <a:ea typeface="Times New Roman" panose="02020603050405020304" pitchFamily="18" charset="0"/>
-                          </a:rPr>
-                          <m:t>𝑥</m:t>
-                        </m:r>
-                        <m:r>
-                          <a:rPr lang="ru-RU" sz="1800" i="1">
-                            <a:effectLst/>
-                            <a:latin typeface="Cambria Math" panose="02040503050406030204" pitchFamily="18" charset="0"/>
-                            <a:ea typeface="Times New Roman" panose="02020603050405020304" pitchFamily="18" charset="0"/>
-                          </a:rPr>
-                          <m:t>, </m:t>
-                        </m:r>
-                        <m:r>
-                          <a:rPr lang="ru-RU" sz="1800" i="1">
-                            <a:effectLst/>
-                            <a:latin typeface="Cambria Math" panose="02040503050406030204" pitchFamily="18" charset="0"/>
-                            <a:ea typeface="Times New Roman" panose="02020603050405020304" pitchFamily="18" charset="0"/>
-                          </a:rPr>
-                          <m:t>𝑦</m:t>
-                        </m:r>
-                      </m:e>
-                    </m:d>
                     <m:r>
-                      <a:rPr lang="ru-RU" sz="1800" i="1">
+                      <a:rPr lang="ru-RU" sz="2400" i="1">
                         <a:effectLst/>
                         <a:latin typeface="Cambria Math" panose="02040503050406030204" pitchFamily="18" charset="0"/>
                         <a:ea typeface="Times New Roman" panose="02020603050405020304" pitchFamily="18" charset="0"/>
@@ -9565,7 +9915,7 @@
                     <m:sSub>
                       <m:sSubPr>
                         <m:ctrlPr>
-                          <a:rPr lang="ru-RU" sz="1800" i="1">
+                          <a:rPr lang="ru-RU" sz="2400" i="1">
                             <a:effectLst/>
                             <a:latin typeface="Cambria Math" panose="02040503050406030204" pitchFamily="18" charset="0"/>
                             <a:ea typeface="Times New Roman" panose="02020603050405020304" pitchFamily="18" charset="0"/>
@@ -9574,7 +9924,7 @@
                       </m:sSubPr>
                       <m:e>
                         <m:r>
-                          <a:rPr lang="ru-RU" sz="1800" i="1">
+                          <a:rPr lang="ru-RU" sz="2400" i="1">
                             <a:effectLst/>
                             <a:latin typeface="Cambria Math" panose="02040503050406030204" pitchFamily="18" charset="0"/>
                             <a:ea typeface="Times New Roman" panose="02020603050405020304" pitchFamily="18" charset="0"/>
@@ -9584,7 +9934,7 @@
                       </m:e>
                       <m:sub>
                         <m:r>
-                          <a:rPr lang="ru-RU" sz="1800" i="1">
+                          <a:rPr lang="ru-RU" sz="2400" i="1">
                             <a:effectLst/>
                             <a:latin typeface="Cambria Math" panose="02040503050406030204" pitchFamily="18" charset="0"/>
                             <a:ea typeface="Times New Roman" panose="02020603050405020304" pitchFamily="18" charset="0"/>
@@ -9593,50 +9943,10 @@
                         </m:r>
                       </m:sub>
                     </m:sSub>
-                    <m:r>
-                      <a:rPr lang="ru-RU" sz="1800" i="1">
-                        <a:effectLst/>
-                        <a:latin typeface="Cambria Math" panose="02040503050406030204" pitchFamily="18" charset="0"/>
-                        <a:ea typeface="Times New Roman" panose="02020603050405020304" pitchFamily="18" charset="0"/>
-                      </a:rPr>
-                      <m:t>(</m:t>
-                    </m:r>
-                    <m:r>
-                      <a:rPr lang="en-US" sz="1800" i="1">
-                        <a:effectLst/>
-                        <a:latin typeface="Cambria Math" panose="02040503050406030204" pitchFamily="18" charset="0"/>
-                        <a:ea typeface="Times New Roman" panose="02020603050405020304" pitchFamily="18" charset="0"/>
-                      </a:rPr>
-                      <m:t>𝑥</m:t>
-                    </m:r>
-                    <m:r>
-                      <a:rPr lang="ru-RU" sz="1800" i="1">
-                        <a:effectLst/>
-                        <a:latin typeface="Cambria Math" panose="02040503050406030204" pitchFamily="18" charset="0"/>
-                        <a:ea typeface="Times New Roman" panose="02020603050405020304" pitchFamily="18" charset="0"/>
-                      </a:rPr>
-                      <m:t>,</m:t>
-                    </m:r>
-                    <m:r>
-                      <a:rPr lang="en-US" sz="1800" i="1">
-                        <a:effectLst/>
-                        <a:latin typeface="Cambria Math" panose="02040503050406030204" pitchFamily="18" charset="0"/>
-                        <a:ea typeface="Times New Roman" panose="02020603050405020304" pitchFamily="18" charset="0"/>
-                      </a:rPr>
-                      <m:t>𝑦</m:t>
-                    </m:r>
-                    <m:r>
-                      <a:rPr lang="ru-RU" sz="1800" i="1">
-                        <a:effectLst/>
-                        <a:latin typeface="Cambria Math" panose="02040503050406030204" pitchFamily="18" charset="0"/>
-                        <a:ea typeface="Times New Roman" panose="02020603050405020304" pitchFamily="18" charset="0"/>
-                      </a:rPr>
-                      <m:t>)</m:t>
-                    </m:r>
                   </m:oMath>
                 </a14:m>
                 <a:r>
-                  <a:rPr lang="ru-RU" sz="1800" dirty="0">
+                  <a:rPr lang="ru-RU" sz="2400" dirty="0">
                     <a:effectLst/>
                     <a:latin typeface="Times New Roman" panose="02020603050405020304" pitchFamily="18" charset="0"/>
                     <a:ea typeface="Times New Roman" panose="02020603050405020304" pitchFamily="18" charset="0"/>
@@ -9648,7 +9958,7 @@
                     <m:sSub>
                       <m:sSubPr>
                         <m:ctrlPr>
-                          <a:rPr lang="ru-RU" sz="1800" i="1">
+                          <a:rPr lang="ru-RU" sz="2400" i="1">
                             <a:effectLst/>
                             <a:latin typeface="Cambria Math" panose="02040503050406030204" pitchFamily="18" charset="0"/>
                             <a:ea typeface="Times New Roman" panose="02020603050405020304" pitchFamily="18" charset="0"/>
@@ -9657,7 +9967,7 @@
                       </m:sSubPr>
                       <m:e>
                         <m:r>
-                          <a:rPr lang="ru-RU" sz="1800" i="1">
+                          <a:rPr lang="ru-RU" sz="2400" i="1">
                             <a:effectLst/>
                             <a:latin typeface="Cambria Math" panose="02040503050406030204" pitchFamily="18" charset="0"/>
                             <a:ea typeface="Times New Roman" panose="02020603050405020304" pitchFamily="18" charset="0"/>
@@ -9667,7 +9977,7 @@
                       </m:e>
                       <m:sub>
                         <m:r>
-                          <a:rPr lang="ru-RU" sz="1800" i="1">
+                          <a:rPr lang="ru-RU" sz="2400" i="1">
                             <a:effectLst/>
                             <a:latin typeface="Cambria Math" panose="02040503050406030204" pitchFamily="18" charset="0"/>
                             <a:ea typeface="Times New Roman" panose="02020603050405020304" pitchFamily="18" charset="0"/>
@@ -9676,45 +9986,8 @@
                         </m:r>
                       </m:sub>
                     </m:sSub>
-                    <m:d>
-                      <m:dPr>
-                        <m:ctrlPr>
-                          <a:rPr lang="ru-RU" sz="1800" i="1">
-                            <a:effectLst/>
-                            <a:latin typeface="Cambria Math" panose="02040503050406030204" pitchFamily="18" charset="0"/>
-                            <a:ea typeface="Times New Roman" panose="02020603050405020304" pitchFamily="18" charset="0"/>
-                          </a:rPr>
-                        </m:ctrlPr>
-                      </m:dPr>
-                      <m:e>
-                        <m:r>
-                          <a:rPr lang="en-US" sz="1800" i="1">
-                            <a:effectLst/>
-                            <a:latin typeface="Cambria Math" panose="02040503050406030204" pitchFamily="18" charset="0"/>
-                            <a:ea typeface="Times New Roman" panose="02020603050405020304" pitchFamily="18" charset="0"/>
-                          </a:rPr>
-                          <m:t>𝑥</m:t>
-                        </m:r>
-                        <m:r>
-                          <a:rPr lang="ru-RU" sz="1800" i="1">
-                            <a:effectLst/>
-                            <a:latin typeface="Cambria Math" panose="02040503050406030204" pitchFamily="18" charset="0"/>
-                            <a:ea typeface="Times New Roman" panose="02020603050405020304" pitchFamily="18" charset="0"/>
-                          </a:rPr>
-                          <m:t>,</m:t>
-                        </m:r>
-                        <m:r>
-                          <a:rPr lang="en-US" sz="1800" i="1">
-                            <a:effectLst/>
-                            <a:latin typeface="Cambria Math" panose="02040503050406030204" pitchFamily="18" charset="0"/>
-                            <a:ea typeface="Times New Roman" panose="02020603050405020304" pitchFamily="18" charset="0"/>
-                          </a:rPr>
-                          <m:t>𝑦</m:t>
-                        </m:r>
-                      </m:e>
-                    </m:d>
                     <m:r>
-                      <a:rPr lang="ru-RU" sz="1800" i="1">
+                      <a:rPr lang="ru-RU" sz="2400" b="0" i="1" smtClean="0">
                         <a:effectLst/>
                         <a:latin typeface="Cambria Math" panose="02040503050406030204" pitchFamily="18" charset="0"/>
                         <a:ea typeface="Times New Roman" panose="02020603050405020304" pitchFamily="18" charset="0"/>
@@ -9722,112 +9995,43 @@
                       <m:t>=</m:t>
                     </m:r>
                     <m:r>
-                      <a:rPr lang="en-US" sz="1800" i="1">
+                      <a:rPr lang="en-US" sz="2400" i="1">
                         <a:effectLst/>
                         <a:latin typeface="Cambria Math" panose="02040503050406030204" pitchFamily="18" charset="0"/>
                         <a:ea typeface="Times New Roman" panose="02020603050405020304" pitchFamily="18" charset="0"/>
                       </a:rPr>
                       <m:t>𝑧</m:t>
                     </m:r>
-                    <m:r>
-                      <a:rPr lang="ru-RU" sz="1800" i="1">
-                        <a:effectLst/>
-                        <a:latin typeface="Cambria Math" panose="02040503050406030204" pitchFamily="18" charset="0"/>
-                        <a:ea typeface="Times New Roman" panose="02020603050405020304" pitchFamily="18" charset="0"/>
-                      </a:rPr>
-                      <m:t>(</m:t>
-                    </m:r>
-                    <m:r>
-                      <a:rPr lang="en-US" sz="1800" i="1">
-                        <a:effectLst/>
-                        <a:latin typeface="Cambria Math" panose="02040503050406030204" pitchFamily="18" charset="0"/>
-                        <a:ea typeface="Times New Roman" panose="02020603050405020304" pitchFamily="18" charset="0"/>
-                      </a:rPr>
-                      <m:t>𝑥</m:t>
-                    </m:r>
-                    <m:r>
-                      <a:rPr lang="ru-RU" sz="1800" i="1">
-                        <a:effectLst/>
-                        <a:latin typeface="Cambria Math" panose="02040503050406030204" pitchFamily="18" charset="0"/>
-                        <a:ea typeface="Times New Roman" panose="02020603050405020304" pitchFamily="18" charset="0"/>
-                      </a:rPr>
-                      <m:t>,</m:t>
-                    </m:r>
-                    <m:r>
-                      <a:rPr lang="en-US" sz="1800" i="1">
-                        <a:effectLst/>
-                        <a:latin typeface="Cambria Math" panose="02040503050406030204" pitchFamily="18" charset="0"/>
-                        <a:ea typeface="Times New Roman" panose="02020603050405020304" pitchFamily="18" charset="0"/>
-                      </a:rPr>
-                      <m:t>𝑦</m:t>
-                    </m:r>
-                    <m:r>
-                      <a:rPr lang="ru-RU" sz="1800" i="1">
-                        <a:effectLst/>
-                        <a:latin typeface="Cambria Math" panose="02040503050406030204" pitchFamily="18" charset="0"/>
-                        <a:ea typeface="Times New Roman" panose="02020603050405020304" pitchFamily="18" charset="0"/>
-                      </a:rPr>
-                      <m:t>)</m:t>
-                    </m:r>
                   </m:oMath>
                 </a14:m>
                 <a:r>
-                  <a:rPr lang="ru-RU" sz="1800" dirty="0">
+                  <a:rPr lang="ru-RU" sz="2400" dirty="0">
                     <a:effectLst/>
                     <a:latin typeface="Times New Roman" panose="02020603050405020304" pitchFamily="18" charset="0"/>
                     <a:ea typeface="Times New Roman" panose="02020603050405020304" pitchFamily="18" charset="0"/>
                   </a:rPr>
-                  <a:t> и 	</a:t>
+                  <a:t> и </a:t>
                 </a:r>
                 <a14:m>
                   <m:oMath xmlns:m="http://schemas.openxmlformats.org/officeDocument/2006/math">
                     <m:r>
-                      <a:rPr lang="ru-RU" sz="1800" i="1">
+                      <a:rPr lang="ru-RU" sz="2400" i="1">
                         <a:effectLst/>
                         <a:latin typeface="Cambria Math" panose="02040503050406030204" pitchFamily="18" charset="0"/>
                         <a:ea typeface="Times New Roman" panose="02020603050405020304" pitchFamily="18" charset="0"/>
                       </a:rPr>
                       <m:t>цвет</m:t>
                     </m:r>
-                    <m:d>
-                      <m:dPr>
-                        <m:ctrlPr>
-                          <a:rPr lang="ru-RU" sz="1800" i="1">
-                            <a:effectLst/>
-                            <a:latin typeface="Cambria Math" panose="02040503050406030204" pitchFamily="18" charset="0"/>
-                            <a:ea typeface="Times New Roman" panose="02020603050405020304" pitchFamily="18" charset="0"/>
-                          </a:rPr>
-                        </m:ctrlPr>
-                      </m:dPr>
-                      <m:e>
-                        <m:r>
-                          <a:rPr lang="en-US" sz="1800" i="1">
-                            <a:effectLst/>
-                            <a:latin typeface="Cambria Math" panose="02040503050406030204" pitchFamily="18" charset="0"/>
-                            <a:ea typeface="Times New Roman" panose="02020603050405020304" pitchFamily="18" charset="0"/>
-                          </a:rPr>
-                          <m:t>𝑥</m:t>
-                        </m:r>
-                        <m:r>
-                          <a:rPr lang="ru-RU" sz="1800" i="1">
-                            <a:effectLst/>
-                            <a:latin typeface="Cambria Math" panose="02040503050406030204" pitchFamily="18" charset="0"/>
-                            <a:ea typeface="Times New Roman" panose="02020603050405020304" pitchFamily="18" charset="0"/>
-                          </a:rPr>
-                          <m:t>,</m:t>
-                        </m:r>
-                        <m:r>
-                          <a:rPr lang="en-US" sz="1800" i="1">
-                            <a:effectLst/>
-                            <a:latin typeface="Cambria Math" panose="02040503050406030204" pitchFamily="18" charset="0"/>
-                            <a:ea typeface="Times New Roman" panose="02020603050405020304" pitchFamily="18" charset="0"/>
-                          </a:rPr>
-                          <m:t>𝑦</m:t>
-                        </m:r>
-                      </m:e>
-                    </m:d>
                     <m:r>
-                      <a:rPr lang="ru-RU" sz="1800" i="1">
+                      <a:rPr lang="ru-RU" sz="2400" b="0" i="1" smtClean="0">
+                        <a:effectLst/>
+                        <a:latin typeface="Cambria Math" panose="02040503050406030204" pitchFamily="18" charset="0"/>
+                        <a:ea typeface="Times New Roman" panose="02020603050405020304" pitchFamily="18" charset="0"/>
+                      </a:rPr>
+                      <m:t> пикселя</m:t>
+                    </m:r>
+                    <m:r>
+                      <a:rPr lang="ru-RU" sz="2400" i="1">
                         <a:effectLst/>
                         <a:latin typeface="Cambria Math" panose="02040503050406030204" pitchFamily="18" charset="0"/>
                         <a:ea typeface="Times New Roman" panose="02020603050405020304" pitchFamily="18" charset="0"/>
@@ -9836,7 +10040,7 @@
                     </m:r>
                   </m:oMath>
                 </a14:m>
-                <a:endParaRPr lang="ru-RU" sz="1800" dirty="0">
+                <a:endParaRPr lang="ru-RU" sz="2400" dirty="0">
                   <a:effectLst/>
                   <a:latin typeface="Times New Roman" panose="02020603050405020304" pitchFamily="18" charset="0"/>
                   <a:ea typeface="Times New Roman" panose="02020603050405020304" pitchFamily="18" charset="0"/>
@@ -9849,7 +10053,7 @@
                   </a:spcAft>
                 </a:pPr>
                 <a:r>
-                  <a:rPr lang="ru-RU" sz="1800" dirty="0">
+                  <a:rPr lang="ru-RU" sz="2400" dirty="0">
                     <a:effectLst/>
                     <a:latin typeface="Times New Roman" panose="02020603050405020304" pitchFamily="18" charset="0"/>
                     <a:ea typeface="Times New Roman" panose="02020603050405020304" pitchFamily="18" charset="0"/>
@@ -9860,7 +10064,7 @@
             </p:txBody>
           </p:sp>
         </mc:Choice>
-        <mc:Fallback xmlns="">
+        <mc:Fallback>
           <p:sp>
             <p:nvSpPr>
               <p:cNvPr id="4" name="TextBox 3">
@@ -9878,7 +10082,7 @@
             <p:spPr>
               <a:xfrm>
                 <a:off x="1036320" y="1737360"/>
-                <a:ext cx="9970347" cy="3328988"/>
+                <a:ext cx="10119360" cy="4065857"/>
               </a:xfrm>
               <a:prstGeom prst="rect">
                 <a:avLst/>
@@ -9886,7 +10090,7 @@
               <a:blipFill>
                 <a:blip r:embed="rId2"/>
                 <a:stretch>
-                  <a:fillRect t="-916" b="-2015"/>
+                  <a:fillRect t="-1199" b="-2549"/>
                 </a:stretch>
               </a:blipFill>
             </p:spPr>
@@ -9918,7 +10122,7 @@
 </p:sld>
 </file>
 
-<file path=ppt/slides/slide7.xml><?xml version="1.0" encoding="utf-8"?>
+<file path=ppt/slides/slide8.xml><?xml version="1.0" encoding="utf-8"?>
 <p:sld xmlns:a="http://schemas.openxmlformats.org/drawingml/2006/main" xmlns:r="http://schemas.openxmlformats.org/officeDocument/2006/relationships" xmlns:p="http://schemas.openxmlformats.org/presentationml/2006/main">
   <p:cSld>
     <p:spTree>
@@ -9980,8 +10184,8 @@
           </a:p>
         </p:txBody>
       </p:sp>
-      <mc:AlternateContent xmlns:mc="http://schemas.openxmlformats.org/markup-compatibility/2006" xmlns:a14="http://schemas.microsoft.com/office/drawing/2010/main">
-        <mc:Choice Requires="a14">
+      <mc:AlternateContent xmlns:mc="http://schemas.openxmlformats.org/markup-compatibility/2006">
+        <mc:Choice xmlns:a14="http://schemas.microsoft.com/office/drawing/2010/main" Requires="a14">
           <p:sp>
             <p:nvSpPr>
               <p:cNvPr id="4" name="TextBox 3">
@@ -10036,23 +10240,7 @@
                     <a:latin typeface="Times New Roman" panose="02020603050405020304" pitchFamily="18" charset="0"/>
                     <a:ea typeface="Times New Roman" panose="02020603050405020304" pitchFamily="18" charset="0"/>
                   </a:rPr>
-                  <a:t>		1.1 Инициализировать теневой </a:t>
-                </a:r>
-                <a:r>
-                  <a:rPr lang="en-US" sz="1800" dirty="0">
-                    <a:effectLst/>
-                    <a:latin typeface="Times New Roman" panose="02020603050405020304" pitchFamily="18" charset="0"/>
-                    <a:ea typeface="Times New Roman" panose="02020603050405020304" pitchFamily="18" charset="0"/>
-                  </a:rPr>
-                  <a:t>z</a:t>
-                </a:r>
-                <a:r>
-                  <a:rPr lang="ru-RU" sz="1800" dirty="0">
-                    <a:effectLst/>
-                    <a:latin typeface="Times New Roman" panose="02020603050405020304" pitchFamily="18" charset="0"/>
-                    <a:ea typeface="Times New Roman" panose="02020603050405020304" pitchFamily="18" charset="0"/>
-                  </a:rPr>
-                  <a:t>-буфер минимальным значением глубины</a:t>
+                  <a:t>		1.1 Инициализировать теневой буфер минимальным значением глубины</a:t>
                 </a:r>
               </a:p>
               <a:p>
@@ -10067,23 +10255,7 @@
                     <a:latin typeface="Times New Roman" panose="02020603050405020304" pitchFamily="18" charset="0"/>
                     <a:ea typeface="Times New Roman" panose="02020603050405020304" pitchFamily="18" charset="0"/>
                   </a:rPr>
-                  <a:t>		1.2 Определить теневой </a:t>
-                </a:r>
-                <a:r>
-                  <a:rPr lang="en-US" sz="1800" dirty="0">
-                    <a:effectLst/>
-                    <a:latin typeface="Times New Roman" panose="02020603050405020304" pitchFamily="18" charset="0"/>
-                    <a:ea typeface="Times New Roman" panose="02020603050405020304" pitchFamily="18" charset="0"/>
-                  </a:rPr>
-                  <a:t>z</a:t>
-                </a:r>
-                <a:r>
-                  <a:rPr lang="ru-RU" sz="1800" dirty="0">
-                    <a:effectLst/>
-                    <a:latin typeface="Times New Roman" panose="02020603050405020304" pitchFamily="18" charset="0"/>
-                    <a:ea typeface="Times New Roman" panose="02020603050405020304" pitchFamily="18" charset="0"/>
-                  </a:rPr>
-                  <a:t>-буфер для источника</a:t>
+                  <a:t>		1.2 Определить теневой буфер для источника</a:t>
                 </a:r>
               </a:p>
               <a:p>
@@ -10114,7 +10286,7 @@
                     <a:latin typeface="Times New Roman" panose="02020603050405020304" pitchFamily="18" charset="0"/>
                     <a:ea typeface="Times New Roman" panose="02020603050405020304" pitchFamily="18" charset="0"/>
                   </a:rPr>
-                  <a:t>-буфера для точки наблюдения. При этом, если некоторая поверхность 	оказалась видимой относительно текущей точки наблюдения, то проверить, видима ли данная 	точка со стороны источников света.</a:t>
+                  <a:t>-буфера для точки наблюдения. Если некоторая точка поверхности	видима относительно текущей точки наблюдения, то проверить, видима ли данная 	точка со 	стороны источников света.</a:t>
                 </a:r>
               </a:p>
               <a:p>
@@ -10381,46 +10553,6 @@
                         </m:r>
                       </m:sub>
                     </m:sSub>
-                    <m:r>
-                      <a:rPr lang="ru-RU" sz="1800" i="1">
-                        <a:effectLst/>
-                        <a:latin typeface="Cambria Math" panose="02040503050406030204" pitchFamily="18" charset="0"/>
-                        <a:ea typeface="Times New Roman" panose="02020603050405020304" pitchFamily="18" charset="0"/>
-                      </a:rPr>
-                      <m:t>(</m:t>
-                    </m:r>
-                    <m:r>
-                      <a:rPr lang="ru-RU" sz="1800" i="1">
-                        <a:effectLst/>
-                        <a:latin typeface="Cambria Math" panose="02040503050406030204" pitchFamily="18" charset="0"/>
-                        <a:ea typeface="Times New Roman" panose="02020603050405020304" pitchFamily="18" charset="0"/>
-                      </a:rPr>
-                      <m:t>𝑥</m:t>
-                    </m:r>
-                    <m:r>
-                      <a:rPr lang="ru-RU" sz="1800" i="1">
-                        <a:effectLst/>
-                        <a:latin typeface="Cambria Math" panose="02040503050406030204" pitchFamily="18" charset="0"/>
-                        <a:ea typeface="Times New Roman" panose="02020603050405020304" pitchFamily="18" charset="0"/>
-                      </a:rPr>
-                      <m:t>′,</m:t>
-                    </m:r>
-                    <m:r>
-                      <a:rPr lang="ru-RU" sz="1800" i="1">
-                        <a:effectLst/>
-                        <a:latin typeface="Cambria Math" panose="02040503050406030204" pitchFamily="18" charset="0"/>
-                        <a:ea typeface="Times New Roman" panose="02020603050405020304" pitchFamily="18" charset="0"/>
-                      </a:rPr>
-                      <m:t>𝑦</m:t>
-                    </m:r>
-                    <m:r>
-                      <a:rPr lang="ru-RU" sz="1800" i="1">
-                        <a:effectLst/>
-                        <a:latin typeface="Cambria Math" panose="02040503050406030204" pitchFamily="18" charset="0"/>
-                        <a:ea typeface="Times New Roman" panose="02020603050405020304" pitchFamily="18" charset="0"/>
-                      </a:rPr>
-                      <m:t>′)</m:t>
-                    </m:r>
                   </m:oMath>
                 </a14:m>
                 <a:r>
@@ -10447,85 +10579,7 @@
                         <a:latin typeface="Cambria Math" panose="02040503050406030204" pitchFamily="18" charset="0"/>
                         <a:ea typeface="Times New Roman" panose="02020603050405020304" pitchFamily="18" charset="0"/>
                       </a:rPr>
-                      <m:t>′(</m:t>
-                    </m:r>
-                    <m:sSup>
-                      <m:sSupPr>
-                        <m:ctrlPr>
-                          <a:rPr lang="ru-RU" sz="1800" i="1">
-                            <a:effectLst/>
-                            <a:latin typeface="Cambria Math" panose="02040503050406030204" pitchFamily="18" charset="0"/>
-                            <a:ea typeface="Times New Roman" panose="02020603050405020304" pitchFamily="18" charset="0"/>
-                          </a:rPr>
-                        </m:ctrlPr>
-                      </m:sSupPr>
-                      <m:e>
-                        <m:r>
-                          <a:rPr lang="ru-RU" sz="1800" i="1">
-                            <a:effectLst/>
-                            <a:latin typeface="Cambria Math" panose="02040503050406030204" pitchFamily="18" charset="0"/>
-                            <a:ea typeface="Times New Roman" panose="02020603050405020304" pitchFamily="18" charset="0"/>
-                          </a:rPr>
-                          <m:t>𝑥</m:t>
-                        </m:r>
-                      </m:e>
-                      <m:sup>
-                        <m:r>
-                          <a:rPr lang="ru-RU" sz="1800" i="1">
-                            <a:effectLst/>
-                            <a:latin typeface="Cambria Math" panose="02040503050406030204" pitchFamily="18" charset="0"/>
-                            <a:ea typeface="Times New Roman" panose="02020603050405020304" pitchFamily="18" charset="0"/>
-                          </a:rPr>
-                          <m:t>′</m:t>
-                        </m:r>
-                      </m:sup>
-                    </m:sSup>
-                    <m:r>
-                      <a:rPr lang="ru-RU" sz="1800" i="1">
-                        <a:effectLst/>
-                        <a:latin typeface="Cambria Math" panose="02040503050406030204" pitchFamily="18" charset="0"/>
-                        <a:ea typeface="Times New Roman" panose="02020603050405020304" pitchFamily="18" charset="0"/>
-                      </a:rPr>
-                      <m:t>,</m:t>
-                    </m:r>
-                    <m:sSup>
-                      <m:sSupPr>
-                        <m:ctrlPr>
-                          <a:rPr lang="ru-RU" sz="1800" i="1">
-                            <a:effectLst/>
-                            <a:latin typeface="Cambria Math" panose="02040503050406030204" pitchFamily="18" charset="0"/>
-                            <a:ea typeface="Times New Roman" panose="02020603050405020304" pitchFamily="18" charset="0"/>
-                          </a:rPr>
-                        </m:ctrlPr>
-                      </m:sSupPr>
-                      <m:e>
-                        <m:r>
-                          <a:rPr lang="ru-RU" sz="1800" i="1">
-                            <a:effectLst/>
-                            <a:latin typeface="Cambria Math" panose="02040503050406030204" pitchFamily="18" charset="0"/>
-                            <a:ea typeface="Times New Roman" panose="02020603050405020304" pitchFamily="18" charset="0"/>
-                          </a:rPr>
-                          <m:t>𝑦</m:t>
-                        </m:r>
-                      </m:e>
-                      <m:sup>
-                        <m:r>
-                          <a:rPr lang="ru-RU" sz="1800" i="1">
-                            <a:effectLst/>
-                            <a:latin typeface="Cambria Math" panose="02040503050406030204" pitchFamily="18" charset="0"/>
-                            <a:ea typeface="Times New Roman" panose="02020603050405020304" pitchFamily="18" charset="0"/>
-                          </a:rPr>
-                          <m:t>′</m:t>
-                        </m:r>
-                      </m:sup>
-                    </m:sSup>
-                    <m:r>
-                      <a:rPr lang="ru-RU" sz="1800" i="1">
-                        <a:effectLst/>
-                        <a:latin typeface="Cambria Math" panose="02040503050406030204" pitchFamily="18" charset="0"/>
-                        <a:ea typeface="Times New Roman" panose="02020603050405020304" pitchFamily="18" charset="0"/>
-                      </a:rPr>
-                      <m:t>)</m:t>
+                      <m:t>′</m:t>
                     </m:r>
                   </m:oMath>
                 </a14:m>
@@ -10585,89 +10639,6 @@
                         </m:r>
                       </m:sup>
                     </m:sSup>
-                    <m:d>
-                      <m:dPr>
-                        <m:ctrlPr>
-                          <a:rPr lang="ru-RU" sz="1800" i="1">
-                            <a:effectLst/>
-                            <a:latin typeface="Cambria Math" panose="02040503050406030204" pitchFamily="18" charset="0"/>
-                            <a:ea typeface="Times New Roman" panose="02020603050405020304" pitchFamily="18" charset="0"/>
-                          </a:rPr>
-                        </m:ctrlPr>
-                      </m:dPr>
-                      <m:e>
-                        <m:sSup>
-                          <m:sSupPr>
-                            <m:ctrlPr>
-                              <a:rPr lang="ru-RU" sz="1800" i="1">
-                                <a:effectLst/>
-                                <a:latin typeface="Cambria Math" panose="02040503050406030204" pitchFamily="18" charset="0"/>
-                                <a:ea typeface="Times New Roman" panose="02020603050405020304" pitchFamily="18" charset="0"/>
-                              </a:rPr>
-                            </m:ctrlPr>
-                          </m:sSupPr>
-                          <m:e>
-                            <m:r>
-                              <a:rPr lang="ru-RU" sz="1800" i="1">
-                                <a:effectLst/>
-                                <a:latin typeface="Cambria Math" panose="02040503050406030204" pitchFamily="18" charset="0"/>
-                                <a:ea typeface="Times New Roman" panose="02020603050405020304" pitchFamily="18" charset="0"/>
-                              </a:rPr>
-                              <m:t>𝑥</m:t>
-                            </m:r>
-                          </m:e>
-                          <m:sup>
-                            <m:r>
-                              <a:rPr lang="ru-RU" sz="1800" i="1">
-                                <a:effectLst/>
-                                <a:latin typeface="Cambria Math" panose="02040503050406030204" pitchFamily="18" charset="0"/>
-                                <a:ea typeface="Times New Roman" panose="02020603050405020304" pitchFamily="18" charset="0"/>
-                              </a:rPr>
-                              <m:t>′</m:t>
-                            </m:r>
-                          </m:sup>
-                        </m:sSup>
-                        <m:r>
-                          <a:rPr lang="ru-RU" sz="1800" i="1">
-                            <a:effectLst/>
-                            <a:latin typeface="Cambria Math" panose="02040503050406030204" pitchFamily="18" charset="0"/>
-                            <a:ea typeface="Times New Roman" panose="02020603050405020304" pitchFamily="18" charset="0"/>
-                          </a:rPr>
-                          <m:t>,</m:t>
-                        </m:r>
-                        <m:sSup>
-                          <m:sSupPr>
-                            <m:ctrlPr>
-                              <a:rPr lang="ru-RU" sz="1800" i="1">
-                                <a:effectLst/>
-                                <a:latin typeface="Cambria Math" panose="02040503050406030204" pitchFamily="18" charset="0"/>
-                                <a:ea typeface="Times New Roman" panose="02020603050405020304" pitchFamily="18" charset="0"/>
-                              </a:rPr>
-                            </m:ctrlPr>
-                          </m:sSupPr>
-                          <m:e>
-                            <m:r>
-                              <a:rPr lang="ru-RU" sz="1800" i="1">
-                                <a:effectLst/>
-                                <a:latin typeface="Cambria Math" panose="02040503050406030204" pitchFamily="18" charset="0"/>
-                                <a:ea typeface="Times New Roman" panose="02020603050405020304" pitchFamily="18" charset="0"/>
-                              </a:rPr>
-                              <m:t>𝑦</m:t>
-                            </m:r>
-                          </m:e>
-                          <m:sup>
-                            <m:r>
-                              <a:rPr lang="ru-RU" sz="1800" i="1">
-                                <a:effectLst/>
-                                <a:latin typeface="Cambria Math" panose="02040503050406030204" pitchFamily="18" charset="0"/>
-                                <a:ea typeface="Times New Roman" panose="02020603050405020304" pitchFamily="18" charset="0"/>
-                              </a:rPr>
-                              <m:t>′</m:t>
-                            </m:r>
-                          </m:sup>
-                        </m:sSup>
-                      </m:e>
-                    </m:d>
                     <m:r>
                       <a:rPr lang="ru-RU" sz="1800" i="1">
                         <a:effectLst/>
@@ -10707,69 +10678,6 @@
                         </m:r>
                       </m:sub>
                     </m:sSub>
-                    <m:r>
-                      <a:rPr lang="ru-RU" sz="1800" i="1">
-                        <a:effectLst/>
-                        <a:latin typeface="Cambria Math" panose="02040503050406030204" pitchFamily="18" charset="0"/>
-                        <a:ea typeface="Times New Roman" panose="02020603050405020304" pitchFamily="18" charset="0"/>
-                      </a:rPr>
-                      <m:t>(</m:t>
-                    </m:r>
-                    <m:sSup>
-                      <m:sSupPr>
-                        <m:ctrlPr>
-                          <a:rPr lang="ru-RU" sz="1800" i="1">
-                            <a:effectLst/>
-                            <a:latin typeface="Cambria Math" panose="02040503050406030204" pitchFamily="18" charset="0"/>
-                            <a:ea typeface="Times New Roman" panose="02020603050405020304" pitchFamily="18" charset="0"/>
-                          </a:rPr>
-                        </m:ctrlPr>
-                      </m:sSupPr>
-                      <m:e>
-                        <m:r>
-                          <a:rPr lang="ru-RU" sz="1800" i="1">
-                            <a:effectLst/>
-                            <a:latin typeface="Cambria Math" panose="02040503050406030204" pitchFamily="18" charset="0"/>
-                            <a:ea typeface="Times New Roman" panose="02020603050405020304" pitchFamily="18" charset="0"/>
-                          </a:rPr>
-                          <m:t>𝑥</m:t>
-                        </m:r>
-                      </m:e>
-                      <m:sup>
-                        <m:r>
-                          <a:rPr lang="ru-RU" sz="1800" i="1">
-                            <a:effectLst/>
-                            <a:latin typeface="Cambria Math" panose="02040503050406030204" pitchFamily="18" charset="0"/>
-                            <a:ea typeface="Times New Roman" panose="02020603050405020304" pitchFamily="18" charset="0"/>
-                          </a:rPr>
-                          <m:t>′</m:t>
-                        </m:r>
-                      </m:sup>
-                    </m:sSup>
-                    <m:r>
-                      <a:rPr lang="ru-RU" sz="1800" i="1">
-                        <a:effectLst/>
-                        <a:latin typeface="Cambria Math" panose="02040503050406030204" pitchFamily="18" charset="0"/>
-                        <a:ea typeface="Times New Roman" panose="02020603050405020304" pitchFamily="18" charset="0"/>
-                      </a:rPr>
-                      <m:t>,</m:t>
-                    </m:r>
-                    <m:r>
-                      <a:rPr lang="ru-RU" sz="1800" i="1">
-                        <a:effectLst/>
-                        <a:latin typeface="Cambria Math" panose="02040503050406030204" pitchFamily="18" charset="0"/>
-                        <a:ea typeface="Times New Roman" panose="02020603050405020304" pitchFamily="18" charset="0"/>
-                      </a:rPr>
-                      <m:t>𝑦</m:t>
-                    </m:r>
-                    <m:r>
-                      <a:rPr lang="ru-RU" sz="1800" i="1">
-                        <a:effectLst/>
-                        <a:latin typeface="Cambria Math" panose="02040503050406030204" pitchFamily="18" charset="0"/>
-                        <a:ea typeface="Times New Roman" panose="02020603050405020304" pitchFamily="18" charset="0"/>
-                      </a:rPr>
-                      <m:t>′)</m:t>
-                    </m:r>
                   </m:oMath>
                 </a14:m>
                 <a:r>
@@ -10778,13 +10686,13 @@
                     <a:latin typeface="Times New Roman" panose="02020603050405020304" pitchFamily="18" charset="0"/>
                     <a:ea typeface="Times New Roman" panose="02020603050405020304" pitchFamily="18" charset="0"/>
                   </a:rPr>
-                  <a:t>, то пиксел высвечивается с учетом его затемнения, 			иначе точка высвечивается без затемнения</a:t>
+                  <a:t>, то пиксел высвечивается с учетом его затемнения,  иначе точка высвечивается без затемнения</a:t>
                 </a:r>
               </a:p>
             </p:txBody>
           </p:sp>
         </mc:Choice>
-        <mc:Fallback xmlns="">
+        <mc:Fallback>
           <p:sp>
             <p:nvSpPr>
               <p:cNvPr id="4" name="TextBox 3">
@@ -10842,292 +10750,6 @@
 </p:sld>
 </file>
 
-<file path=ppt/slides/slide8.xml><?xml version="1.0" encoding="utf-8"?>
-<p:sld xmlns:a="http://schemas.openxmlformats.org/drawingml/2006/main" xmlns:r="http://schemas.openxmlformats.org/officeDocument/2006/relationships" xmlns:p="http://schemas.openxmlformats.org/presentationml/2006/main">
-  <p:cSld>
-    <p:spTree>
-      <p:nvGrpSpPr>
-        <p:cNvPr id="1" name=""/>
-        <p:cNvGrpSpPr/>
-        <p:nvPr/>
-      </p:nvGrpSpPr>
-      <p:grpSpPr>
-        <a:xfrm>
-          <a:off x="0" y="0"/>
-          <a:ext cx="0" cy="0"/>
-          <a:chOff x="0" y="0"/>
-          <a:chExt cx="0" cy="0"/>
-        </a:xfrm>
-      </p:grpSpPr>
-      <p:sp>
-        <p:nvSpPr>
-          <p:cNvPr id="2" name="Заголовок 1">
-            <a:extLst>
-              <a:ext uri="{FF2B5EF4-FFF2-40B4-BE49-F238E27FC236}">
-                <a16:creationId xmlns:a16="http://schemas.microsoft.com/office/drawing/2014/main" id="{70DA9C02-F807-4672-B786-210812D74F7C}"/>
-              </a:ext>
-            </a:extLst>
-          </p:cNvPr>
-          <p:cNvSpPr>
-            <a:spLocks noGrp="1"/>
-          </p:cNvSpPr>
-          <p:nvPr>
-            <p:ph type="title"/>
-          </p:nvPr>
-        </p:nvSpPr>
-        <p:spPr/>
-        <p:txBody>
-          <a:bodyPr/>
-          <a:lstStyle/>
-          <a:p>
-            <a:r>
-              <a:rPr lang="ru-RU" dirty="0">
-                <a:latin typeface="Times New Roman" panose="02020603050405020304" pitchFamily="18" charset="0"/>
-                <a:cs typeface="Times New Roman" panose="02020603050405020304" pitchFamily="18" charset="0"/>
-              </a:rPr>
-              <a:t>Выбор языка программирования и среды разработки</a:t>
-            </a:r>
-          </a:p>
-        </p:txBody>
-      </p:sp>
-      <p:sp>
-        <p:nvSpPr>
-          <p:cNvPr id="4" name="TextBox 3">
-            <a:extLst>
-              <a:ext uri="{FF2B5EF4-FFF2-40B4-BE49-F238E27FC236}">
-                <a16:creationId xmlns:a16="http://schemas.microsoft.com/office/drawing/2014/main" id="{ED04FD7B-DA19-4A9C-A5CD-CEFEA5C88B05}"/>
-              </a:ext>
-            </a:extLst>
-          </p:cNvPr>
-          <p:cNvSpPr txBox="1"/>
-          <p:nvPr/>
-        </p:nvSpPr>
-        <p:spPr>
-          <a:xfrm>
-            <a:off x="1097280" y="1737360"/>
-            <a:ext cx="10058400" cy="2677656"/>
-          </a:xfrm>
-          <a:prstGeom prst="rect">
-            <a:avLst/>
-          </a:prstGeom>
-          <a:noFill/>
-        </p:spPr>
-        <p:txBody>
-          <a:bodyPr wrap="square">
-            <a:spAutoFit/>
-          </a:bodyPr>
-          <a:lstStyle/>
-          <a:p>
-            <a:r>
-              <a:rPr lang="ru-RU" sz="2400" dirty="0">
-                <a:effectLst/>
-                <a:latin typeface="Times New Roman" panose="02020603050405020304" pitchFamily="18" charset="0"/>
-                <a:ea typeface="Times New Roman" panose="02020603050405020304" pitchFamily="18" charset="0"/>
-              </a:rPr>
-              <a:t>При написании программного продукта использовался язык </a:t>
-            </a:r>
-            <a:r>
-              <a:rPr lang="en-US" sz="2400" dirty="0">
-                <a:effectLst/>
-                <a:latin typeface="Times New Roman" panose="02020603050405020304" pitchFamily="18" charset="0"/>
-                <a:ea typeface="Times New Roman" panose="02020603050405020304" pitchFamily="18" charset="0"/>
-              </a:rPr>
-              <a:t>C</a:t>
-            </a:r>
-            <a:r>
-              <a:rPr lang="ru-RU" sz="2400" dirty="0">
-                <a:effectLst/>
-                <a:latin typeface="Times New Roman" panose="02020603050405020304" pitchFamily="18" charset="0"/>
-                <a:ea typeface="Times New Roman" panose="02020603050405020304" pitchFamily="18" charset="0"/>
-              </a:rPr>
-              <a:t>++:</a:t>
-            </a:r>
-          </a:p>
-          <a:p>
-            <a:pPr marL="342900" indent="-342900">
-              <a:buFont typeface="+mj-lt"/>
-              <a:buAutoNum type="arabicParenR"/>
-            </a:pPr>
-            <a:r>
-              <a:rPr lang="ru-RU" sz="2400" dirty="0">
-                <a:latin typeface="Times New Roman" panose="02020603050405020304" pitchFamily="18" charset="0"/>
-              </a:rPr>
-              <a:t>данный язык преподавался в рамках курса Объектно-Ориентированного Программирования</a:t>
-            </a:r>
-            <a:r>
-              <a:rPr lang="en-US" sz="2400" dirty="0">
-                <a:latin typeface="Times New Roman" panose="02020603050405020304" pitchFamily="18" charset="0"/>
-              </a:rPr>
-              <a:t>;</a:t>
-            </a:r>
-            <a:endParaRPr lang="ru-RU" sz="2400" dirty="0">
-              <a:latin typeface="Times New Roman" panose="02020603050405020304" pitchFamily="18" charset="0"/>
-            </a:endParaRPr>
-          </a:p>
-          <a:p>
-            <a:pPr marL="342900" indent="-342900">
-              <a:buFont typeface="+mj-lt"/>
-              <a:buAutoNum type="arabicParenR"/>
-            </a:pPr>
-            <a:r>
-              <a:rPr lang="ru-RU" sz="2400" dirty="0">
-                <a:latin typeface="Times New Roman" panose="02020603050405020304" pitchFamily="18" charset="0"/>
-              </a:rPr>
-              <a:t>высокая вычислительная производительность</a:t>
-            </a:r>
-            <a:r>
-              <a:rPr lang="en-US" sz="2400" dirty="0">
-                <a:latin typeface="Times New Roman" panose="02020603050405020304" pitchFamily="18" charset="0"/>
-              </a:rPr>
-              <a:t>;</a:t>
-            </a:r>
-          </a:p>
-          <a:p>
-            <a:pPr marL="342900" indent="-342900">
-              <a:buFont typeface="+mj-lt"/>
-              <a:buAutoNum type="arabicParenR"/>
-            </a:pPr>
-            <a:r>
-              <a:rPr lang="ru-RU" sz="2400" dirty="0">
-                <a:latin typeface="Times New Roman" panose="02020603050405020304" pitchFamily="18" charset="0"/>
-              </a:rPr>
-              <a:t>язык поддерживает объектно-ориентированную парадигму программирования</a:t>
-            </a:r>
-            <a:r>
-              <a:rPr lang="en-US" sz="2400" dirty="0">
-                <a:latin typeface="Times New Roman" panose="02020603050405020304" pitchFamily="18" charset="0"/>
-              </a:rPr>
-              <a:t>;</a:t>
-            </a:r>
-          </a:p>
-          <a:p>
-            <a:pPr marL="342900" indent="-342900">
-              <a:buFont typeface="+mj-lt"/>
-              <a:buAutoNum type="arabicParenR"/>
-            </a:pPr>
-            <a:r>
-              <a:rPr lang="ru-RU" sz="2400" dirty="0">
-                <a:latin typeface="Times New Roman" panose="02020603050405020304" pitchFamily="18" charset="0"/>
-              </a:rPr>
-              <a:t>большое количество учебной и справочной литературы</a:t>
-            </a:r>
-            <a:r>
-              <a:rPr lang="en-US" sz="2400" dirty="0">
-                <a:latin typeface="Times New Roman" panose="02020603050405020304" pitchFamily="18" charset="0"/>
-              </a:rPr>
-              <a:t>.</a:t>
-            </a:r>
-          </a:p>
-        </p:txBody>
-      </p:sp>
-      <p:sp>
-        <p:nvSpPr>
-          <p:cNvPr id="5" name="TextBox 4">
-            <a:extLst>
-              <a:ext uri="{FF2B5EF4-FFF2-40B4-BE49-F238E27FC236}">
-                <a16:creationId xmlns:a16="http://schemas.microsoft.com/office/drawing/2014/main" id="{F1670412-FD7D-4EA8-A0B4-1F6574FD463E}"/>
-              </a:ext>
-            </a:extLst>
-          </p:cNvPr>
-          <p:cNvSpPr txBox="1"/>
-          <p:nvPr/>
-        </p:nvSpPr>
-        <p:spPr>
-          <a:xfrm>
-            <a:off x="1036320" y="4415016"/>
-            <a:ext cx="10253133" cy="1569660"/>
-          </a:xfrm>
-          <a:prstGeom prst="rect">
-            <a:avLst/>
-          </a:prstGeom>
-          <a:noFill/>
-        </p:spPr>
-        <p:txBody>
-          <a:bodyPr wrap="square">
-            <a:spAutoFit/>
-          </a:bodyPr>
-          <a:lstStyle/>
-          <a:p>
-            <a:r>
-              <a:rPr lang="ru-RU" sz="2400" dirty="0">
-                <a:latin typeface="Times New Roman" panose="02020603050405020304" pitchFamily="18" charset="0"/>
-                <a:ea typeface="Times New Roman" panose="02020603050405020304" pitchFamily="18" charset="0"/>
-              </a:rPr>
-              <a:t>Была задействована среда разработки </a:t>
-            </a:r>
-            <a:r>
-              <a:rPr lang="en-US" sz="2400" dirty="0">
-                <a:latin typeface="Times New Roman" panose="02020603050405020304" pitchFamily="18" charset="0"/>
-                <a:ea typeface="Times New Roman" panose="02020603050405020304" pitchFamily="18" charset="0"/>
-              </a:rPr>
-              <a:t>QT Creator:</a:t>
-            </a:r>
-            <a:endParaRPr lang="ru-RU" sz="2400" dirty="0">
-              <a:effectLst/>
-              <a:latin typeface="Times New Roman" panose="02020603050405020304" pitchFamily="18" charset="0"/>
-              <a:ea typeface="Times New Roman" panose="02020603050405020304" pitchFamily="18" charset="0"/>
-            </a:endParaRPr>
-          </a:p>
-          <a:p>
-            <a:pPr marL="342900" indent="-342900">
-              <a:buFont typeface="+mj-lt"/>
-              <a:buAutoNum type="arabicParenR"/>
-            </a:pPr>
-            <a:r>
-              <a:rPr lang="ru-RU" sz="2400" dirty="0">
-                <a:latin typeface="Times New Roman" panose="02020603050405020304" pitchFamily="18" charset="0"/>
-              </a:rPr>
-              <a:t>основы работы с данной средой разработки преподавался в рамках курса Программирования на Си</a:t>
-            </a:r>
-            <a:r>
-              <a:rPr lang="en-US" sz="2400" dirty="0">
-                <a:latin typeface="Times New Roman" panose="02020603050405020304" pitchFamily="18" charset="0"/>
-              </a:rPr>
-              <a:t>;</a:t>
-            </a:r>
-            <a:endParaRPr lang="ru-RU" sz="2400" dirty="0">
-              <a:latin typeface="Times New Roman" panose="02020603050405020304" pitchFamily="18" charset="0"/>
-            </a:endParaRPr>
-          </a:p>
-          <a:p>
-            <a:pPr marL="342900" indent="-342900">
-              <a:buFont typeface="+mj-lt"/>
-              <a:buAutoNum type="arabicParenR"/>
-            </a:pPr>
-            <a:r>
-              <a:rPr lang="en-US" sz="2400" dirty="0">
-                <a:latin typeface="Times New Roman" panose="02020603050405020304" pitchFamily="18" charset="0"/>
-              </a:rPr>
-              <a:t>QT Creator </a:t>
-            </a:r>
-            <a:r>
-              <a:rPr lang="ru-RU" sz="2400" dirty="0">
-                <a:latin typeface="Times New Roman" panose="02020603050405020304" pitchFamily="18" charset="0"/>
-              </a:rPr>
-              <a:t>позволяет работать с расширением </a:t>
-            </a:r>
-            <a:r>
-              <a:rPr lang="en-US" sz="2400" dirty="0">
-                <a:latin typeface="Times New Roman" panose="02020603050405020304" pitchFamily="18" charset="0"/>
-              </a:rPr>
-              <a:t>Qt Design.</a:t>
-            </a:r>
-          </a:p>
-        </p:txBody>
-      </p:sp>
-    </p:spTree>
-    <p:extLst>
-      <p:ext uri="{BB962C8B-B14F-4D97-AF65-F5344CB8AC3E}">
-        <p14:creationId xmlns:p14="http://schemas.microsoft.com/office/powerpoint/2010/main" val="3208556358"/>
-      </p:ext>
-    </p:extLst>
-  </p:cSld>
-  <p:clrMapOvr>
-    <a:masterClrMapping/>
-  </p:clrMapOvr>
-</p:sld>
-</file>
-
 <file path=ppt/slides/slide9.xml><?xml version="1.0" encoding="utf-8"?>
 <p:sld xmlns:a="http://schemas.openxmlformats.org/drawingml/2006/main" xmlns:r="http://schemas.openxmlformats.org/officeDocument/2006/relationships" xmlns:p="http://schemas.openxmlformats.org/presentationml/2006/main">
   <p:cSld>
@@ -11171,63 +10793,264 @@
                 <a:latin typeface="Times New Roman" panose="02020603050405020304" pitchFamily="18" charset="0"/>
                 <a:cs typeface="Times New Roman" panose="02020603050405020304" pitchFamily="18" charset="0"/>
               </a:rPr>
-              <a:t>Структура и состав классов</a:t>
+              <a:t>Выбор языка программирования и среды разработки</a:t>
             </a:r>
           </a:p>
         </p:txBody>
       </p:sp>
-      <p:pic>
-        <p:nvPicPr>
-          <p:cNvPr id="3" name="Рисунок 2">
+      <p:sp>
+        <p:nvSpPr>
+          <p:cNvPr id="4" name="TextBox 3">
             <a:extLst>
               <a:ext uri="{FF2B5EF4-FFF2-40B4-BE49-F238E27FC236}">
-                <a16:creationId xmlns:a16="http://schemas.microsoft.com/office/drawing/2014/main" id="{2513F3BF-65B7-4597-9BE0-83C01247D54D}"/>
+                <a16:creationId xmlns:a16="http://schemas.microsoft.com/office/drawing/2014/main" id="{ED04FD7B-DA19-4A9C-A5CD-CEFEA5C88B05}"/>
               </a:ext>
             </a:extLst>
           </p:cNvPr>
-          <p:cNvPicPr/>
+          <p:cNvSpPr txBox="1"/>
           <p:nvPr/>
-        </p:nvPicPr>
-        <p:blipFill>
-          <a:blip r:embed="rId2">
-            <a:extLst>
-              <a:ext uri="{28A0092B-C50C-407E-A947-70E740481C1C}">
-                <a14:useLocalDpi xmlns:a14="http://schemas.microsoft.com/office/drawing/2010/main" val="0"/>
-              </a:ext>
-            </a:extLst>
-          </a:blip>
-          <a:stretch>
-            <a:fillRect/>
-          </a:stretch>
-        </p:blipFill>
-        <p:spPr bwMode="auto">
+        </p:nvSpPr>
+        <p:spPr>
           <a:xfrm>
-            <a:off x="1218142" y="1928494"/>
-            <a:ext cx="9937538" cy="3862705"/>
+            <a:off x="1097279" y="1737360"/>
+            <a:ext cx="10950787" cy="2308324"/>
           </a:xfrm>
           <a:prstGeom prst="rect">
             <a:avLst/>
           </a:prstGeom>
-          <a:ln w="38100" cap="sq">
-            <a:solidFill>
-              <a:srgbClr val="000000"/>
-            </a:solidFill>
-            <a:prstDash val="solid"/>
-            <a:miter lim="800000"/>
-          </a:ln>
-          <a:effectLst>
-            <a:outerShdw blurRad="50800" dist="38100" dir="2700000" algn="tl" rotWithShape="0">
-              <a:srgbClr val="000000">
-                <a:alpha val="43000"/>
-              </a:srgbClr>
-            </a:outerShdw>
-          </a:effectLst>
+          <a:noFill/>
         </p:spPr>
-      </p:pic>
+        <p:txBody>
+          <a:bodyPr wrap="square">
+            <a:spAutoFit/>
+          </a:bodyPr>
+          <a:lstStyle/>
+          <a:p>
+            <a:r>
+              <a:rPr lang="ru-RU" sz="2400" dirty="0">
+                <a:effectLst/>
+                <a:latin typeface="Times New Roman" panose="02020603050405020304" pitchFamily="18" charset="0"/>
+                <a:ea typeface="Times New Roman" panose="02020603050405020304" pitchFamily="18" charset="0"/>
+              </a:rPr>
+              <a:t>При написании программного продукта использовался язык </a:t>
+            </a:r>
+            <a:r>
+              <a:rPr lang="en-US" sz="2400" dirty="0">
+                <a:effectLst/>
+                <a:latin typeface="Times New Roman" panose="02020603050405020304" pitchFamily="18" charset="0"/>
+                <a:ea typeface="Times New Roman" panose="02020603050405020304" pitchFamily="18" charset="0"/>
+              </a:rPr>
+              <a:t>C</a:t>
+            </a:r>
+            <a:r>
+              <a:rPr lang="ru-RU" sz="2400" dirty="0">
+                <a:effectLst/>
+                <a:latin typeface="Times New Roman" panose="02020603050405020304" pitchFamily="18" charset="0"/>
+                <a:ea typeface="Times New Roman" panose="02020603050405020304" pitchFamily="18" charset="0"/>
+              </a:rPr>
+              <a:t>++:</a:t>
+            </a:r>
+          </a:p>
+          <a:p>
+            <a:pPr marL="342900" indent="-342900">
+              <a:buFont typeface="+mj-lt"/>
+              <a:buAutoNum type="arabicParenR"/>
+            </a:pPr>
+            <a:r>
+              <a:rPr lang="ru-RU" sz="2400" dirty="0">
+                <a:latin typeface="Times New Roman" panose="02020603050405020304" pitchFamily="18" charset="0"/>
+              </a:rPr>
+              <a:t>данный язык преподавался в рамках курса Объектно-Ориентированного Программирования</a:t>
+            </a:r>
+            <a:r>
+              <a:rPr lang="en-US" sz="2400" dirty="0">
+                <a:latin typeface="Times New Roman" panose="02020603050405020304" pitchFamily="18" charset="0"/>
+              </a:rPr>
+              <a:t>;</a:t>
+            </a:r>
+            <a:endParaRPr lang="ru-RU" sz="2400" dirty="0">
+              <a:latin typeface="Times New Roman" panose="02020603050405020304" pitchFamily="18" charset="0"/>
+            </a:endParaRPr>
+          </a:p>
+          <a:p>
+            <a:pPr marL="342900" indent="-342900">
+              <a:buFont typeface="+mj-lt"/>
+              <a:buAutoNum type="arabicParenR"/>
+            </a:pPr>
+            <a:r>
+              <a:rPr lang="ru-RU" sz="2400" dirty="0">
+                <a:latin typeface="Times New Roman" panose="02020603050405020304" pitchFamily="18" charset="0"/>
+              </a:rPr>
+              <a:t>высокая вычислительная производительность</a:t>
+            </a:r>
+            <a:r>
+              <a:rPr lang="en-US" sz="2400" dirty="0">
+                <a:latin typeface="Times New Roman" panose="02020603050405020304" pitchFamily="18" charset="0"/>
+              </a:rPr>
+              <a:t>;</a:t>
+            </a:r>
+          </a:p>
+          <a:p>
+            <a:pPr marL="342900" indent="-342900">
+              <a:buFont typeface="+mj-lt"/>
+              <a:buAutoNum type="arabicParenR"/>
+            </a:pPr>
+            <a:r>
+              <a:rPr lang="ru-RU" sz="2400" dirty="0">
+                <a:latin typeface="Times New Roman" panose="02020603050405020304" pitchFamily="18" charset="0"/>
+              </a:rPr>
+              <a:t>язык поддерживает объектно-ориентированную парадигму</a:t>
+            </a:r>
+            <a:r>
+              <a:rPr lang="en-US" sz="2400" dirty="0">
+                <a:latin typeface="Times New Roman" panose="02020603050405020304" pitchFamily="18" charset="0"/>
+              </a:rPr>
+              <a:t> </a:t>
+            </a:r>
+            <a:r>
+              <a:rPr lang="ru-RU" sz="2400" dirty="0">
+                <a:latin typeface="Times New Roman" panose="02020603050405020304" pitchFamily="18" charset="0"/>
+              </a:rPr>
+              <a:t>программирования</a:t>
+            </a:r>
+            <a:r>
+              <a:rPr lang="en-US" sz="2400" dirty="0">
+                <a:latin typeface="Times New Roman" panose="02020603050405020304" pitchFamily="18" charset="0"/>
+              </a:rPr>
+              <a:t>;</a:t>
+            </a:r>
+          </a:p>
+          <a:p>
+            <a:pPr marL="342900" indent="-342900">
+              <a:buFont typeface="+mj-lt"/>
+              <a:buAutoNum type="arabicParenR"/>
+            </a:pPr>
+            <a:r>
+              <a:rPr lang="ru-RU" sz="2400" dirty="0">
+                <a:latin typeface="Times New Roman" panose="02020603050405020304" pitchFamily="18" charset="0"/>
+              </a:rPr>
+              <a:t>большое количество учебной и справочной литературы</a:t>
+            </a:r>
+            <a:r>
+              <a:rPr lang="en-US" sz="2400" dirty="0">
+                <a:latin typeface="Times New Roman" panose="02020603050405020304" pitchFamily="18" charset="0"/>
+              </a:rPr>
+              <a:t>.</a:t>
+            </a:r>
+          </a:p>
+        </p:txBody>
+      </p:sp>
+      <p:sp>
+        <p:nvSpPr>
+          <p:cNvPr id="5" name="TextBox 4">
+            <a:extLst>
+              <a:ext uri="{FF2B5EF4-FFF2-40B4-BE49-F238E27FC236}">
+                <a16:creationId xmlns:a16="http://schemas.microsoft.com/office/drawing/2014/main" id="{F1670412-FD7D-4EA8-A0B4-1F6574FD463E}"/>
+              </a:ext>
+            </a:extLst>
+          </p:cNvPr>
+          <p:cNvSpPr txBox="1"/>
+          <p:nvPr/>
+        </p:nvSpPr>
+        <p:spPr>
+          <a:xfrm>
+            <a:off x="1036320" y="4415016"/>
+            <a:ext cx="11011746" cy="1200329"/>
+          </a:xfrm>
+          <a:prstGeom prst="rect">
+            <a:avLst/>
+          </a:prstGeom>
+          <a:noFill/>
+        </p:spPr>
+        <p:txBody>
+          <a:bodyPr wrap="square">
+            <a:spAutoFit/>
+          </a:bodyPr>
+          <a:lstStyle/>
+          <a:p>
+            <a:r>
+              <a:rPr lang="ru-RU" sz="2400" dirty="0">
+                <a:latin typeface="Times New Roman" panose="02020603050405020304" pitchFamily="18" charset="0"/>
+                <a:ea typeface="Times New Roman" panose="02020603050405020304" pitchFamily="18" charset="0"/>
+              </a:rPr>
+              <a:t>Была задействована среда разработки </a:t>
+            </a:r>
+            <a:r>
+              <a:rPr lang="en-US" sz="2400" dirty="0">
+                <a:latin typeface="Times New Roman" panose="02020603050405020304" pitchFamily="18" charset="0"/>
+                <a:ea typeface="Times New Roman" panose="02020603050405020304" pitchFamily="18" charset="0"/>
+              </a:rPr>
+              <a:t>QT Creator:</a:t>
+            </a:r>
+            <a:endParaRPr lang="ru-RU" sz="2400" dirty="0">
+              <a:effectLst/>
+              <a:latin typeface="Times New Roman" panose="02020603050405020304" pitchFamily="18" charset="0"/>
+              <a:ea typeface="Times New Roman" panose="02020603050405020304" pitchFamily="18" charset="0"/>
+            </a:endParaRPr>
+          </a:p>
+          <a:p>
+            <a:pPr marL="342900" indent="-342900">
+              <a:buFont typeface="+mj-lt"/>
+              <a:buAutoNum type="arabicParenR"/>
+            </a:pPr>
+            <a:r>
+              <a:rPr lang="ru-RU" sz="2400" dirty="0">
+                <a:latin typeface="Times New Roman" panose="02020603050405020304" pitchFamily="18" charset="0"/>
+              </a:rPr>
+              <a:t>работа с </a:t>
+            </a:r>
+            <a:r>
+              <a:rPr lang="en-US" sz="2400" dirty="0">
+                <a:latin typeface="Times New Roman" panose="02020603050405020304" pitchFamily="18" charset="0"/>
+              </a:rPr>
+              <a:t>QT Creator </a:t>
+            </a:r>
+            <a:r>
+              <a:rPr lang="ru-RU" sz="2400" dirty="0">
+                <a:latin typeface="Times New Roman" panose="02020603050405020304" pitchFamily="18" charset="0"/>
+              </a:rPr>
+              <a:t>преподавалась в рамках курса Программирования на Си</a:t>
+            </a:r>
+            <a:r>
+              <a:rPr lang="en-US" sz="2400" dirty="0">
+                <a:latin typeface="Times New Roman" panose="02020603050405020304" pitchFamily="18" charset="0"/>
+              </a:rPr>
+              <a:t>;</a:t>
+            </a:r>
+            <a:endParaRPr lang="ru-RU" sz="2400" dirty="0">
+              <a:latin typeface="Times New Roman" panose="02020603050405020304" pitchFamily="18" charset="0"/>
+            </a:endParaRPr>
+          </a:p>
+          <a:p>
+            <a:pPr marL="342900" indent="-342900">
+              <a:buFont typeface="+mj-lt"/>
+              <a:buAutoNum type="arabicParenR"/>
+            </a:pPr>
+            <a:r>
+              <a:rPr lang="en-US" sz="2400" dirty="0">
+                <a:latin typeface="Times New Roman" panose="02020603050405020304" pitchFamily="18" charset="0"/>
+              </a:rPr>
+              <a:t>QT Creator </a:t>
+            </a:r>
+            <a:r>
+              <a:rPr lang="ru-RU" sz="2400" dirty="0">
+                <a:latin typeface="Times New Roman" panose="02020603050405020304" pitchFamily="18" charset="0"/>
+              </a:rPr>
+              <a:t>позволяет работать с расширением </a:t>
+            </a:r>
+            <a:r>
+              <a:rPr lang="en-US" sz="2400" dirty="0">
+                <a:latin typeface="Times New Roman" panose="02020603050405020304" pitchFamily="18" charset="0"/>
+              </a:rPr>
+              <a:t>Qt Design.</a:t>
+            </a:r>
+          </a:p>
+        </p:txBody>
+      </p:sp>
     </p:spTree>
     <p:extLst>
       <p:ext uri="{BB962C8B-B14F-4D97-AF65-F5344CB8AC3E}">
-        <p14:creationId xmlns:p14="http://schemas.microsoft.com/office/powerpoint/2010/main" val="532674506"/>
+        <p14:creationId xmlns:p14="http://schemas.microsoft.com/office/powerpoint/2010/main" val="3208556358"/>
       </p:ext>
     </p:extLst>
   </p:cSld>

</xml_diff>

<commit_message>
FIX: too many fixes
</commit_message>
<xml_diff>
--- a/Presentation/CurseWorkYakuba.pptx
+++ b/Presentation/CurseWorkYakuba.pptx
@@ -1492,7 +1492,7 @@
           <a:p>
             <a:fld id="{6EFF73F2-DCB5-4E8D-8FED-7ED588C8F664}" type="datetimeFigureOut">
               <a:rPr lang="ru-RU" smtClean="0"/>
-              <a:t>28.11.2020</a:t>
+              <a:t>30.11.2020</a:t>
             </a:fld>
             <a:endParaRPr lang="ru-RU"/>
           </a:p>
@@ -1700,7 +1700,7 @@
           <a:p>
             <a:fld id="{6EFF73F2-DCB5-4E8D-8FED-7ED588C8F664}" type="datetimeFigureOut">
               <a:rPr lang="ru-RU" smtClean="0"/>
-              <a:t>28.11.2020</a:t>
+              <a:t>30.11.2020</a:t>
             </a:fld>
             <a:endParaRPr lang="ru-RU"/>
           </a:p>
@@ -1958,7 +1958,7 @@
           <a:p>
             <a:fld id="{6EFF73F2-DCB5-4E8D-8FED-7ED588C8F664}" type="datetimeFigureOut">
               <a:rPr lang="ru-RU" smtClean="0"/>
-              <a:t>28.11.2020</a:t>
+              <a:t>30.11.2020</a:t>
             </a:fld>
             <a:endParaRPr lang="ru-RU"/>
           </a:p>
@@ -2128,7 +2128,7 @@
           <a:p>
             <a:fld id="{6EFF73F2-DCB5-4E8D-8FED-7ED588C8F664}" type="datetimeFigureOut">
               <a:rPr lang="ru-RU" smtClean="0"/>
-              <a:t>28.11.2020</a:t>
+              <a:t>30.11.2020</a:t>
             </a:fld>
             <a:endParaRPr lang="ru-RU"/>
           </a:p>
@@ -2465,7 +2465,7 @@
           <a:p>
             <a:fld id="{6EFF73F2-DCB5-4E8D-8FED-7ED588C8F664}" type="datetimeFigureOut">
               <a:rPr lang="ru-RU" smtClean="0"/>
-              <a:t>28.11.2020</a:t>
+              <a:t>30.11.2020</a:t>
             </a:fld>
             <a:endParaRPr lang="ru-RU"/>
           </a:p>
@@ -2740,7 +2740,7 @@
           <a:p>
             <a:fld id="{6EFF73F2-DCB5-4E8D-8FED-7ED588C8F664}" type="datetimeFigureOut">
               <a:rPr lang="ru-RU" smtClean="0"/>
-              <a:t>28.11.2020</a:t>
+              <a:t>30.11.2020</a:t>
             </a:fld>
             <a:endParaRPr lang="ru-RU"/>
           </a:p>
@@ -3123,7 +3123,7 @@
           <a:p>
             <a:fld id="{6EFF73F2-DCB5-4E8D-8FED-7ED588C8F664}" type="datetimeFigureOut">
               <a:rPr lang="ru-RU" smtClean="0"/>
-              <a:t>28.11.2020</a:t>
+              <a:t>30.11.2020</a:t>
             </a:fld>
             <a:endParaRPr lang="ru-RU"/>
           </a:p>
@@ -3241,7 +3241,7 @@
           <a:p>
             <a:fld id="{6EFF73F2-DCB5-4E8D-8FED-7ED588C8F664}" type="datetimeFigureOut">
               <a:rPr lang="ru-RU" smtClean="0"/>
-              <a:t>28.11.2020</a:t>
+              <a:t>30.11.2020</a:t>
             </a:fld>
             <a:endParaRPr lang="ru-RU"/>
           </a:p>
@@ -3414,7 +3414,7 @@
           <a:p>
             <a:fld id="{6EFF73F2-DCB5-4E8D-8FED-7ED588C8F664}" type="datetimeFigureOut">
               <a:rPr lang="ru-RU" smtClean="0"/>
-              <a:t>28.11.2020</a:t>
+              <a:t>30.11.2020</a:t>
             </a:fld>
             <a:endParaRPr lang="ru-RU"/>
           </a:p>
@@ -3770,7 +3770,7 @@
           <a:p>
             <a:fld id="{6EFF73F2-DCB5-4E8D-8FED-7ED588C8F664}" type="datetimeFigureOut">
               <a:rPr lang="ru-RU" smtClean="0"/>
-              <a:t>28.11.2020</a:t>
+              <a:t>30.11.2020</a:t>
             </a:fld>
             <a:endParaRPr lang="ru-RU"/>
           </a:p>
@@ -4118,7 +4118,7 @@
           <a:p>
             <a:fld id="{6EFF73F2-DCB5-4E8D-8FED-7ED588C8F664}" type="datetimeFigureOut">
               <a:rPr lang="ru-RU" smtClean="0"/>
-              <a:t>28.11.2020</a:t>
+              <a:t>30.11.2020</a:t>
             </a:fld>
             <a:endParaRPr lang="ru-RU"/>
           </a:p>
@@ -4429,7 +4429,7 @@
           <a:p>
             <a:fld id="{6EFF73F2-DCB5-4E8D-8FED-7ED588C8F664}" type="datetimeFigureOut">
               <a:rPr lang="ru-RU" smtClean="0"/>
-              <a:t>28.11.2020</a:t>
+              <a:t>30.11.2020</a:t>
             </a:fld>
             <a:endParaRPr lang="ru-RU"/>
           </a:p>
@@ -5211,7 +5211,7 @@
                 <a:latin typeface="Times New Roman" panose="02020603050405020304" pitchFamily="18" charset="0"/>
                 <a:cs typeface="Times New Roman" panose="02020603050405020304" pitchFamily="18" charset="0"/>
               </a:rPr>
-              <a:t>Структура и состав классов: продолжение</a:t>
+              <a:t>Структура и состав классов</a:t>
             </a:r>
           </a:p>
         </p:txBody>
@@ -5291,8 +5291,8 @@
         </p:blipFill>
         <p:spPr bwMode="auto">
           <a:xfrm>
-            <a:off x="5674783" y="2271607"/>
-            <a:ext cx="6136216" cy="3257126"/>
+            <a:off x="5554133" y="2271607"/>
+            <a:ext cx="6256866" cy="3257126"/>
           </a:xfrm>
           <a:prstGeom prst="rect">
             <a:avLst/>
@@ -6773,18 +6773,18 @@
                         </a:spcAft>
                       </a:pPr>
                       <a:r>
-                        <a:rPr lang="ru-RU" sz="1200">
+                        <a:rPr lang="ru-RU" sz="1200" dirty="0">
                           <a:effectLst/>
                         </a:rPr>
                         <a:t>1</a:t>
                       </a:r>
                       <a:r>
-                        <a:rPr lang="en-US" sz="1200">
+                        <a:rPr lang="en-US" sz="1200" dirty="0">
                           <a:effectLst/>
                         </a:rPr>
                         <a:t>x1</a:t>
                       </a:r>
-                      <a:endParaRPr lang="ru-RU" sz="1200">
+                      <a:endParaRPr lang="ru-RU" sz="1200" dirty="0">
                         <a:effectLst/>
                         <a:latin typeface="Times New Roman" panose="02020603050405020304" pitchFamily="18" charset="0"/>
                         <a:ea typeface="Times New Roman" panose="02020603050405020304" pitchFamily="18" charset="0"/>
@@ -8410,7 +8410,7 @@
         <p:spPr>
           <a:xfrm>
             <a:off x="1097279" y="1737360"/>
-            <a:ext cx="10058399" cy="4462760"/>
+            <a:ext cx="10058399" cy="4893647"/>
           </a:xfrm>
           <a:prstGeom prst="rect">
             <a:avLst/>
@@ -8480,7 +8480,7 @@
                 <a:latin typeface="Times New Roman" panose="02020603050405020304" pitchFamily="18" charset="0"/>
                 <a:ea typeface="Times New Roman" panose="02020603050405020304" pitchFamily="18" charset="0"/>
               </a:rPr>
-              <a:t>Были изучены алгоритмы для решения поставленной задачи</a:t>
+              <a:t>Были изучены и выбраны алгоритмы для решения поставленной задачи</a:t>
             </a:r>
             <a:r>
               <a:rPr lang="en-US" sz="2800" dirty="0">
@@ -9522,7 +9522,7 @@
         <p:spPr>
           <a:xfrm>
             <a:off x="668866" y="1737360"/>
-            <a:ext cx="10223547" cy="1494255"/>
+            <a:ext cx="10223547" cy="3163687"/>
           </a:xfrm>
           <a:prstGeom prst="rect">
             <a:avLst/>
@@ -9544,7 +9544,7 @@
               </a:spcAft>
             </a:pPr>
             <a:r>
-              <a:rPr lang="ru-RU" sz="1800" dirty="0">
+              <a:rPr lang="ru-RU" sz="3200" dirty="0">
                 <a:effectLst/>
                 <a:latin typeface="Times New Roman" panose="02020603050405020304" pitchFamily="18" charset="0"/>
                 <a:ea typeface="Times New Roman" panose="02020603050405020304" pitchFamily="18" charset="0"/>
@@ -9562,7 +9562,7 @@
               </a:spcAft>
             </a:pPr>
             <a:r>
-              <a:rPr lang="ru-RU" sz="1800" dirty="0">
+              <a:rPr lang="ru-RU" sz="3200" dirty="0">
                 <a:effectLst/>
                 <a:latin typeface="Times New Roman" panose="02020603050405020304" pitchFamily="18" charset="0"/>
                 <a:ea typeface="Times New Roman" panose="02020603050405020304" pitchFamily="18" charset="0"/>
@@ -9580,7 +9580,7 @@
               </a:spcAft>
             </a:pPr>
             <a:r>
-              <a:rPr lang="ru-RU" sz="1800" dirty="0">
+              <a:rPr lang="ru-RU" sz="3200" dirty="0">
                 <a:effectLst/>
                 <a:latin typeface="Times New Roman" panose="02020603050405020304" pitchFamily="18" charset="0"/>
                 <a:ea typeface="Times New Roman" panose="02020603050405020304" pitchFamily="18" charset="0"/>
@@ -9588,7 +9588,7 @@
               <a:t>3. Определить падающие</a:t>
             </a:r>
             <a:r>
-              <a:rPr lang="en-US" sz="1800" dirty="0">
+              <a:rPr lang="en-US" sz="3200" dirty="0">
                 <a:effectLst/>
                 <a:latin typeface="Times New Roman" panose="02020603050405020304" pitchFamily="18" charset="0"/>
                 <a:ea typeface="Times New Roman" panose="02020603050405020304" pitchFamily="18" charset="0"/>
@@ -9596,7 +9596,7 @@
               <a:t> </a:t>
             </a:r>
             <a:r>
-              <a:rPr lang="ru-RU" sz="1800" dirty="0">
+              <a:rPr lang="ru-RU" sz="3200" dirty="0">
                 <a:effectLst/>
                 <a:latin typeface="Times New Roman" panose="02020603050405020304" pitchFamily="18" charset="0"/>
                 <a:ea typeface="Times New Roman" panose="02020603050405020304" pitchFamily="18" charset="0"/>
@@ -9604,7 +9604,7 @@
               <a:t>от</a:t>
             </a:r>
             <a:r>
-              <a:rPr lang="en-US" sz="1800" dirty="0">
+              <a:rPr lang="en-US" sz="3200" dirty="0">
                 <a:effectLst/>
                 <a:latin typeface="Times New Roman" panose="02020603050405020304" pitchFamily="18" charset="0"/>
                 <a:ea typeface="Times New Roman" panose="02020603050405020304" pitchFamily="18" charset="0"/>
@@ -9612,7 +9612,7 @@
               <a:t> </a:t>
             </a:r>
             <a:r>
-              <a:rPr lang="ru-RU" sz="1800" dirty="0">
+              <a:rPr lang="ru-RU" sz="3200" dirty="0">
                 <a:effectLst/>
                 <a:latin typeface="Times New Roman" panose="02020603050405020304" pitchFamily="18" charset="0"/>
                 <a:ea typeface="Times New Roman" panose="02020603050405020304" pitchFamily="18" charset="0"/>
@@ -9697,8 +9697,8 @@
           </a:p>
         </p:txBody>
       </p:sp>
-      <mc:AlternateContent xmlns:mc="http://schemas.openxmlformats.org/markup-compatibility/2006">
-        <mc:Choice xmlns:a14="http://schemas.microsoft.com/office/drawing/2010/main" Requires="a14">
+      <mc:AlternateContent xmlns:mc="http://schemas.openxmlformats.org/markup-compatibility/2006" xmlns:a14="http://schemas.microsoft.com/office/drawing/2010/main">
+        <mc:Choice Requires="a14">
           <p:sp>
             <p:nvSpPr>
               <p:cNvPr id="4" name="TextBox 3">
@@ -10064,7 +10064,7 @@
             </p:txBody>
           </p:sp>
         </mc:Choice>
-        <mc:Fallback>
+        <mc:Fallback xmlns="">
           <p:sp>
             <p:nvSpPr>
               <p:cNvPr id="4" name="TextBox 3">
@@ -10184,8 +10184,8 @@
           </a:p>
         </p:txBody>
       </p:sp>
-      <mc:AlternateContent xmlns:mc="http://schemas.openxmlformats.org/markup-compatibility/2006">
-        <mc:Choice xmlns:a14="http://schemas.microsoft.com/office/drawing/2010/main" Requires="a14">
+      <mc:AlternateContent xmlns:mc="http://schemas.openxmlformats.org/markup-compatibility/2006" xmlns:a14="http://schemas.microsoft.com/office/drawing/2010/main">
+        <mc:Choice Requires="a14">
           <p:sp>
             <p:nvSpPr>
               <p:cNvPr id="4" name="TextBox 3">
@@ -10692,7 +10692,7 @@
             </p:txBody>
           </p:sp>
         </mc:Choice>
-        <mc:Fallback>
+        <mc:Fallback xmlns="">
           <p:sp>
             <p:nvSpPr>
               <p:cNvPr id="4" name="TextBox 3">

</xml_diff>

<commit_message>
END: YA SDAL HAHAHAHAHHAHAHAHAHAH
</commit_message>
<xml_diff>
--- a/Presentation/CurseWorkYakuba.pptx
+++ b/Presentation/CurseWorkYakuba.pptx
@@ -1492,7 +1492,7 @@
           <a:p>
             <a:fld id="{6EFF73F2-DCB5-4E8D-8FED-7ED588C8F664}" type="datetimeFigureOut">
               <a:rPr lang="ru-RU" smtClean="0"/>
-              <a:t>30.11.2020</a:t>
+              <a:t>01.12.2020</a:t>
             </a:fld>
             <a:endParaRPr lang="ru-RU"/>
           </a:p>
@@ -1700,7 +1700,7 @@
           <a:p>
             <a:fld id="{6EFF73F2-DCB5-4E8D-8FED-7ED588C8F664}" type="datetimeFigureOut">
               <a:rPr lang="ru-RU" smtClean="0"/>
-              <a:t>30.11.2020</a:t>
+              <a:t>01.12.2020</a:t>
             </a:fld>
             <a:endParaRPr lang="ru-RU"/>
           </a:p>
@@ -1958,7 +1958,7 @@
           <a:p>
             <a:fld id="{6EFF73F2-DCB5-4E8D-8FED-7ED588C8F664}" type="datetimeFigureOut">
               <a:rPr lang="ru-RU" smtClean="0"/>
-              <a:t>30.11.2020</a:t>
+              <a:t>01.12.2020</a:t>
             </a:fld>
             <a:endParaRPr lang="ru-RU"/>
           </a:p>
@@ -2128,7 +2128,7 @@
           <a:p>
             <a:fld id="{6EFF73F2-DCB5-4E8D-8FED-7ED588C8F664}" type="datetimeFigureOut">
               <a:rPr lang="ru-RU" smtClean="0"/>
-              <a:t>30.11.2020</a:t>
+              <a:t>01.12.2020</a:t>
             </a:fld>
             <a:endParaRPr lang="ru-RU"/>
           </a:p>
@@ -2465,7 +2465,7 @@
           <a:p>
             <a:fld id="{6EFF73F2-DCB5-4E8D-8FED-7ED588C8F664}" type="datetimeFigureOut">
               <a:rPr lang="ru-RU" smtClean="0"/>
-              <a:t>30.11.2020</a:t>
+              <a:t>01.12.2020</a:t>
             </a:fld>
             <a:endParaRPr lang="ru-RU"/>
           </a:p>
@@ -2740,7 +2740,7 @@
           <a:p>
             <a:fld id="{6EFF73F2-DCB5-4E8D-8FED-7ED588C8F664}" type="datetimeFigureOut">
               <a:rPr lang="ru-RU" smtClean="0"/>
-              <a:t>30.11.2020</a:t>
+              <a:t>01.12.2020</a:t>
             </a:fld>
             <a:endParaRPr lang="ru-RU"/>
           </a:p>
@@ -3123,7 +3123,7 @@
           <a:p>
             <a:fld id="{6EFF73F2-DCB5-4E8D-8FED-7ED588C8F664}" type="datetimeFigureOut">
               <a:rPr lang="ru-RU" smtClean="0"/>
-              <a:t>30.11.2020</a:t>
+              <a:t>01.12.2020</a:t>
             </a:fld>
             <a:endParaRPr lang="ru-RU"/>
           </a:p>
@@ -3241,7 +3241,7 @@
           <a:p>
             <a:fld id="{6EFF73F2-DCB5-4E8D-8FED-7ED588C8F664}" type="datetimeFigureOut">
               <a:rPr lang="ru-RU" smtClean="0"/>
-              <a:t>30.11.2020</a:t>
+              <a:t>01.12.2020</a:t>
             </a:fld>
             <a:endParaRPr lang="ru-RU"/>
           </a:p>
@@ -3414,7 +3414,7 @@
           <a:p>
             <a:fld id="{6EFF73F2-DCB5-4E8D-8FED-7ED588C8F664}" type="datetimeFigureOut">
               <a:rPr lang="ru-RU" smtClean="0"/>
-              <a:t>30.11.2020</a:t>
+              <a:t>01.12.2020</a:t>
             </a:fld>
             <a:endParaRPr lang="ru-RU"/>
           </a:p>
@@ -3770,7 +3770,7 @@
           <a:p>
             <a:fld id="{6EFF73F2-DCB5-4E8D-8FED-7ED588C8F664}" type="datetimeFigureOut">
               <a:rPr lang="ru-RU" smtClean="0"/>
-              <a:t>30.11.2020</a:t>
+              <a:t>01.12.2020</a:t>
             </a:fld>
             <a:endParaRPr lang="ru-RU"/>
           </a:p>
@@ -4118,7 +4118,7 @@
           <a:p>
             <a:fld id="{6EFF73F2-DCB5-4E8D-8FED-7ED588C8F664}" type="datetimeFigureOut">
               <a:rPr lang="ru-RU" smtClean="0"/>
-              <a:t>30.11.2020</a:t>
+              <a:t>01.12.2020</a:t>
             </a:fld>
             <a:endParaRPr lang="ru-RU"/>
           </a:p>
@@ -4429,7 +4429,7 @@
           <a:p>
             <a:fld id="{6EFF73F2-DCB5-4E8D-8FED-7ED588C8F664}" type="datetimeFigureOut">
               <a:rPr lang="ru-RU" smtClean="0"/>
-              <a:t>30.11.2020</a:t>
+              <a:t>01.12.2020</a:t>
             </a:fld>
             <a:endParaRPr lang="ru-RU"/>
           </a:p>
@@ -8745,8 +8745,8 @@
         </p:nvSpPr>
         <p:spPr>
           <a:xfrm>
-            <a:off x="1097280" y="1737360"/>
-            <a:ext cx="9997440" cy="4596130"/>
+            <a:off x="1097280" y="1730587"/>
+            <a:ext cx="9997440" cy="4503797"/>
           </a:xfrm>
           <a:prstGeom prst="rect">
             <a:avLst/>
@@ -8764,7 +8764,7 @@
               <a:buChar char=""/>
             </a:pPr>
             <a:r>
-              <a:rPr lang="ru-RU" sz="2200" dirty="0">
+              <a:rPr lang="ru-RU" sz="2000" dirty="0">
                 <a:effectLst/>
                 <a:latin typeface="Times New Roman" panose="02020603050405020304" pitchFamily="18" charset="0"/>
                 <a:ea typeface="Times New Roman" panose="02020603050405020304" pitchFamily="18" charset="0"/>
@@ -8778,7 +8778,7 @@
               <a:buChar char=""/>
             </a:pPr>
             <a:r>
-              <a:rPr lang="ru-RU" sz="2200" dirty="0">
+              <a:rPr lang="ru-RU" sz="2000" dirty="0">
                 <a:effectLst/>
                 <a:latin typeface="Times New Roman" panose="02020603050405020304" pitchFamily="18" charset="0"/>
                 <a:ea typeface="Times New Roman" panose="02020603050405020304" pitchFamily="18" charset="0"/>
@@ -8786,14 +8786,14 @@
               <a:t>Объекты интерьера</a:t>
             </a:r>
             <a:r>
-              <a:rPr lang="en-US" sz="2200" dirty="0">
+              <a:rPr lang="en-US" sz="2000" dirty="0">
                 <a:effectLst/>
                 <a:latin typeface="Times New Roman" panose="02020603050405020304" pitchFamily="18" charset="0"/>
                 <a:ea typeface="Times New Roman" panose="02020603050405020304" pitchFamily="18" charset="0"/>
               </a:rPr>
               <a:t>:</a:t>
             </a:r>
-            <a:endParaRPr lang="ru-RU" sz="2200" dirty="0">
+            <a:endParaRPr lang="ru-RU" sz="2000" dirty="0">
               <a:effectLst/>
               <a:latin typeface="Times New Roman" panose="02020603050405020304" pitchFamily="18" charset="0"/>
               <a:ea typeface="Times New Roman" panose="02020603050405020304" pitchFamily="18" charset="0"/>
@@ -8805,7 +8805,7 @@
               <a:buChar char="o"/>
             </a:pPr>
             <a:r>
-              <a:rPr lang="ru-RU" sz="2200" dirty="0">
+              <a:rPr lang="ru-RU" sz="2000" dirty="0">
                 <a:effectLst/>
                 <a:latin typeface="Times New Roman" panose="02020603050405020304" pitchFamily="18" charset="0"/>
                 <a:ea typeface="Times New Roman" panose="02020603050405020304" pitchFamily="18" charset="0"/>
@@ -8819,7 +8819,7 @@
               <a:buChar char="o"/>
             </a:pPr>
             <a:r>
-              <a:rPr lang="ru-RU" sz="2200" dirty="0">
+              <a:rPr lang="ru-RU" sz="2000" dirty="0">
                 <a:effectLst/>
                 <a:latin typeface="Times New Roman" panose="02020603050405020304" pitchFamily="18" charset="0"/>
                 <a:ea typeface="Times New Roman" panose="02020603050405020304" pitchFamily="18" charset="0"/>
@@ -8833,7 +8833,7 @@
               <a:buChar char="o"/>
             </a:pPr>
             <a:r>
-              <a:rPr lang="ru-RU" sz="2200" dirty="0">
+              <a:rPr lang="ru-RU" sz="2000" dirty="0">
                 <a:effectLst/>
                 <a:latin typeface="Times New Roman" panose="02020603050405020304" pitchFamily="18" charset="0"/>
                 <a:ea typeface="Times New Roman" panose="02020603050405020304" pitchFamily="18" charset="0"/>
@@ -8847,7 +8847,7 @@
               <a:buChar char="o"/>
             </a:pPr>
             <a:r>
-              <a:rPr lang="ru-RU" sz="2200" dirty="0">
+              <a:rPr lang="ru-RU" sz="2000" dirty="0">
                 <a:effectLst/>
                 <a:latin typeface="Times New Roman" panose="02020603050405020304" pitchFamily="18" charset="0"/>
                 <a:ea typeface="Times New Roman" panose="02020603050405020304" pitchFamily="18" charset="0"/>
@@ -8861,7 +8861,7 @@
               <a:buChar char="o"/>
             </a:pPr>
             <a:r>
-              <a:rPr lang="ru-RU" sz="2200" dirty="0">
+              <a:rPr lang="ru-RU" sz="2000" dirty="0">
                 <a:effectLst/>
                 <a:latin typeface="Times New Roman" panose="02020603050405020304" pitchFamily="18" charset="0"/>
                 <a:ea typeface="Times New Roman" panose="02020603050405020304" pitchFamily="18" charset="0"/>
@@ -8875,7 +8875,7 @@
               <a:buChar char="o"/>
             </a:pPr>
             <a:r>
-              <a:rPr lang="ru-RU" sz="2200" dirty="0">
+              <a:rPr lang="ru-RU" sz="2000" dirty="0">
                 <a:effectLst/>
                 <a:latin typeface="Times New Roman" panose="02020603050405020304" pitchFamily="18" charset="0"/>
                 <a:ea typeface="Times New Roman" panose="02020603050405020304" pitchFamily="18" charset="0"/>
@@ -8889,13 +8889,18 @@
               <a:buChar char="o"/>
             </a:pPr>
             <a:r>
-              <a:rPr lang="ru-RU" sz="2200" dirty="0">
+              <a:rPr lang="ru-RU" sz="2000" dirty="0">
                 <a:effectLst/>
                 <a:latin typeface="Times New Roman" panose="02020603050405020304" pitchFamily="18" charset="0"/>
                 <a:ea typeface="Times New Roman" panose="02020603050405020304" pitchFamily="18" charset="0"/>
               </a:rPr>
               <a:t>Подиум для представления выставочных предметов заказчика;</a:t>
             </a:r>
+            <a:endParaRPr lang="en-US" sz="2000" dirty="0">
+              <a:effectLst/>
+              <a:latin typeface="Times New Roman" panose="02020603050405020304" pitchFamily="18" charset="0"/>
+              <a:ea typeface="Times New Roman" panose="02020603050405020304" pitchFamily="18" charset="0"/>
+            </a:endParaRPr>
           </a:p>
           <a:p>
             <a:pPr marL="742950" lvl="1" indent="-285750" algn="just">
@@ -8903,13 +8908,24 @@
               <a:buChar char="o"/>
             </a:pPr>
             <a:r>
-              <a:rPr lang="ru-RU" sz="2200" dirty="0">
-                <a:effectLst/>
+              <a:rPr lang="ru-RU" sz="2000" dirty="0">
                 <a:latin typeface="Times New Roman" panose="02020603050405020304" pitchFamily="18" charset="0"/>
                 <a:ea typeface="Times New Roman" panose="02020603050405020304" pitchFamily="18" charset="0"/>
               </a:rPr>
-              <a:t>Плазменный телевизор;</a:t>
-            </a:r>
+              <a:t>Экран для проектора</a:t>
+            </a:r>
+            <a:r>
+              <a:rPr lang="en-US" sz="2000" dirty="0">
+                <a:latin typeface="Times New Roman" panose="02020603050405020304" pitchFamily="18" charset="0"/>
+                <a:ea typeface="Times New Roman" panose="02020603050405020304" pitchFamily="18" charset="0"/>
+              </a:rPr>
+              <a:t>;</a:t>
+            </a:r>
+            <a:endParaRPr lang="ru-RU" sz="2000" dirty="0">
+              <a:effectLst/>
+              <a:latin typeface="Times New Roman" panose="02020603050405020304" pitchFamily="18" charset="0"/>
+              <a:ea typeface="Times New Roman" panose="02020603050405020304" pitchFamily="18" charset="0"/>
+            </a:endParaRPr>
           </a:p>
           <a:p>
             <a:pPr marL="742950" lvl="1" indent="-285750" algn="just">
@@ -8917,7 +8933,21 @@
               <a:buChar char="o"/>
             </a:pPr>
             <a:r>
-              <a:rPr lang="ru-RU" sz="2200" dirty="0">
+              <a:rPr lang="ru-RU" sz="2000" dirty="0">
+                <a:effectLst/>
+                <a:latin typeface="Times New Roman" panose="02020603050405020304" pitchFamily="18" charset="0"/>
+                <a:ea typeface="Times New Roman" panose="02020603050405020304" pitchFamily="18" charset="0"/>
+              </a:rPr>
+              <a:t>Плазменный телевизор;</a:t>
+            </a:r>
+          </a:p>
+          <a:p>
+            <a:pPr marL="742950" lvl="1" indent="-285750" algn="just">
+              <a:buFont typeface="Courier New" panose="02070309020205020404" pitchFamily="49" charset="0"/>
+              <a:buChar char="o"/>
+            </a:pPr>
+            <a:r>
+              <a:rPr lang="ru-RU" sz="2000" dirty="0">
                 <a:effectLst/>
                 <a:latin typeface="Times New Roman" panose="02020603050405020304" pitchFamily="18" charset="0"/>
                 <a:ea typeface="Times New Roman" panose="02020603050405020304" pitchFamily="18" charset="0"/>
@@ -8934,7 +8964,7 @@
               <a:buChar char="o"/>
             </a:pPr>
             <a:r>
-              <a:rPr lang="ru-RU" sz="2200" dirty="0">
+              <a:rPr lang="ru-RU" sz="2000" dirty="0">
                 <a:effectLst/>
                 <a:latin typeface="Times New Roman" panose="02020603050405020304" pitchFamily="18" charset="0"/>
                 <a:ea typeface="Times New Roman" panose="02020603050405020304" pitchFamily="18" charset="0"/>
@@ -8948,13 +8978,13 @@
               <a:buChar char=""/>
             </a:pPr>
             <a:r>
-              <a:rPr lang="ru-RU" sz="2200" dirty="0">
+              <a:rPr lang="ru-RU" sz="2000" dirty="0">
                 <a:latin typeface="Times New Roman" panose="02020603050405020304" pitchFamily="18" charset="0"/>
                 <a:ea typeface="Times New Roman" panose="02020603050405020304" pitchFamily="18" charset="0"/>
               </a:rPr>
               <a:t>Источники света</a:t>
             </a:r>
-            <a:endParaRPr lang="ru-RU" sz="2200" dirty="0">
+            <a:endParaRPr lang="ru-RU" sz="2000" dirty="0">
               <a:effectLst/>
               <a:latin typeface="Times New Roman" panose="02020603050405020304" pitchFamily="18" charset="0"/>
               <a:ea typeface="Times New Roman" panose="02020603050405020304" pitchFamily="18" charset="0"/>

</xml_diff>